<commit_message>
Uploading with latest updates
Uploading with latest updates
</commit_message>
<xml_diff>
--- a/blog/WeirdMachinePresentation-ODU.pptx
+++ b/blog/WeirdMachinePresentation-ODU.pptx
@@ -28,16 +28,17 @@
     <p:sldId id="272" r:id="rId22"/>
     <p:sldId id="273" r:id="rId23"/>
     <p:sldId id="274" r:id="rId24"/>
+    <p:sldId id="275" r:id="rId25"/>
   </p:sldIdLst>
   <p:sldSz cy="6858000" cx="12192000"/>
   <p:notesSz cx="6858000" cy="9144000"/>
   <p:embeddedFontLst>
     <p:embeddedFont>
       <p:font typeface="Roboto"/>
-      <p:regular r:id="rId25"/>
-      <p:bold r:id="rId26"/>
-      <p:italic r:id="rId27"/>
-      <p:boldItalic r:id="rId28"/>
+      <p:regular r:id="rId26"/>
+      <p:bold r:id="rId27"/>
+      <p:italic r:id="rId28"/>
+      <p:boldItalic r:id="rId29"/>
     </p:embeddedFont>
   </p:embeddedFontLst>
   <p:defaultTextStyle>
@@ -271,7 +272,7 @@
   </p:defaultTextStyle>
   <p:extLst>
     <p:ext uri="GoogleSlidesCustomDataVersion2">
-      <go:slidesCustomData xmlns:go="http://customooxmlschemas.google.com/" r:id="rId29" roundtripDataSignature="AMtx7mjtBxjeCmwKoEcGzVvOsgA5KcAdJQ=="/>
+      <go:slidesCustomData xmlns:go="http://customooxmlschemas.google.com/" r:id="rId30" roundtripDataSignature="AMtx7miOkfqKv4vPITrbLCQBwBo7gK/0MQ=="/>
     </p:ext>
   </p:extLst>
 </p:presentation>
@@ -807,7 +808,7 @@
   <p:cSld>
     <p:spTree>
       <p:nvGrpSpPr>
-        <p:cNvPr id="167" name="Shape 167"/>
+        <p:cNvPr id="169" name="Shape 169"/>
         <p:cNvGrpSpPr/>
         <p:nvPr/>
       </p:nvGrpSpPr>
@@ -821,7 +822,291 @@
       </p:grpSpPr>
       <p:sp>
         <p:nvSpPr>
-          <p:cNvPr id="168" name="Google Shape;168;g3b0d07ae252_9_2:notes"/>
+          <p:cNvPr id="170" name="Google Shape;170;p7:notes"/>
+          <p:cNvSpPr txBox="1"/>
+          <p:nvPr>
+            <p:ph idx="1" type="body"/>
+          </p:nvPr>
+        </p:nvSpPr>
+        <p:spPr>
+          <a:xfrm>
+            <a:off x="685800" y="4343400"/>
+            <a:ext cx="5486400" cy="4114800"/>
+          </a:xfrm>
+          <a:prstGeom prst="rect">
+            <a:avLst/>
+          </a:prstGeom>
+        </p:spPr>
+        <p:txBody>
+          <a:bodyPr anchorCtr="0" anchor="t" bIns="91425" lIns="91425" spcFirstLastPara="1" rIns="91425" wrap="square" tIns="91425">
+            <a:noAutofit/>
+          </a:bodyPr>
+          <a:lstStyle/>
+          <a:p>
+            <a:pPr indent="0" lvl="0" marL="0" rtl="0" algn="l">
+              <a:spcBef>
+                <a:spcPts val="0"/>
+              </a:spcBef>
+              <a:spcAft>
+                <a:spcPts val="0"/>
+              </a:spcAft>
+              <a:buClr>
+                <a:schemeClr val="dk1"/>
+              </a:buClr>
+              <a:buSzPts val="1100"/>
+              <a:buFont typeface="Arial"/>
+              <a:buNone/>
+            </a:pPr>
+            <a:r>
+              <a:rPr lang="en-US"/>
+              <a:t>The wind energy test bed is built as a scaled-down wind farm that connects physical turbines, industrial controllers, and a SCADA system into a single cyber‑physical environment. At a high level, the slide shows how device‑level control, field networks, secure gateways, and the Rapid SCADA server fit together into that architecture.​</a:t>
+            </a:r>
+            <a:endParaRPr/>
+          </a:p>
+          <a:p>
+            <a:pPr indent="0" lvl="0" marL="0" rtl="0" algn="l">
+              <a:spcBef>
+                <a:spcPts val="0"/>
+              </a:spcBef>
+              <a:spcAft>
+                <a:spcPts val="0"/>
+              </a:spcAft>
+              <a:buClr>
+                <a:schemeClr val="dk1"/>
+              </a:buClr>
+              <a:buSzPts val="1100"/>
+              <a:buFont typeface="Arial"/>
+              <a:buNone/>
+            </a:pPr>
+            <a:r>
+              <a:t/>
+            </a:r>
+            <a:endParaRPr/>
+          </a:p>
+          <a:p>
+            <a:pPr indent="0" lvl="0" marL="0" rtl="0" algn="l">
+              <a:spcBef>
+                <a:spcPts val="0"/>
+              </a:spcBef>
+              <a:spcAft>
+                <a:spcPts val="0"/>
+              </a:spcAft>
+              <a:buClr>
+                <a:schemeClr val="dk1"/>
+              </a:buClr>
+              <a:buSzPts val="1100"/>
+              <a:buFont typeface="Arial"/>
+              <a:buNone/>
+            </a:pPr>
+            <a:r>
+              <a:rPr lang="en-US"/>
+              <a:t>At the edge, scaled and emulated wind turbines are instrumented with motors and sensors, then controlled by a mix of industrial PLCs and Raspberry Pi units. These controllers handle local logic such as RPM limits and shutdown routines, and expose their data and commands over industrial protocols like Modbus TCP and other vendor‑specific fieldbuses.​</a:t>
+            </a:r>
+            <a:endParaRPr/>
+          </a:p>
+          <a:p>
+            <a:pPr indent="0" lvl="0" marL="0" rtl="0" algn="l">
+              <a:spcBef>
+                <a:spcPts val="0"/>
+              </a:spcBef>
+              <a:spcAft>
+                <a:spcPts val="0"/>
+              </a:spcAft>
+              <a:buClr>
+                <a:schemeClr val="dk1"/>
+              </a:buClr>
+              <a:buSzPts val="1100"/>
+              <a:buFont typeface="Arial"/>
+              <a:buNone/>
+            </a:pPr>
+            <a:r>
+              <a:t/>
+            </a:r>
+            <a:endParaRPr/>
+          </a:p>
+          <a:p>
+            <a:pPr indent="0" lvl="0" marL="0" rtl="0" algn="l">
+              <a:spcBef>
+                <a:spcPts val="0"/>
+              </a:spcBef>
+              <a:spcAft>
+                <a:spcPts val="0"/>
+              </a:spcAft>
+              <a:buClr>
+                <a:schemeClr val="dk1"/>
+              </a:buClr>
+              <a:buSzPts val="1100"/>
+              <a:buFont typeface="Arial"/>
+              <a:buNone/>
+            </a:pPr>
+            <a:r>
+              <a:rPr lang="en-US"/>
+              <a:t>The PLCs and emulated PLCs connect over Ethernet to the test bed network, where traffic is segmented and routed toward the SCADA environment. A Python‑based proxy with certificates and credentials sits in the path of Modbus TCP, authenticating devices and only forwarding traffic for nodes that prove their identity. This effectively creates a secure Modbus gateway in front of the SCADA server.​</a:t>
+            </a:r>
+            <a:endParaRPr/>
+          </a:p>
+          <a:p>
+            <a:pPr indent="0" lvl="0" marL="0" rtl="0" algn="l">
+              <a:spcBef>
+                <a:spcPts val="0"/>
+              </a:spcBef>
+              <a:spcAft>
+                <a:spcPts val="0"/>
+              </a:spcAft>
+              <a:buClr>
+                <a:schemeClr val="dk1"/>
+              </a:buClr>
+              <a:buSzPts val="1100"/>
+              <a:buFont typeface="Arial"/>
+              <a:buNone/>
+            </a:pPr>
+            <a:r>
+              <a:t/>
+            </a:r>
+            <a:endParaRPr/>
+          </a:p>
+          <a:p>
+            <a:pPr indent="0" lvl="0" marL="0" rtl="0" algn="l">
+              <a:spcBef>
+                <a:spcPts val="0"/>
+              </a:spcBef>
+              <a:spcAft>
+                <a:spcPts val="0"/>
+              </a:spcAft>
+              <a:buClr>
+                <a:schemeClr val="dk1"/>
+              </a:buClr>
+              <a:buSzPts val="1100"/>
+              <a:buFont typeface="Arial"/>
+              <a:buNone/>
+            </a:pPr>
+            <a:r>
+              <a:rPr lang="en-US"/>
+              <a:t>The Rapid SCADA server is configured with multiple communication lines, simultaneously polling and controlling devices using Modbus and a REST API. These lines connect to PLCs, simulation servers, and an ambient weather station, with each line mapped into channels, devices, and logs.</a:t>
+            </a:r>
+            <a:endParaRPr/>
+          </a:p>
+          <a:p>
+            <a:pPr indent="0" lvl="0" marL="0" rtl="0" algn="l">
+              <a:spcBef>
+                <a:spcPts val="0"/>
+              </a:spcBef>
+              <a:spcAft>
+                <a:spcPts val="0"/>
+              </a:spcAft>
+              <a:buClr>
+                <a:schemeClr val="dk1"/>
+              </a:buClr>
+              <a:buSzPts val="1100"/>
+              <a:buFont typeface="Arial"/>
+              <a:buNone/>
+            </a:pPr>
+            <a:r>
+              <a:t/>
+            </a:r>
+            <a:endParaRPr/>
+          </a:p>
+          <a:p>
+            <a:pPr indent="0" lvl="0" marL="0" rtl="0" algn="l">
+              <a:spcBef>
+                <a:spcPts val="0"/>
+              </a:spcBef>
+              <a:spcAft>
+                <a:spcPts val="0"/>
+              </a:spcAft>
+              <a:buClr>
+                <a:schemeClr val="dk1"/>
+              </a:buClr>
+              <a:buSzPts val="1100"/>
+              <a:buFont typeface="Arial"/>
+              <a:buNone/>
+            </a:pPr>
+            <a:r>
+              <a:rPr lang="en-US"/>
+              <a:t>Operators interact with the system through Rapid SCADA’s web‑based interface, which presents turbine status, weather measurements, control commands, and alarms in dashboards. This architecture allows experiments that closely mirror how a real wind farm’s supervisory control and cybersecurity stack would be organized.</a:t>
+            </a:r>
+            <a:endParaRPr/>
+          </a:p>
+          <a:p>
+            <a:pPr indent="0" lvl="0" marL="0" rtl="0" algn="l">
+              <a:spcBef>
+                <a:spcPts val="0"/>
+              </a:spcBef>
+              <a:spcAft>
+                <a:spcPts val="0"/>
+              </a:spcAft>
+              <a:buNone/>
+            </a:pPr>
+            <a:r>
+              <a:t/>
+            </a:r>
+            <a:endParaRPr/>
+          </a:p>
+        </p:txBody>
+      </p:sp>
+      <p:sp>
+        <p:nvSpPr>
+          <p:cNvPr id="171" name="Google Shape;171;p7:notes"/>
+          <p:cNvSpPr/>
+          <p:nvPr>
+            <p:ph idx="2" type="sldImg"/>
+          </p:nvPr>
+        </p:nvSpPr>
+        <p:spPr>
+          <a:xfrm>
+            <a:off x="1143225" y="685800"/>
+            <a:ext cx="4572225" cy="3429000"/>
+          </a:xfrm>
+          <a:custGeom>
+            <a:rect b="b" l="l" r="r" t="t"/>
+            <a:pathLst>
+              <a:path extrusionOk="0" h="120000" w="120000">
+                <a:moveTo>
+                  <a:pt x="0" y="0"/>
+                </a:moveTo>
+                <a:lnTo>
+                  <a:pt x="120000" y="0"/>
+                </a:lnTo>
+                <a:lnTo>
+                  <a:pt x="120000" y="120000"/>
+                </a:lnTo>
+                <a:lnTo>
+                  <a:pt x="0" y="120000"/>
+                </a:lnTo>
+                <a:close/>
+              </a:path>
+            </a:pathLst>
+          </a:custGeom>
+        </p:spPr>
+      </p:sp>
+    </p:spTree>
+  </p:cSld>
+  <p:clrMapOvr>
+    <a:masterClrMapping/>
+  </p:clrMapOvr>
+</p:notes>
+</file>
+
+<file path=ppt/notesSlides/notesSlide11.xml><?xml version="1.0" encoding="utf-8"?>
+<p:notes xmlns:a="http://schemas.openxmlformats.org/drawingml/2006/main" xmlns:r="http://schemas.openxmlformats.org/officeDocument/2006/relationships" xmlns:mc="http://schemas.openxmlformats.org/markup-compatibility/2006" xmlns:mv="urn:schemas-microsoft-com:mac:vml" xmlns:p="http://schemas.openxmlformats.org/presentationml/2006/main" xmlns:c="http://schemas.openxmlformats.org/drawingml/2006/chart" xmlns:dgm="http://schemas.openxmlformats.org/drawingml/2006/diagram" xmlns:o="urn:schemas-microsoft-com:office:office" xmlns:v="urn:schemas-microsoft-com:vml" xmlns:pvml="urn:schemas-microsoft-com:office:powerpoint" xmlns:com="http://schemas.openxmlformats.org/drawingml/2006/compatibility" xmlns:p14="http://schemas.microsoft.com/office/powerpoint/2010/main" xmlns:p15="http://schemas.microsoft.com/office/powerpoint/2012/main" xmlns:ahyp="http://schemas.microsoft.com/office/drawing/2018/hyperlinkcolor" showMasterPhAnim="0" showMasterSp="0">
+  <p:cSld>
+    <p:spTree>
+      <p:nvGrpSpPr>
+        <p:cNvPr id="175" name="Shape 175"/>
+        <p:cNvGrpSpPr/>
+        <p:nvPr/>
+      </p:nvGrpSpPr>
+      <p:grpSpPr>
+        <a:xfrm>
+          <a:off x="0" y="0"/>
+          <a:ext cx="0" cy="0"/>
+          <a:chOff x="0" y="0"/>
+          <a:chExt cx="0" cy="0"/>
+        </a:xfrm>
+      </p:grpSpPr>
+      <p:sp>
+        <p:nvSpPr>
+          <p:cNvPr id="176" name="Google Shape;176;g3b0d07ae252_9_2:notes"/>
           <p:cNvSpPr txBox="1"/>
           <p:nvPr>
             <p:ph idx="1" type="body"/>
@@ -868,189 +1153,7 @@
       </p:sp>
       <p:sp>
         <p:nvSpPr>
-          <p:cNvPr id="169" name="Google Shape;169;g3b0d07ae252_9_2:notes"/>
-          <p:cNvSpPr/>
-          <p:nvPr>
-            <p:ph idx="2" type="sldImg"/>
-          </p:nvPr>
-        </p:nvSpPr>
-        <p:spPr>
-          <a:xfrm>
-            <a:off x="1143225" y="685800"/>
-            <a:ext cx="4572300" cy="3429000"/>
-          </a:xfrm>
-          <a:custGeom>
-            <a:rect b="b" l="l" r="r" t="t"/>
-            <a:pathLst>
-              <a:path extrusionOk="0" h="120000" w="120000">
-                <a:moveTo>
-                  <a:pt x="0" y="0"/>
-                </a:moveTo>
-                <a:lnTo>
-                  <a:pt x="120000" y="0"/>
-                </a:lnTo>
-                <a:lnTo>
-                  <a:pt x="120000" y="120000"/>
-                </a:lnTo>
-                <a:lnTo>
-                  <a:pt x="0" y="120000"/>
-                </a:lnTo>
-                <a:close/>
-              </a:path>
-            </a:pathLst>
-          </a:custGeom>
-          <a:noFill/>
-          <a:ln cap="flat" cmpd="sng" w="9525">
-            <a:solidFill>
-              <a:srgbClr val="000000"/>
-            </a:solidFill>
-            <a:prstDash val="solid"/>
-            <a:round/>
-            <a:headEnd len="sm" w="sm" type="none"/>
-            <a:tailEnd len="sm" w="sm" type="none"/>
-          </a:ln>
-        </p:spPr>
-      </p:sp>
-    </p:spTree>
-  </p:cSld>
-  <p:clrMapOvr>
-    <a:masterClrMapping/>
-  </p:clrMapOvr>
-</p:notes>
-</file>
-
-<file path=ppt/notesSlides/notesSlide11.xml><?xml version="1.0" encoding="utf-8"?>
-<p:notes xmlns:a="http://schemas.openxmlformats.org/drawingml/2006/main" xmlns:r="http://schemas.openxmlformats.org/officeDocument/2006/relationships" xmlns:mc="http://schemas.openxmlformats.org/markup-compatibility/2006" xmlns:mv="urn:schemas-microsoft-com:mac:vml" xmlns:p="http://schemas.openxmlformats.org/presentationml/2006/main" xmlns:c="http://schemas.openxmlformats.org/drawingml/2006/chart" xmlns:dgm="http://schemas.openxmlformats.org/drawingml/2006/diagram" xmlns:o="urn:schemas-microsoft-com:office:office" xmlns:v="urn:schemas-microsoft-com:vml" xmlns:pvml="urn:schemas-microsoft-com:office:powerpoint" xmlns:com="http://schemas.openxmlformats.org/drawingml/2006/compatibility" xmlns:p14="http://schemas.microsoft.com/office/powerpoint/2010/main" xmlns:p15="http://schemas.microsoft.com/office/powerpoint/2012/main" xmlns:ahyp="http://schemas.microsoft.com/office/drawing/2018/hyperlinkcolor" showMasterPhAnim="0" showMasterSp="0">
-  <p:cSld>
-    <p:spTree>
-      <p:nvGrpSpPr>
-        <p:cNvPr id="174" name="Shape 174"/>
-        <p:cNvGrpSpPr/>
-        <p:nvPr/>
-      </p:nvGrpSpPr>
-      <p:grpSpPr>
-        <a:xfrm>
-          <a:off x="0" y="0"/>
-          <a:ext cx="0" cy="0"/>
-          <a:chOff x="0" y="0"/>
-          <a:chExt cx="0" cy="0"/>
-        </a:xfrm>
-      </p:grpSpPr>
-      <p:sp>
-        <p:nvSpPr>
-          <p:cNvPr id="175" name="Google Shape;175;g3b0d07ae252_5_0:notes"/>
-          <p:cNvSpPr txBox="1"/>
-          <p:nvPr>
-            <p:ph idx="1" type="body"/>
-          </p:nvPr>
-        </p:nvSpPr>
-        <p:spPr>
-          <a:xfrm>
-            <a:off x="685800" y="4343400"/>
-            <a:ext cx="5486400" cy="4114800"/>
-          </a:xfrm>
-          <a:prstGeom prst="rect">
-            <a:avLst/>
-          </a:prstGeom>
-          <a:noFill/>
-          <a:ln>
-            <a:noFill/>
-          </a:ln>
-        </p:spPr>
-        <p:txBody>
-          <a:bodyPr anchorCtr="0" anchor="t" bIns="91425" lIns="91425" spcFirstLastPara="1" rIns="91425" wrap="square" tIns="91425">
-            <a:noAutofit/>
-          </a:bodyPr>
-          <a:lstStyle/>
-          <a:p>
-            <a:pPr indent="0" lvl="0" marL="0" rtl="0" algn="l">
-              <a:lnSpc>
-                <a:spcPct val="200000"/>
-              </a:lnSpc>
-              <a:spcBef>
-                <a:spcPts val="0"/>
-              </a:spcBef>
-              <a:spcAft>
-                <a:spcPts val="0"/>
-              </a:spcAft>
-              <a:buSzPts val="1100"/>
-              <a:buNone/>
-            </a:pPr>
-            <a:r>
-              <a:rPr lang="en-US">
-                <a:solidFill>
-                  <a:schemeClr val="dk1"/>
-                </a:solidFill>
-              </a:rPr>
-              <a:t>In the wind-energy testbed, we treat Modbus-like operations as primitives. By sequencing register/coil reads and writes, </a:t>
-            </a:r>
-            <a:endParaRPr>
-              <a:solidFill>
-                <a:schemeClr val="dk1"/>
-              </a:solidFill>
-            </a:endParaRPr>
-          </a:p>
-          <a:p>
-            <a:pPr indent="0" lvl="0" marL="0" rtl="0" algn="l">
-              <a:lnSpc>
-                <a:spcPct val="200000"/>
-              </a:lnSpc>
-              <a:spcBef>
-                <a:spcPts val="0"/>
-              </a:spcBef>
-              <a:spcAft>
-                <a:spcPts val="0"/>
-              </a:spcAft>
-              <a:buSzPts val="1100"/>
-              <a:buNone/>
-            </a:pPr>
-            <a:r>
-              <a:rPr lang="en-US">
-                <a:solidFill>
-                  <a:schemeClr val="dk1"/>
-                </a:solidFill>
-              </a:rPr>
-              <a:t>then adding control gadgets like wait/conditional/loop, we can build composite behaviors like counters, timers, </a:t>
-            </a:r>
-            <a:endParaRPr>
-              <a:solidFill>
-                <a:schemeClr val="dk1"/>
-              </a:solidFill>
-            </a:endParaRPr>
-          </a:p>
-          <a:p>
-            <a:pPr indent="0" lvl="0" marL="0" rtl="0" algn="l">
-              <a:lnSpc>
-                <a:spcPct val="200000"/>
-              </a:lnSpc>
-              <a:spcBef>
-                <a:spcPts val="0"/>
-              </a:spcBef>
-              <a:spcAft>
-                <a:spcPts val="0"/>
-              </a:spcAft>
-              <a:buClr>
-                <a:schemeClr val="dk1"/>
-              </a:buClr>
-              <a:buSzPts val="1100"/>
-              <a:buFont typeface="Arial"/>
-              <a:buNone/>
-            </a:pPr>
-            <a:r>
-              <a:rPr lang="en-US">
-                <a:solidFill>
-                  <a:schemeClr val="dk1"/>
-                </a:solidFill>
-              </a:rPr>
-              <a:t>and even state machines computation emerging from the protocol itself. Allowing unintended computational structure to emerge within a non-computational control protocol.</a:t>
-            </a:r>
-            <a:endParaRPr/>
-          </a:p>
-        </p:txBody>
-      </p:sp>
-      <p:sp>
-        <p:nvSpPr>
-          <p:cNvPr id="176" name="Google Shape;176;g3b0d07ae252_5_0:notes"/>
+          <p:cNvPr id="177" name="Google Shape;177;g3b0d07ae252_9_2:notes"/>
           <p:cNvSpPr/>
           <p:nvPr>
             <p:ph idx="2" type="sldImg"/>
@@ -1106,7 +1209,7 @@
   <p:cSld>
     <p:spTree>
       <p:nvGrpSpPr>
-        <p:cNvPr id="181" name="Shape 181"/>
+        <p:cNvPr id="182" name="Shape 182"/>
         <p:cNvGrpSpPr/>
         <p:nvPr/>
       </p:nvGrpSpPr>
@@ -1120,7 +1223,189 @@
       </p:grpSpPr>
       <p:sp>
         <p:nvSpPr>
-          <p:cNvPr id="182" name="Google Shape;182;p9:notes"/>
+          <p:cNvPr id="183" name="Google Shape;183;g3b0d07ae252_5_0:notes"/>
+          <p:cNvSpPr txBox="1"/>
+          <p:nvPr>
+            <p:ph idx="1" type="body"/>
+          </p:nvPr>
+        </p:nvSpPr>
+        <p:spPr>
+          <a:xfrm>
+            <a:off x="685800" y="4343400"/>
+            <a:ext cx="5486400" cy="4114800"/>
+          </a:xfrm>
+          <a:prstGeom prst="rect">
+            <a:avLst/>
+          </a:prstGeom>
+          <a:noFill/>
+          <a:ln>
+            <a:noFill/>
+          </a:ln>
+        </p:spPr>
+        <p:txBody>
+          <a:bodyPr anchorCtr="0" anchor="t" bIns="91425" lIns="91425" spcFirstLastPara="1" rIns="91425" wrap="square" tIns="91425">
+            <a:noAutofit/>
+          </a:bodyPr>
+          <a:lstStyle/>
+          <a:p>
+            <a:pPr indent="0" lvl="0" marL="0" rtl="0" algn="l">
+              <a:lnSpc>
+                <a:spcPct val="200000"/>
+              </a:lnSpc>
+              <a:spcBef>
+                <a:spcPts val="0"/>
+              </a:spcBef>
+              <a:spcAft>
+                <a:spcPts val="0"/>
+              </a:spcAft>
+              <a:buSzPts val="1100"/>
+              <a:buNone/>
+            </a:pPr>
+            <a:r>
+              <a:rPr lang="en-US">
+                <a:solidFill>
+                  <a:schemeClr val="dk1"/>
+                </a:solidFill>
+              </a:rPr>
+              <a:t>In the wind-energy testbed, we treat Modbus-like operations as primitives. By sequencing register/coil reads and writes, </a:t>
+            </a:r>
+            <a:endParaRPr>
+              <a:solidFill>
+                <a:schemeClr val="dk1"/>
+              </a:solidFill>
+            </a:endParaRPr>
+          </a:p>
+          <a:p>
+            <a:pPr indent="0" lvl="0" marL="0" rtl="0" algn="l">
+              <a:lnSpc>
+                <a:spcPct val="200000"/>
+              </a:lnSpc>
+              <a:spcBef>
+                <a:spcPts val="0"/>
+              </a:spcBef>
+              <a:spcAft>
+                <a:spcPts val="0"/>
+              </a:spcAft>
+              <a:buSzPts val="1100"/>
+              <a:buNone/>
+            </a:pPr>
+            <a:r>
+              <a:rPr lang="en-US">
+                <a:solidFill>
+                  <a:schemeClr val="dk1"/>
+                </a:solidFill>
+              </a:rPr>
+              <a:t>then adding control gadgets like wait/conditional/loop, we can build composite behaviors like counters, timers, </a:t>
+            </a:r>
+            <a:endParaRPr>
+              <a:solidFill>
+                <a:schemeClr val="dk1"/>
+              </a:solidFill>
+            </a:endParaRPr>
+          </a:p>
+          <a:p>
+            <a:pPr indent="0" lvl="0" marL="0" rtl="0" algn="l">
+              <a:lnSpc>
+                <a:spcPct val="200000"/>
+              </a:lnSpc>
+              <a:spcBef>
+                <a:spcPts val="0"/>
+              </a:spcBef>
+              <a:spcAft>
+                <a:spcPts val="0"/>
+              </a:spcAft>
+              <a:buClr>
+                <a:schemeClr val="dk1"/>
+              </a:buClr>
+              <a:buSzPts val="1100"/>
+              <a:buFont typeface="Arial"/>
+              <a:buNone/>
+            </a:pPr>
+            <a:r>
+              <a:rPr lang="en-US">
+                <a:solidFill>
+                  <a:schemeClr val="dk1"/>
+                </a:solidFill>
+              </a:rPr>
+              <a:t>and even state machines computation emerging from the protocol itself. Allowing unintended computational structure to emerge within a non-computational control protocol.</a:t>
+            </a:r>
+            <a:endParaRPr/>
+          </a:p>
+        </p:txBody>
+      </p:sp>
+      <p:sp>
+        <p:nvSpPr>
+          <p:cNvPr id="184" name="Google Shape;184;g3b0d07ae252_5_0:notes"/>
+          <p:cNvSpPr/>
+          <p:nvPr>
+            <p:ph idx="2" type="sldImg"/>
+          </p:nvPr>
+        </p:nvSpPr>
+        <p:spPr>
+          <a:xfrm>
+            <a:off x="1143225" y="685800"/>
+            <a:ext cx="4572300" cy="3429000"/>
+          </a:xfrm>
+          <a:custGeom>
+            <a:rect b="b" l="l" r="r" t="t"/>
+            <a:pathLst>
+              <a:path extrusionOk="0" h="120000" w="120000">
+                <a:moveTo>
+                  <a:pt x="0" y="0"/>
+                </a:moveTo>
+                <a:lnTo>
+                  <a:pt x="120000" y="0"/>
+                </a:lnTo>
+                <a:lnTo>
+                  <a:pt x="120000" y="120000"/>
+                </a:lnTo>
+                <a:lnTo>
+                  <a:pt x="0" y="120000"/>
+                </a:lnTo>
+                <a:close/>
+              </a:path>
+            </a:pathLst>
+          </a:custGeom>
+          <a:noFill/>
+          <a:ln cap="flat" cmpd="sng" w="9525">
+            <a:solidFill>
+              <a:srgbClr val="000000"/>
+            </a:solidFill>
+            <a:prstDash val="solid"/>
+            <a:round/>
+            <a:headEnd len="sm" w="sm" type="none"/>
+            <a:tailEnd len="sm" w="sm" type="none"/>
+          </a:ln>
+        </p:spPr>
+      </p:sp>
+    </p:spTree>
+  </p:cSld>
+  <p:clrMapOvr>
+    <a:masterClrMapping/>
+  </p:clrMapOvr>
+</p:notes>
+</file>
+
+<file path=ppt/notesSlides/notesSlide13.xml><?xml version="1.0" encoding="utf-8"?>
+<p:notes xmlns:a="http://schemas.openxmlformats.org/drawingml/2006/main" xmlns:r="http://schemas.openxmlformats.org/officeDocument/2006/relationships" xmlns:mc="http://schemas.openxmlformats.org/markup-compatibility/2006" xmlns:mv="urn:schemas-microsoft-com:mac:vml" xmlns:p="http://schemas.openxmlformats.org/presentationml/2006/main" xmlns:c="http://schemas.openxmlformats.org/drawingml/2006/chart" xmlns:dgm="http://schemas.openxmlformats.org/drawingml/2006/diagram" xmlns:o="urn:schemas-microsoft-com:office:office" xmlns:v="urn:schemas-microsoft-com:vml" xmlns:pvml="urn:schemas-microsoft-com:office:powerpoint" xmlns:com="http://schemas.openxmlformats.org/drawingml/2006/compatibility" xmlns:p14="http://schemas.microsoft.com/office/powerpoint/2010/main" xmlns:p15="http://schemas.microsoft.com/office/powerpoint/2012/main" xmlns:ahyp="http://schemas.microsoft.com/office/drawing/2018/hyperlinkcolor" showMasterPhAnim="0" showMasterSp="0">
+  <p:cSld>
+    <p:spTree>
+      <p:nvGrpSpPr>
+        <p:cNvPr id="189" name="Shape 189"/>
+        <p:cNvGrpSpPr/>
+        <p:nvPr/>
+      </p:nvGrpSpPr>
+      <p:grpSpPr>
+        <a:xfrm>
+          <a:off x="0" y="0"/>
+          <a:ext cx="0" cy="0"/>
+          <a:chOff x="0" y="0"/>
+          <a:chExt cx="0" cy="0"/>
+        </a:xfrm>
+      </p:grpSpPr>
+      <p:sp>
+        <p:nvSpPr>
+          <p:cNvPr id="190" name="Google Shape;190;p9:notes"/>
           <p:cNvSpPr txBox="1"/>
           <p:nvPr>
             <p:ph idx="1" type="body"/>
@@ -1403,106 +1688,7 @@
       </p:sp>
       <p:sp>
         <p:nvSpPr>
-          <p:cNvPr id="183" name="Google Shape;183;p9:notes"/>
-          <p:cNvSpPr/>
-          <p:nvPr>
-            <p:ph idx="2" type="sldImg"/>
-          </p:nvPr>
-        </p:nvSpPr>
-        <p:spPr>
-          <a:xfrm>
-            <a:off x="1143225" y="685800"/>
-            <a:ext cx="4572225" cy="3429000"/>
-          </a:xfrm>
-          <a:custGeom>
-            <a:rect b="b" l="l" r="r" t="t"/>
-            <a:pathLst>
-              <a:path extrusionOk="0" h="120000" w="120000">
-                <a:moveTo>
-                  <a:pt x="0" y="0"/>
-                </a:moveTo>
-                <a:lnTo>
-                  <a:pt x="120000" y="0"/>
-                </a:lnTo>
-                <a:lnTo>
-                  <a:pt x="120000" y="120000"/>
-                </a:lnTo>
-                <a:lnTo>
-                  <a:pt x="0" y="120000"/>
-                </a:lnTo>
-                <a:close/>
-              </a:path>
-            </a:pathLst>
-          </a:custGeom>
-        </p:spPr>
-      </p:sp>
-    </p:spTree>
-  </p:cSld>
-  <p:clrMapOvr>
-    <a:masterClrMapping/>
-  </p:clrMapOvr>
-</p:notes>
-</file>
-
-<file path=ppt/notesSlides/notesSlide13.xml><?xml version="1.0" encoding="utf-8"?>
-<p:notes xmlns:a="http://schemas.openxmlformats.org/drawingml/2006/main" xmlns:r="http://schemas.openxmlformats.org/officeDocument/2006/relationships" xmlns:mc="http://schemas.openxmlformats.org/markup-compatibility/2006" xmlns:mv="urn:schemas-microsoft-com:mac:vml" xmlns:p="http://schemas.openxmlformats.org/presentationml/2006/main" xmlns:c="http://schemas.openxmlformats.org/drawingml/2006/chart" xmlns:dgm="http://schemas.openxmlformats.org/drawingml/2006/diagram" xmlns:o="urn:schemas-microsoft-com:office:office" xmlns:v="urn:schemas-microsoft-com:vml" xmlns:pvml="urn:schemas-microsoft-com:office:powerpoint" xmlns:com="http://schemas.openxmlformats.org/drawingml/2006/compatibility" xmlns:p14="http://schemas.microsoft.com/office/powerpoint/2010/main" xmlns:p15="http://schemas.microsoft.com/office/powerpoint/2012/main" xmlns:ahyp="http://schemas.microsoft.com/office/drawing/2018/hyperlinkcolor" showMasterPhAnim="0" showMasterSp="0">
-  <p:cSld>
-    <p:spTree>
-      <p:nvGrpSpPr>
-        <p:cNvPr id="191" name="Shape 191"/>
-        <p:cNvGrpSpPr/>
-        <p:nvPr/>
-      </p:nvGrpSpPr>
-      <p:grpSpPr>
-        <a:xfrm>
-          <a:off x="0" y="0"/>
-          <a:ext cx="0" cy="0"/>
-          <a:chOff x="0" y="0"/>
-          <a:chExt cx="0" cy="0"/>
-        </a:xfrm>
-      </p:grpSpPr>
-      <p:sp>
-        <p:nvSpPr>
-          <p:cNvPr id="192" name="Google Shape;192;p10:notes"/>
-          <p:cNvSpPr txBox="1"/>
-          <p:nvPr>
-            <p:ph idx="1" type="body"/>
-          </p:nvPr>
-        </p:nvSpPr>
-        <p:spPr>
-          <a:xfrm>
-            <a:off x="685800" y="4343400"/>
-            <a:ext cx="5486400" cy="4114800"/>
-          </a:xfrm>
-          <a:prstGeom prst="rect">
-            <a:avLst/>
-          </a:prstGeom>
-        </p:spPr>
-        <p:txBody>
-          <a:bodyPr anchorCtr="0" anchor="t" bIns="91425" lIns="91425" spcFirstLastPara="1" rIns="91425" wrap="square" tIns="91425">
-            <a:noAutofit/>
-          </a:bodyPr>
-          <a:lstStyle/>
-          <a:p>
-            <a:pPr indent="0" lvl="0" marL="0" rtl="0" algn="l">
-              <a:spcBef>
-                <a:spcPts val="0"/>
-              </a:spcBef>
-              <a:spcAft>
-                <a:spcPts val="0"/>
-              </a:spcAft>
-              <a:buNone/>
-            </a:pPr>
-            <a:r>
-              <a:t/>
-            </a:r>
-            <a:endParaRPr/>
-          </a:p>
-        </p:txBody>
-      </p:sp>
-      <p:sp>
-        <p:nvSpPr>
-          <p:cNvPr id="193" name="Google Shape;193;p10:notes"/>
+          <p:cNvPr id="191" name="Google Shape;191;p9:notes"/>
           <p:cNvSpPr/>
           <p:nvPr>
             <p:ph idx="2" type="sldImg"/>
@@ -1548,7 +1734,7 @@
   <p:cSld>
     <p:spTree>
       <p:nvGrpSpPr>
-        <p:cNvPr id="198" name="Shape 198"/>
+        <p:cNvPr id="199" name="Shape 199"/>
         <p:cNvGrpSpPr/>
         <p:nvPr/>
       </p:nvGrpSpPr>
@@ -1562,7 +1748,7 @@
       </p:grpSpPr>
       <p:sp>
         <p:nvSpPr>
-          <p:cNvPr id="199" name="Google Shape;199;g3b0d07ae252_3_0:notes"/>
+          <p:cNvPr id="200" name="Google Shape;200;p10:notes"/>
           <p:cNvSpPr txBox="1"/>
           <p:nvPr>
             <p:ph idx="1" type="body"/>
@@ -1601,7 +1787,7 @@
       </p:sp>
       <p:sp>
         <p:nvSpPr>
-          <p:cNvPr id="200" name="Google Shape;200;g3b0d07ae252_3_0:notes"/>
+          <p:cNvPr id="201" name="Google Shape;201;p10:notes"/>
           <p:cNvSpPr/>
           <p:nvPr>
             <p:ph idx="2" type="sldImg"/>
@@ -1610,7 +1796,7 @@
         <p:spPr>
           <a:xfrm>
             <a:off x="1143225" y="685800"/>
-            <a:ext cx="4572300" cy="3429000"/>
+            <a:ext cx="4572225" cy="3429000"/>
           </a:xfrm>
           <a:custGeom>
             <a:rect b="b" l="l" r="r" t="t"/>
@@ -1647,7 +1833,7 @@
   <p:cSld>
     <p:spTree>
       <p:nvGrpSpPr>
-        <p:cNvPr id="205" name="Shape 205"/>
+        <p:cNvPr id="206" name="Shape 206"/>
         <p:cNvGrpSpPr/>
         <p:nvPr/>
       </p:nvGrpSpPr>
@@ -1661,7 +1847,7 @@
       </p:grpSpPr>
       <p:sp>
         <p:nvSpPr>
-          <p:cNvPr id="206" name="Google Shape;206;g3b0d07ae252_2_20:notes"/>
+          <p:cNvPr id="207" name="Google Shape;207;g3b0d07ae252_3_0:notes"/>
           <p:cNvSpPr txBox="1"/>
           <p:nvPr>
             <p:ph idx="1" type="body"/>
@@ -1692,99 +1878,6 @@
               <a:buNone/>
             </a:pPr>
             <a:r>
-              <a:rPr lang="en-US"/>
-              <a:t>This implementation of the Weird Gadgets creates a remote mailbox system where messages can be read and written. There is a segmented implementation, where messages of arbitrary size can be sent one character at a time, and an unsegmented implementation, where messages less than some memory size are converted to raw bytes and stored for retrieval. Both pseudo programs make use of conditionals and read/write functions with both integer registers and binary foils. The segmented program also uses loops to iterate through each character of the message. </a:t>
-            </a:r>
-            <a:endParaRPr/>
-          </a:p>
-          <a:p>
-            <a:pPr indent="0" lvl="0" marL="0" rtl="0" algn="l">
-              <a:spcBef>
-                <a:spcPts val="0"/>
-              </a:spcBef>
-              <a:spcAft>
-                <a:spcPts val="0"/>
-              </a:spcAft>
-              <a:buNone/>
-            </a:pPr>
-            <a:r>
-              <a:t/>
-            </a:r>
-            <a:endParaRPr/>
-          </a:p>
-          <a:p>
-            <a:pPr indent="0" lvl="0" marL="0" rtl="0" algn="l">
-              <a:spcBef>
-                <a:spcPts val="0"/>
-              </a:spcBef>
-              <a:spcAft>
-                <a:spcPts val="0"/>
-              </a:spcAft>
-              <a:buNone/>
-            </a:pPr>
-            <a:r>
-              <a:rPr lang="en-US"/>
-              <a:t>The included screenshot shows one iteration of the segmented messaging system. One system starts by writing a character ASCII value to the specified integer register and changing the “unread message” coil to “On” (logically, “True”). The host checks to see if there is a message by reading the “unread message” coil and goes to read the associated message register if it is on. The character is output to the screen and the “unread message” coil is turned off to mark the message as read. This occurs for each letter in the message, terminating when there are no more characters left to send.</a:t>
-            </a:r>
-            <a:endParaRPr/>
-          </a:p>
-          <a:p>
-            <a:pPr indent="0" lvl="0" marL="0" rtl="0" algn="l">
-              <a:spcBef>
-                <a:spcPts val="0"/>
-              </a:spcBef>
-              <a:spcAft>
-                <a:spcPts val="0"/>
-              </a:spcAft>
-              <a:buNone/>
-            </a:pPr>
-            <a:r>
-              <a:t/>
-            </a:r>
-            <a:endParaRPr/>
-          </a:p>
-          <a:p>
-            <a:pPr indent="0" lvl="0" marL="0" rtl="0" algn="l">
-              <a:spcBef>
-                <a:spcPts val="0"/>
-              </a:spcBef>
-              <a:spcAft>
-                <a:spcPts val="0"/>
-              </a:spcAft>
-              <a:buNone/>
-            </a:pPr>
-            <a:r>
-              <a:rPr lang="en-US"/>
-              <a:t>These two programs demonstrate the flexibility of Weird Machines and Architectural Gadgets to create functionality outside of the intended set. </a:t>
-            </a:r>
-            <a:endParaRPr/>
-          </a:p>
-          <a:p>
-            <a:pPr indent="0" lvl="0" marL="0" rtl="0" algn="l">
-              <a:spcBef>
-                <a:spcPts val="0"/>
-              </a:spcBef>
-              <a:spcAft>
-                <a:spcPts val="0"/>
-              </a:spcAft>
-              <a:buNone/>
-            </a:pPr>
-            <a:r>
-              <a:t/>
-            </a:r>
-            <a:endParaRPr/>
-          </a:p>
-          <a:p>
-            <a:pPr indent="0" lvl="0" marL="0" rtl="0" algn="l">
-              <a:spcBef>
-                <a:spcPts val="0"/>
-              </a:spcBef>
-              <a:spcAft>
-                <a:spcPts val="0"/>
-              </a:spcAft>
-              <a:buNone/>
-            </a:pPr>
-            <a:r>
               <a:t/>
             </a:r>
             <a:endParaRPr/>
@@ -1793,7 +1886,7 @@
       </p:sp>
       <p:sp>
         <p:nvSpPr>
-          <p:cNvPr id="207" name="Google Shape;207;g3b0d07ae252_2_20:notes"/>
+          <p:cNvPr id="208" name="Google Shape;208;g3b0d07ae252_3_0:notes"/>
           <p:cNvSpPr/>
           <p:nvPr>
             <p:ph idx="2" type="sldImg"/>
@@ -1839,7 +1932,7 @@
   <p:cSld>
     <p:spTree>
       <p:nvGrpSpPr>
-        <p:cNvPr id="212" name="Shape 212"/>
+        <p:cNvPr id="213" name="Shape 213"/>
         <p:cNvGrpSpPr/>
         <p:nvPr/>
       </p:nvGrpSpPr>
@@ -1853,7 +1946,199 @@
       </p:grpSpPr>
       <p:sp>
         <p:nvSpPr>
-          <p:cNvPr id="213" name="Google Shape;213;g3b0d07ae252_2_10:notes"/>
+          <p:cNvPr id="214" name="Google Shape;214;g3b0d07ae252_2_20:notes"/>
+          <p:cNvSpPr txBox="1"/>
+          <p:nvPr>
+            <p:ph idx="1" type="body"/>
+          </p:nvPr>
+        </p:nvSpPr>
+        <p:spPr>
+          <a:xfrm>
+            <a:off x="685800" y="4343400"/>
+            <a:ext cx="5486400" cy="4114800"/>
+          </a:xfrm>
+          <a:prstGeom prst="rect">
+            <a:avLst/>
+          </a:prstGeom>
+        </p:spPr>
+        <p:txBody>
+          <a:bodyPr anchorCtr="0" anchor="t" bIns="91425" lIns="91425" spcFirstLastPara="1" rIns="91425" wrap="square" tIns="91425">
+            <a:noAutofit/>
+          </a:bodyPr>
+          <a:lstStyle/>
+          <a:p>
+            <a:pPr indent="0" lvl="0" marL="0" rtl="0" algn="l">
+              <a:spcBef>
+                <a:spcPts val="0"/>
+              </a:spcBef>
+              <a:spcAft>
+                <a:spcPts val="0"/>
+              </a:spcAft>
+              <a:buNone/>
+            </a:pPr>
+            <a:r>
+              <a:rPr lang="en-US"/>
+              <a:t>This implementation of the Weird Gadgets creates a remote mailbox system where messages can be read and written. There is a segmented implementation, where messages of arbitrary size can be sent one character at a time, and an unsegmented implementation, where messages less than some memory size are converted to raw bytes and stored for retrieval. Both pseudo programs make use of conditionals and read/write functions with both integer registers and binary foils. The segmented program also uses loops to iterate through each character of the message. </a:t>
+            </a:r>
+            <a:endParaRPr/>
+          </a:p>
+          <a:p>
+            <a:pPr indent="0" lvl="0" marL="0" rtl="0" algn="l">
+              <a:spcBef>
+                <a:spcPts val="0"/>
+              </a:spcBef>
+              <a:spcAft>
+                <a:spcPts val="0"/>
+              </a:spcAft>
+              <a:buNone/>
+            </a:pPr>
+            <a:r>
+              <a:t/>
+            </a:r>
+            <a:endParaRPr/>
+          </a:p>
+          <a:p>
+            <a:pPr indent="0" lvl="0" marL="0" rtl="0" algn="l">
+              <a:spcBef>
+                <a:spcPts val="0"/>
+              </a:spcBef>
+              <a:spcAft>
+                <a:spcPts val="0"/>
+              </a:spcAft>
+              <a:buNone/>
+            </a:pPr>
+            <a:r>
+              <a:rPr lang="en-US"/>
+              <a:t>The included screenshot shows one iteration of the segmented messaging system. One system starts by writing a character ASCII value to the specified integer register and changing the “unread message” coil to “On” (logically, “True”). The host checks to see if there is a message by reading the “unread message” coil and goes to read the associated message register if it is on. The character is output to the screen and the “unread message” coil is turned off to mark the message as read. This occurs for each letter in the message, terminating when there are no more characters left to send.</a:t>
+            </a:r>
+            <a:endParaRPr/>
+          </a:p>
+          <a:p>
+            <a:pPr indent="0" lvl="0" marL="0" rtl="0" algn="l">
+              <a:spcBef>
+                <a:spcPts val="0"/>
+              </a:spcBef>
+              <a:spcAft>
+                <a:spcPts val="0"/>
+              </a:spcAft>
+              <a:buNone/>
+            </a:pPr>
+            <a:r>
+              <a:t/>
+            </a:r>
+            <a:endParaRPr/>
+          </a:p>
+          <a:p>
+            <a:pPr indent="0" lvl="0" marL="0" rtl="0" algn="l">
+              <a:spcBef>
+                <a:spcPts val="0"/>
+              </a:spcBef>
+              <a:spcAft>
+                <a:spcPts val="0"/>
+              </a:spcAft>
+              <a:buNone/>
+            </a:pPr>
+            <a:r>
+              <a:rPr lang="en-US"/>
+              <a:t>These two programs demonstrate the flexibility of Weird Machines and Architectural Gadgets to create functionality outside of the intended set. </a:t>
+            </a:r>
+            <a:endParaRPr/>
+          </a:p>
+          <a:p>
+            <a:pPr indent="0" lvl="0" marL="0" rtl="0" algn="l">
+              <a:spcBef>
+                <a:spcPts val="0"/>
+              </a:spcBef>
+              <a:spcAft>
+                <a:spcPts val="0"/>
+              </a:spcAft>
+              <a:buNone/>
+            </a:pPr>
+            <a:r>
+              <a:t/>
+            </a:r>
+            <a:endParaRPr/>
+          </a:p>
+          <a:p>
+            <a:pPr indent="0" lvl="0" marL="0" rtl="0" algn="l">
+              <a:spcBef>
+                <a:spcPts val="0"/>
+              </a:spcBef>
+              <a:spcAft>
+                <a:spcPts val="0"/>
+              </a:spcAft>
+              <a:buNone/>
+            </a:pPr>
+            <a:r>
+              <a:t/>
+            </a:r>
+            <a:endParaRPr/>
+          </a:p>
+        </p:txBody>
+      </p:sp>
+      <p:sp>
+        <p:nvSpPr>
+          <p:cNvPr id="215" name="Google Shape;215;g3b0d07ae252_2_20:notes"/>
+          <p:cNvSpPr/>
+          <p:nvPr>
+            <p:ph idx="2" type="sldImg"/>
+          </p:nvPr>
+        </p:nvSpPr>
+        <p:spPr>
+          <a:xfrm>
+            <a:off x="1143225" y="685800"/>
+            <a:ext cx="4572300" cy="3429000"/>
+          </a:xfrm>
+          <a:custGeom>
+            <a:rect b="b" l="l" r="r" t="t"/>
+            <a:pathLst>
+              <a:path extrusionOk="0" h="120000" w="120000">
+                <a:moveTo>
+                  <a:pt x="0" y="0"/>
+                </a:moveTo>
+                <a:lnTo>
+                  <a:pt x="120000" y="0"/>
+                </a:lnTo>
+                <a:lnTo>
+                  <a:pt x="120000" y="120000"/>
+                </a:lnTo>
+                <a:lnTo>
+                  <a:pt x="0" y="120000"/>
+                </a:lnTo>
+                <a:close/>
+              </a:path>
+            </a:pathLst>
+          </a:custGeom>
+        </p:spPr>
+      </p:sp>
+    </p:spTree>
+  </p:cSld>
+  <p:clrMapOvr>
+    <a:masterClrMapping/>
+  </p:clrMapOvr>
+</p:notes>
+</file>
+
+<file path=ppt/notesSlides/notesSlide17.xml><?xml version="1.0" encoding="utf-8"?>
+<p:notes xmlns:a="http://schemas.openxmlformats.org/drawingml/2006/main" xmlns:r="http://schemas.openxmlformats.org/officeDocument/2006/relationships" xmlns:mc="http://schemas.openxmlformats.org/markup-compatibility/2006" xmlns:mv="urn:schemas-microsoft-com:mac:vml" xmlns:p="http://schemas.openxmlformats.org/presentationml/2006/main" xmlns:c="http://schemas.openxmlformats.org/drawingml/2006/chart" xmlns:dgm="http://schemas.openxmlformats.org/drawingml/2006/diagram" xmlns:o="urn:schemas-microsoft-com:office:office" xmlns:v="urn:schemas-microsoft-com:vml" xmlns:pvml="urn:schemas-microsoft-com:office:powerpoint" xmlns:com="http://schemas.openxmlformats.org/drawingml/2006/compatibility" xmlns:p14="http://schemas.microsoft.com/office/powerpoint/2010/main" xmlns:p15="http://schemas.microsoft.com/office/powerpoint/2012/main" xmlns:ahyp="http://schemas.microsoft.com/office/drawing/2018/hyperlinkcolor" showMasterPhAnim="0" showMasterSp="0">
+  <p:cSld>
+    <p:spTree>
+      <p:nvGrpSpPr>
+        <p:cNvPr id="220" name="Shape 220"/>
+        <p:cNvGrpSpPr/>
+        <p:nvPr/>
+      </p:nvGrpSpPr>
+      <p:grpSpPr>
+        <a:xfrm>
+          <a:off x="0" y="0"/>
+          <a:ext cx="0" cy="0"/>
+          <a:chOff x="0" y="0"/>
+          <a:chExt cx="0" cy="0"/>
+        </a:xfrm>
+      </p:grpSpPr>
+      <p:sp>
+        <p:nvSpPr>
+          <p:cNvPr id="221" name="Google Shape;221;g3b0d07ae252_2_10:notes"/>
           <p:cNvSpPr/>
           <p:nvPr>
             <p:ph idx="2" type="sldImg"/>
@@ -1888,7 +2173,7 @@
       </p:sp>
       <p:sp>
         <p:nvSpPr>
-          <p:cNvPr id="214" name="Google Shape;214;g3b0d07ae252_2_10:notes"/>
+          <p:cNvPr id="222" name="Google Shape;222;g3b0d07ae252_2_10:notes"/>
           <p:cNvSpPr txBox="1"/>
           <p:nvPr>
             <p:ph idx="1" type="body"/>
@@ -1981,12 +2266,12 @@
 </p:notes>
 </file>
 
-<file path=ppt/notesSlides/notesSlide17.xml><?xml version="1.0" encoding="utf-8"?>
+<file path=ppt/notesSlides/notesSlide18.xml><?xml version="1.0" encoding="utf-8"?>
 <p:notes xmlns:a="http://schemas.openxmlformats.org/drawingml/2006/main" xmlns:r="http://schemas.openxmlformats.org/officeDocument/2006/relationships" xmlns:mc="http://schemas.openxmlformats.org/markup-compatibility/2006" xmlns:mv="urn:schemas-microsoft-com:mac:vml" xmlns:p="http://schemas.openxmlformats.org/presentationml/2006/main" xmlns:c="http://schemas.openxmlformats.org/drawingml/2006/chart" xmlns:dgm="http://schemas.openxmlformats.org/drawingml/2006/diagram" xmlns:o="urn:schemas-microsoft-com:office:office" xmlns:v="urn:schemas-microsoft-com:vml" xmlns:pvml="urn:schemas-microsoft-com:office:powerpoint" xmlns:com="http://schemas.openxmlformats.org/drawingml/2006/compatibility" xmlns:p14="http://schemas.microsoft.com/office/powerpoint/2010/main" xmlns:p15="http://schemas.microsoft.com/office/powerpoint/2012/main" xmlns:ahyp="http://schemas.microsoft.com/office/drawing/2018/hyperlinkcolor" showMasterPhAnim="0" showMasterSp="0">
   <p:cSld>
     <p:spTree>
       <p:nvGrpSpPr>
-        <p:cNvPr id="222" name="Shape 222"/>
+        <p:cNvPr id="230" name="Shape 230"/>
         <p:cNvGrpSpPr/>
         <p:nvPr/>
       </p:nvGrpSpPr>
@@ -2000,7 +2285,7 @@
       </p:grpSpPr>
       <p:sp>
         <p:nvSpPr>
-          <p:cNvPr id="223" name="Google Shape;223;p11:notes"/>
+          <p:cNvPr id="231" name="Google Shape;231;p11:notes"/>
           <p:cNvSpPr txBox="1"/>
           <p:nvPr>
             <p:ph idx="1" type="body"/>
@@ -2039,144 +2324,7 @@
       </p:sp>
       <p:sp>
         <p:nvSpPr>
-          <p:cNvPr id="224" name="Google Shape;224;p11:notes"/>
-          <p:cNvSpPr/>
-          <p:nvPr>
-            <p:ph idx="2" type="sldImg"/>
-          </p:nvPr>
-        </p:nvSpPr>
-        <p:spPr>
-          <a:xfrm>
-            <a:off x="1143225" y="685800"/>
-            <a:ext cx="4572225" cy="3429000"/>
-          </a:xfrm>
-          <a:custGeom>
-            <a:rect b="b" l="l" r="r" t="t"/>
-            <a:pathLst>
-              <a:path extrusionOk="0" h="120000" w="120000">
-                <a:moveTo>
-                  <a:pt x="0" y="0"/>
-                </a:moveTo>
-                <a:lnTo>
-                  <a:pt x="120000" y="0"/>
-                </a:lnTo>
-                <a:lnTo>
-                  <a:pt x="120000" y="120000"/>
-                </a:lnTo>
-                <a:lnTo>
-                  <a:pt x="0" y="120000"/>
-                </a:lnTo>
-                <a:close/>
-              </a:path>
-            </a:pathLst>
-          </a:custGeom>
-        </p:spPr>
-      </p:sp>
-    </p:spTree>
-  </p:cSld>
-  <p:clrMapOvr>
-    <a:masterClrMapping/>
-  </p:clrMapOvr>
-</p:notes>
-</file>
-
-<file path=ppt/notesSlides/notesSlide18.xml><?xml version="1.0" encoding="utf-8"?>
-<p:notes xmlns:a="http://schemas.openxmlformats.org/drawingml/2006/main" xmlns:r="http://schemas.openxmlformats.org/officeDocument/2006/relationships" xmlns:mc="http://schemas.openxmlformats.org/markup-compatibility/2006" xmlns:mv="urn:schemas-microsoft-com:mac:vml" xmlns:p="http://schemas.openxmlformats.org/presentationml/2006/main" xmlns:c="http://schemas.openxmlformats.org/drawingml/2006/chart" xmlns:dgm="http://schemas.openxmlformats.org/drawingml/2006/diagram" xmlns:o="urn:schemas-microsoft-com:office:office" xmlns:v="urn:schemas-microsoft-com:vml" xmlns:pvml="urn:schemas-microsoft-com:office:powerpoint" xmlns:com="http://schemas.openxmlformats.org/drawingml/2006/compatibility" xmlns:p14="http://schemas.microsoft.com/office/powerpoint/2010/main" xmlns:p15="http://schemas.microsoft.com/office/powerpoint/2012/main" xmlns:ahyp="http://schemas.microsoft.com/office/drawing/2018/hyperlinkcolor" showMasterPhAnim="0" showMasterSp="0">
-  <p:cSld>
-    <p:spTree>
-      <p:nvGrpSpPr>
-        <p:cNvPr id="229" name="Shape 229"/>
-        <p:cNvGrpSpPr/>
-        <p:nvPr/>
-      </p:nvGrpSpPr>
-      <p:grpSpPr>
-        <a:xfrm>
-          <a:off x="0" y="0"/>
-          <a:ext cx="0" cy="0"/>
-          <a:chOff x="0" y="0"/>
-          <a:chExt cx="0" cy="0"/>
-        </a:xfrm>
-      </p:grpSpPr>
-      <p:sp>
-        <p:nvSpPr>
-          <p:cNvPr id="230" name="Google Shape;230;p12:notes"/>
-          <p:cNvSpPr txBox="1"/>
-          <p:nvPr>
-            <p:ph idx="1" type="body"/>
-          </p:nvPr>
-        </p:nvSpPr>
-        <p:spPr>
-          <a:xfrm>
-            <a:off x="685800" y="4343400"/>
-            <a:ext cx="5486400" cy="4114800"/>
-          </a:xfrm>
-          <a:prstGeom prst="rect">
-            <a:avLst/>
-          </a:prstGeom>
-        </p:spPr>
-        <p:txBody>
-          <a:bodyPr anchorCtr="0" anchor="t" bIns="91425" lIns="91425" spcFirstLastPara="1" rIns="91425" wrap="square" tIns="91425">
-            <a:noAutofit/>
-          </a:bodyPr>
-          <a:lstStyle/>
-          <a:p>
-            <a:pPr indent="0" lvl="0" marL="0" marR="381000" rtl="0" algn="l">
-              <a:lnSpc>
-                <a:spcPct val="200000"/>
-              </a:lnSpc>
-              <a:spcBef>
-                <a:spcPts val="1200"/>
-              </a:spcBef>
-              <a:spcAft>
-                <a:spcPts val="0"/>
-              </a:spcAft>
-              <a:buNone/>
-            </a:pPr>
-            <a:r>
-              <a:rPr lang="en-US"/>
-              <a:t>This work doesn’t end with the prototype gadgets we built. The next step is formalizing the research, reflecting on the tooling that enabled it, </a:t>
-            </a:r>
-            <a:endParaRPr/>
-          </a:p>
-          <a:p>
-            <a:pPr indent="0" lvl="0" marL="0" marR="381000" rtl="0" algn="l">
-              <a:lnSpc>
-                <a:spcPct val="200000"/>
-              </a:lnSpc>
-              <a:spcBef>
-                <a:spcPts val="1200"/>
-              </a:spcBef>
-              <a:spcAft>
-                <a:spcPts val="0"/>
-              </a:spcAft>
-              <a:buNone/>
-            </a:pPr>
-            <a:r>
-              <a:rPr lang="en-US"/>
-              <a:t>and exploring how LLMs could help scale weird-machine discovery across cyber physical systems such as our Wind Energy Testbed.</a:t>
-            </a:r>
-            <a:endParaRPr/>
-          </a:p>
-          <a:p>
-            <a:pPr indent="0" lvl="0" marL="0" rtl="0" algn="l">
-              <a:spcBef>
-                <a:spcPts val="1200"/>
-              </a:spcBef>
-              <a:spcAft>
-                <a:spcPts val="0"/>
-              </a:spcAft>
-              <a:buNone/>
-            </a:pPr>
-            <a:r>
-              <a:t/>
-            </a:r>
-            <a:endParaRPr/>
-          </a:p>
-        </p:txBody>
-      </p:sp>
-      <p:sp>
-        <p:nvSpPr>
-          <p:cNvPr id="231" name="Google Shape;231;p12:notes"/>
+          <p:cNvPr id="232" name="Google Shape;232;p11:notes"/>
           <p:cNvSpPr/>
           <p:nvPr>
             <p:ph idx="2" type="sldImg"/>
@@ -2222,7 +2370,7 @@
   <p:cSld>
     <p:spTree>
       <p:nvGrpSpPr>
-        <p:cNvPr id="235" name="Shape 235"/>
+        <p:cNvPr id="237" name="Shape 237"/>
         <p:cNvGrpSpPr/>
         <p:nvPr/>
       </p:nvGrpSpPr>
@@ -2236,7 +2384,7 @@
       </p:grpSpPr>
       <p:sp>
         <p:nvSpPr>
-          <p:cNvPr id="236" name="Google Shape;236;p13:notes"/>
+          <p:cNvPr id="238" name="Google Shape;238;p12:notes"/>
           <p:cNvSpPr txBox="1"/>
           <p:nvPr>
             <p:ph idx="1" type="body"/>
@@ -2257,395 +2405,63 @@
           </a:bodyPr>
           <a:lstStyle/>
           <a:p>
-            <a:pPr indent="0" lvl="0" marL="0" rtl="0" algn="l">
-              <a:spcBef>
-                <a:spcPts val="0"/>
-              </a:spcBef>
-              <a:spcAft>
-                <a:spcPts val="0"/>
-              </a:spcAft>
-              <a:buClr>
-                <a:schemeClr val="dk1"/>
-              </a:buClr>
-              <a:buSzPts val="1100"/>
-              <a:buFont typeface="Arial"/>
+            <a:pPr indent="0" lvl="0" marL="0" marR="381000" rtl="0" algn="l">
+              <a:lnSpc>
+                <a:spcPct val="200000"/>
+              </a:lnSpc>
+              <a:spcBef>
+                <a:spcPts val="1200"/>
+              </a:spcBef>
+              <a:spcAft>
+                <a:spcPts val="0"/>
+              </a:spcAft>
               <a:buNone/>
             </a:pPr>
             <a:r>
-              <a:rPr lang="en-US" sz="1200">
-                <a:solidFill>
-                  <a:schemeClr val="dk1"/>
-                </a:solidFill>
-                <a:latin typeface="Roboto"/>
-                <a:ea typeface="Roboto"/>
-                <a:cs typeface="Roboto"/>
-                <a:sym typeface="Roboto"/>
-              </a:rPr>
-              <a:t>A consortium LLM is essentially a team of specialized models plus a reasoning “conductor” that turns many opinions into one justified decision.​</a:t>
-            </a:r>
-            <a:endParaRPr sz="1200">
-              <a:solidFill>
-                <a:schemeClr val="dk1"/>
-              </a:solidFill>
-              <a:latin typeface="Roboto"/>
-              <a:ea typeface="Roboto"/>
-              <a:cs typeface="Roboto"/>
-              <a:sym typeface="Roboto"/>
-            </a:endParaRPr>
+              <a:rPr lang="en-US"/>
+              <a:t>This work doesn’t end with the prototype gadgets we built. The next step is formalizing the research, reflecting on the tooling that enabled it, </a:t>
+            </a:r>
+            <a:endParaRPr/>
+          </a:p>
+          <a:p>
+            <a:pPr indent="0" lvl="0" marL="0" marR="381000" rtl="0" algn="l">
+              <a:lnSpc>
+                <a:spcPct val="200000"/>
+              </a:lnSpc>
+              <a:spcBef>
+                <a:spcPts val="1200"/>
+              </a:spcBef>
+              <a:spcAft>
+                <a:spcPts val="0"/>
+              </a:spcAft>
+              <a:buNone/>
+            </a:pPr>
+            <a:r>
+              <a:rPr lang="en-US"/>
+              <a:t>and exploring how LLMs could help scale weird-machine discovery across cyber physical systems such as our Wind Energy Testbed.</a:t>
+            </a:r>
+            <a:endParaRPr/>
           </a:p>
           <a:p>
             <a:pPr indent="0" lvl="0" marL="0" rtl="0" algn="l">
               <a:spcBef>
-                <a:spcPts val="0"/>
-              </a:spcBef>
-              <a:spcAft>
-                <a:spcPts val="0"/>
-              </a:spcAft>
-              <a:buClr>
-                <a:schemeClr val="dk1"/>
-              </a:buClr>
-              <a:buSzPts val="1100"/>
-              <a:buFont typeface="Arial"/>
+                <a:spcPts val="1200"/>
+              </a:spcBef>
+              <a:spcAft>
+                <a:spcPts val="0"/>
+              </a:spcAft>
               <a:buNone/>
             </a:pPr>
             <a:r>
               <a:t/>
             </a:r>
-            <a:endParaRPr sz="1200">
-              <a:solidFill>
-                <a:schemeClr val="dk1"/>
-              </a:solidFill>
-              <a:latin typeface="Roboto"/>
-              <a:ea typeface="Roboto"/>
-              <a:cs typeface="Roboto"/>
-              <a:sym typeface="Roboto"/>
-            </a:endParaRPr>
-          </a:p>
-          <a:p>
-            <a:pPr indent="0" lvl="0" marL="0" rtl="0" algn="l">
-              <a:spcBef>
-                <a:spcPts val="0"/>
-              </a:spcBef>
-              <a:spcAft>
-                <a:spcPts val="0"/>
-              </a:spcAft>
-              <a:buClr>
-                <a:schemeClr val="dk1"/>
-              </a:buClr>
-              <a:buSzPts val="1100"/>
-              <a:buFont typeface="Arial"/>
-              <a:buNone/>
-            </a:pPr>
-            <a:r>
-              <a:rPr lang="en-US" sz="1200">
-                <a:solidFill>
-                  <a:schemeClr val="dk1"/>
-                </a:solidFill>
-                <a:latin typeface="Roboto"/>
-                <a:ea typeface="Roboto"/>
-                <a:cs typeface="Roboto"/>
-                <a:sym typeface="Roboto"/>
-              </a:rPr>
-              <a:t>Instead of relying on a single large language model to make important decisions, we can build a consortium: several smaller, specialized models that each look at the same input from a slightly different perspective. This ensemble mimics a team of experts in a case conference, where diversity of views leads to better, more reliable answers than any one expert working alone.​</a:t>
-            </a:r>
-            <a:endParaRPr sz="1200">
-              <a:solidFill>
-                <a:schemeClr val="dk1"/>
-              </a:solidFill>
-              <a:latin typeface="Roboto"/>
-              <a:ea typeface="Roboto"/>
-              <a:cs typeface="Roboto"/>
-              <a:sym typeface="Roboto"/>
-            </a:endParaRPr>
-          </a:p>
-          <a:p>
-            <a:pPr indent="0" lvl="0" marL="0" rtl="0" algn="l">
-              <a:spcBef>
-                <a:spcPts val="0"/>
-              </a:spcBef>
-              <a:spcAft>
-                <a:spcPts val="0"/>
-              </a:spcAft>
-              <a:buClr>
-                <a:schemeClr val="dk1"/>
-              </a:buClr>
-              <a:buSzPts val="1100"/>
-              <a:buFont typeface="Arial"/>
-              <a:buNone/>
-            </a:pPr>
-            <a:r>
-              <a:t/>
-            </a:r>
-            <a:endParaRPr sz="1200">
-              <a:solidFill>
-                <a:schemeClr val="dk1"/>
-              </a:solidFill>
-              <a:latin typeface="Roboto"/>
-              <a:ea typeface="Roboto"/>
-              <a:cs typeface="Roboto"/>
-              <a:sym typeface="Roboto"/>
-            </a:endParaRPr>
-          </a:p>
-          <a:p>
-            <a:pPr indent="0" lvl="0" marL="0" rtl="0" algn="l">
-              <a:spcBef>
-                <a:spcPts val="0"/>
-              </a:spcBef>
-              <a:spcAft>
-                <a:spcPts val="0"/>
-              </a:spcAft>
-              <a:buClr>
-                <a:schemeClr val="dk1"/>
-              </a:buClr>
-              <a:buSzPts val="1100"/>
-              <a:buFont typeface="Arial"/>
-              <a:buNone/>
-            </a:pPr>
-            <a:r>
-              <a:rPr lang="en-US" sz="1200">
-                <a:solidFill>
-                  <a:schemeClr val="dk1"/>
-                </a:solidFill>
-                <a:latin typeface="Roboto"/>
-                <a:ea typeface="Roboto"/>
-                <a:cs typeface="Roboto"/>
-                <a:sym typeface="Roboto"/>
-              </a:rPr>
-              <a:t>Each member of the consortium starts as a general‑purpose model, but then gets fine‑tuned on domain‑specific data and task‑specific output formats. In our case this is fine tuning the models on identifying weird gadgets based on system architecture documentation and descriptions. This is just like we did manually for our wind energy test bed. That fine‑tuning is what teaches a model to speak the local language of the domain.​</a:t>
-            </a:r>
-            <a:endParaRPr sz="1200">
-              <a:solidFill>
-                <a:schemeClr val="dk1"/>
-              </a:solidFill>
-              <a:latin typeface="Roboto"/>
-              <a:ea typeface="Roboto"/>
-              <a:cs typeface="Roboto"/>
-              <a:sym typeface="Roboto"/>
-            </a:endParaRPr>
-          </a:p>
-          <a:p>
-            <a:pPr indent="0" lvl="0" marL="0" rtl="0" algn="l">
-              <a:spcBef>
-                <a:spcPts val="0"/>
-              </a:spcBef>
-              <a:spcAft>
-                <a:spcPts val="0"/>
-              </a:spcAft>
-              <a:buClr>
-                <a:schemeClr val="dk1"/>
-              </a:buClr>
-              <a:buSzPts val="1100"/>
-              <a:buFont typeface="Arial"/>
-              <a:buNone/>
-            </a:pPr>
-            <a:r>
-              <a:t/>
-            </a:r>
-            <a:endParaRPr sz="1200">
-              <a:solidFill>
-                <a:schemeClr val="dk1"/>
-              </a:solidFill>
-              <a:latin typeface="Roboto"/>
-              <a:ea typeface="Roboto"/>
-              <a:cs typeface="Roboto"/>
-              <a:sym typeface="Roboto"/>
-            </a:endParaRPr>
-          </a:p>
-          <a:p>
-            <a:pPr indent="0" lvl="0" marL="0" rtl="0" algn="l">
-              <a:spcBef>
-                <a:spcPts val="0"/>
-              </a:spcBef>
-              <a:spcAft>
-                <a:spcPts val="0"/>
-              </a:spcAft>
-              <a:buClr>
-                <a:schemeClr val="dk1"/>
-              </a:buClr>
-              <a:buSzPts val="1100"/>
-              <a:buFont typeface="Arial"/>
-              <a:buNone/>
-            </a:pPr>
-            <a:r>
-              <a:rPr lang="en-US" sz="1200">
-                <a:solidFill>
-                  <a:schemeClr val="dk1"/>
-                </a:solidFill>
-                <a:latin typeface="Roboto"/>
-                <a:ea typeface="Roboto"/>
-                <a:cs typeface="Roboto"/>
-                <a:sym typeface="Roboto"/>
-              </a:rPr>
-              <a:t>On top of these models sits a reasoning LLM that acts as the orchestrator. It receives the individual outputs, compares them, detects agreement and disagreement, and then applies explicit step‑by‑step deliberation to synthesize a final answer with an accompanying rationale.​</a:t>
-            </a:r>
-            <a:endParaRPr sz="1200">
-              <a:solidFill>
-                <a:schemeClr val="dk1"/>
-              </a:solidFill>
-              <a:latin typeface="Roboto"/>
-              <a:ea typeface="Roboto"/>
-              <a:cs typeface="Roboto"/>
-              <a:sym typeface="Roboto"/>
-            </a:endParaRPr>
-          </a:p>
-          <a:p>
-            <a:pPr indent="0" lvl="0" marL="0" rtl="0" algn="l">
-              <a:spcBef>
-                <a:spcPts val="0"/>
-              </a:spcBef>
-              <a:spcAft>
-                <a:spcPts val="0"/>
-              </a:spcAft>
-              <a:buClr>
-                <a:schemeClr val="dk1"/>
-              </a:buClr>
-              <a:buSzPts val="1100"/>
-              <a:buFont typeface="Arial"/>
-              <a:buNone/>
-            </a:pPr>
-            <a:r>
-              <a:t/>
-            </a:r>
-            <a:endParaRPr sz="1200">
-              <a:solidFill>
-                <a:schemeClr val="dk1"/>
-              </a:solidFill>
-              <a:latin typeface="Roboto"/>
-              <a:ea typeface="Roboto"/>
-              <a:cs typeface="Roboto"/>
-              <a:sym typeface="Roboto"/>
-            </a:endParaRPr>
-          </a:p>
-          <a:p>
-            <a:pPr indent="0" lvl="0" marL="0" rtl="0" algn="l">
-              <a:spcBef>
-                <a:spcPts val="0"/>
-              </a:spcBef>
-              <a:spcAft>
-                <a:spcPts val="0"/>
-              </a:spcAft>
-              <a:buClr>
-                <a:schemeClr val="dk1"/>
-              </a:buClr>
-              <a:buSzPts val="1100"/>
-              <a:buFont typeface="Arial"/>
-              <a:buNone/>
-            </a:pPr>
-            <a:r>
-              <a:rPr lang="en-US" sz="1200">
-                <a:solidFill>
-                  <a:schemeClr val="dk1"/>
-                </a:solidFill>
-                <a:latin typeface="Roboto"/>
-                <a:ea typeface="Roboto"/>
-                <a:cs typeface="Roboto"/>
-                <a:sym typeface="Roboto"/>
-              </a:rPr>
-              <a:t>This reasoner is critical for three reasons. First, it turns raw diversity into structured consensus, improving accuracy and robustness over simple voting or averaging. Second, it makes the process more transparent: because it sees all intermediate outputs, it can explain why a particular conclusion was chosen and when the ensemble is uncertain. Third, it enables escalating to a human when disagreement stays high.​</a:t>
-            </a:r>
-            <a:endParaRPr sz="1200">
-              <a:solidFill>
-                <a:schemeClr val="dk1"/>
-              </a:solidFill>
-              <a:latin typeface="Roboto"/>
-              <a:ea typeface="Roboto"/>
-              <a:cs typeface="Roboto"/>
-              <a:sym typeface="Roboto"/>
-            </a:endParaRPr>
-          </a:p>
-          <a:p>
-            <a:pPr indent="0" lvl="0" marL="0" rtl="0" algn="l">
-              <a:spcBef>
-                <a:spcPts val="0"/>
-              </a:spcBef>
-              <a:spcAft>
-                <a:spcPts val="0"/>
-              </a:spcAft>
-              <a:buClr>
-                <a:schemeClr val="dk1"/>
-              </a:buClr>
-              <a:buSzPts val="1100"/>
-              <a:buFont typeface="Arial"/>
-              <a:buNone/>
-            </a:pPr>
-            <a:r>
-              <a:t/>
-            </a:r>
-            <a:endParaRPr sz="1200">
-              <a:solidFill>
-                <a:schemeClr val="dk1"/>
-              </a:solidFill>
-              <a:latin typeface="Roboto"/>
-              <a:ea typeface="Roboto"/>
-              <a:cs typeface="Roboto"/>
-              <a:sym typeface="Roboto"/>
-            </a:endParaRPr>
-          </a:p>
-          <a:p>
-            <a:pPr indent="0" lvl="0" marL="0" rtl="0" algn="l">
-              <a:spcBef>
-                <a:spcPts val="0"/>
-              </a:spcBef>
-              <a:spcAft>
-                <a:spcPts val="0"/>
-              </a:spcAft>
-              <a:buClr>
-                <a:schemeClr val="dk1"/>
-              </a:buClr>
-              <a:buSzPts val="1100"/>
-              <a:buFont typeface="Arial"/>
-              <a:buNone/>
-            </a:pPr>
-            <a:r>
-              <a:rPr lang="en-US" sz="1200">
-                <a:solidFill>
-                  <a:schemeClr val="dk1"/>
-                </a:solidFill>
-                <a:latin typeface="Roboto"/>
-                <a:ea typeface="Roboto"/>
-                <a:cs typeface="Roboto"/>
-                <a:sym typeface="Roboto"/>
-              </a:rPr>
-              <a:t>Detecting weird machine gadgets from architecture documentation and description decisions into structured outputs efficiently requires a consortium with targeted fine‑tuning and an explicit reasoning layer. These capabilities deliver more reliable, interpretable, and domain‑aligned results than a single monolithic model.</a:t>
-            </a:r>
-            <a:endParaRPr sz="1200">
-              <a:solidFill>
-                <a:schemeClr val="dk1"/>
-              </a:solidFill>
-              <a:latin typeface="Roboto"/>
-              <a:ea typeface="Roboto"/>
-              <a:cs typeface="Roboto"/>
-              <a:sym typeface="Roboto"/>
-            </a:endParaRPr>
-          </a:p>
-          <a:p>
-            <a:pPr indent="0" lvl="0" marL="0" rtl="0" algn="l">
-              <a:spcBef>
-                <a:spcPts val="0"/>
-              </a:spcBef>
-              <a:spcAft>
-                <a:spcPts val="0"/>
-              </a:spcAft>
-              <a:buNone/>
-            </a:pPr>
-            <a:r>
-              <a:t/>
-            </a:r>
-            <a:endParaRPr sz="1200">
-              <a:solidFill>
-                <a:schemeClr val="dk1"/>
-              </a:solidFill>
-              <a:latin typeface="Roboto"/>
-              <a:ea typeface="Roboto"/>
-              <a:cs typeface="Roboto"/>
-              <a:sym typeface="Roboto"/>
-            </a:endParaRPr>
+            <a:endParaRPr/>
           </a:p>
         </p:txBody>
       </p:sp>
       <p:sp>
         <p:nvSpPr>
-          <p:cNvPr id="237" name="Google Shape;237;p13:notes"/>
+          <p:cNvPr id="239" name="Google Shape;239;p12:notes"/>
           <p:cNvSpPr/>
           <p:nvPr>
             <p:ph idx="2" type="sldImg"/>
@@ -2818,6 +2634,475 @@
 </p:notes>
 </file>
 
+<file path=ppt/notesSlides/notesSlide20.xml><?xml version="1.0" encoding="utf-8"?>
+<p:notes xmlns:a="http://schemas.openxmlformats.org/drawingml/2006/main" xmlns:r="http://schemas.openxmlformats.org/officeDocument/2006/relationships" xmlns:mc="http://schemas.openxmlformats.org/markup-compatibility/2006" xmlns:mv="urn:schemas-microsoft-com:mac:vml" xmlns:p="http://schemas.openxmlformats.org/presentationml/2006/main" xmlns:c="http://schemas.openxmlformats.org/drawingml/2006/chart" xmlns:dgm="http://schemas.openxmlformats.org/drawingml/2006/diagram" xmlns:o="urn:schemas-microsoft-com:office:office" xmlns:v="urn:schemas-microsoft-com:vml" xmlns:pvml="urn:schemas-microsoft-com:office:powerpoint" xmlns:com="http://schemas.openxmlformats.org/drawingml/2006/compatibility" xmlns:p14="http://schemas.microsoft.com/office/powerpoint/2010/main" xmlns:p15="http://schemas.microsoft.com/office/powerpoint/2012/main" xmlns:ahyp="http://schemas.microsoft.com/office/drawing/2018/hyperlinkcolor" showMasterPhAnim="0" showMasterSp="0">
+  <p:cSld>
+    <p:spTree>
+      <p:nvGrpSpPr>
+        <p:cNvPr id="243" name="Shape 243"/>
+        <p:cNvGrpSpPr/>
+        <p:nvPr/>
+      </p:nvGrpSpPr>
+      <p:grpSpPr>
+        <a:xfrm>
+          <a:off x="0" y="0"/>
+          <a:ext cx="0" cy="0"/>
+          <a:chOff x="0" y="0"/>
+          <a:chExt cx="0" cy="0"/>
+        </a:xfrm>
+      </p:grpSpPr>
+      <p:sp>
+        <p:nvSpPr>
+          <p:cNvPr id="244" name="Google Shape;244;p13:notes"/>
+          <p:cNvSpPr txBox="1"/>
+          <p:nvPr>
+            <p:ph idx="1" type="body"/>
+          </p:nvPr>
+        </p:nvSpPr>
+        <p:spPr>
+          <a:xfrm>
+            <a:off x="685800" y="4343400"/>
+            <a:ext cx="5486400" cy="4114800"/>
+          </a:xfrm>
+          <a:prstGeom prst="rect">
+            <a:avLst/>
+          </a:prstGeom>
+        </p:spPr>
+        <p:txBody>
+          <a:bodyPr anchorCtr="0" anchor="t" bIns="91425" lIns="91425" spcFirstLastPara="1" rIns="91425" wrap="square" tIns="91425">
+            <a:noAutofit/>
+          </a:bodyPr>
+          <a:lstStyle/>
+          <a:p>
+            <a:pPr indent="0" lvl="0" marL="0" rtl="0" algn="l">
+              <a:spcBef>
+                <a:spcPts val="0"/>
+              </a:spcBef>
+              <a:spcAft>
+                <a:spcPts val="0"/>
+              </a:spcAft>
+              <a:buClr>
+                <a:schemeClr val="dk1"/>
+              </a:buClr>
+              <a:buSzPts val="1100"/>
+              <a:buFont typeface="Arial"/>
+              <a:buNone/>
+            </a:pPr>
+            <a:r>
+              <a:rPr lang="en-US" sz="1200">
+                <a:solidFill>
+                  <a:schemeClr val="dk1"/>
+                </a:solidFill>
+                <a:latin typeface="Roboto"/>
+                <a:ea typeface="Roboto"/>
+                <a:cs typeface="Roboto"/>
+                <a:sym typeface="Roboto"/>
+              </a:rPr>
+              <a:t>A consortium LLM is essentially a team of specialized models plus a reasoning “conductor” that turns many opinions into one justified decision.​</a:t>
+            </a:r>
+            <a:endParaRPr sz="1200">
+              <a:solidFill>
+                <a:schemeClr val="dk1"/>
+              </a:solidFill>
+              <a:latin typeface="Roboto"/>
+              <a:ea typeface="Roboto"/>
+              <a:cs typeface="Roboto"/>
+              <a:sym typeface="Roboto"/>
+            </a:endParaRPr>
+          </a:p>
+          <a:p>
+            <a:pPr indent="0" lvl="0" marL="0" rtl="0" algn="l">
+              <a:spcBef>
+                <a:spcPts val="0"/>
+              </a:spcBef>
+              <a:spcAft>
+                <a:spcPts val="0"/>
+              </a:spcAft>
+              <a:buClr>
+                <a:schemeClr val="dk1"/>
+              </a:buClr>
+              <a:buSzPts val="1100"/>
+              <a:buFont typeface="Arial"/>
+              <a:buNone/>
+            </a:pPr>
+            <a:r>
+              <a:t/>
+            </a:r>
+            <a:endParaRPr sz="1200">
+              <a:solidFill>
+                <a:schemeClr val="dk1"/>
+              </a:solidFill>
+              <a:latin typeface="Roboto"/>
+              <a:ea typeface="Roboto"/>
+              <a:cs typeface="Roboto"/>
+              <a:sym typeface="Roboto"/>
+            </a:endParaRPr>
+          </a:p>
+          <a:p>
+            <a:pPr indent="0" lvl="0" marL="0" rtl="0" algn="l">
+              <a:spcBef>
+                <a:spcPts val="0"/>
+              </a:spcBef>
+              <a:spcAft>
+                <a:spcPts val="0"/>
+              </a:spcAft>
+              <a:buClr>
+                <a:schemeClr val="dk1"/>
+              </a:buClr>
+              <a:buSzPts val="1100"/>
+              <a:buFont typeface="Arial"/>
+              <a:buNone/>
+            </a:pPr>
+            <a:r>
+              <a:rPr lang="en-US" sz="1200">
+                <a:solidFill>
+                  <a:schemeClr val="dk1"/>
+                </a:solidFill>
+                <a:latin typeface="Roboto"/>
+                <a:ea typeface="Roboto"/>
+                <a:cs typeface="Roboto"/>
+                <a:sym typeface="Roboto"/>
+              </a:rPr>
+              <a:t>Instead of relying on a single large language model to make important decisions, we can build a consortium: several smaller, specialized models that each look at the same input from a slightly different perspective. This ensemble mimics a team of experts in a case conference, where diversity of views leads to better, more reliable answers than any one expert working alone.​</a:t>
+            </a:r>
+            <a:endParaRPr sz="1200">
+              <a:solidFill>
+                <a:schemeClr val="dk1"/>
+              </a:solidFill>
+              <a:latin typeface="Roboto"/>
+              <a:ea typeface="Roboto"/>
+              <a:cs typeface="Roboto"/>
+              <a:sym typeface="Roboto"/>
+            </a:endParaRPr>
+          </a:p>
+          <a:p>
+            <a:pPr indent="0" lvl="0" marL="0" rtl="0" algn="l">
+              <a:spcBef>
+                <a:spcPts val="0"/>
+              </a:spcBef>
+              <a:spcAft>
+                <a:spcPts val="0"/>
+              </a:spcAft>
+              <a:buClr>
+                <a:schemeClr val="dk1"/>
+              </a:buClr>
+              <a:buSzPts val="1100"/>
+              <a:buFont typeface="Arial"/>
+              <a:buNone/>
+            </a:pPr>
+            <a:r>
+              <a:t/>
+            </a:r>
+            <a:endParaRPr sz="1200">
+              <a:solidFill>
+                <a:schemeClr val="dk1"/>
+              </a:solidFill>
+              <a:latin typeface="Roboto"/>
+              <a:ea typeface="Roboto"/>
+              <a:cs typeface="Roboto"/>
+              <a:sym typeface="Roboto"/>
+            </a:endParaRPr>
+          </a:p>
+          <a:p>
+            <a:pPr indent="0" lvl="0" marL="0" rtl="0" algn="l">
+              <a:spcBef>
+                <a:spcPts val="0"/>
+              </a:spcBef>
+              <a:spcAft>
+                <a:spcPts val="0"/>
+              </a:spcAft>
+              <a:buClr>
+                <a:schemeClr val="dk1"/>
+              </a:buClr>
+              <a:buSzPts val="1100"/>
+              <a:buFont typeface="Arial"/>
+              <a:buNone/>
+            </a:pPr>
+            <a:r>
+              <a:rPr lang="en-US" sz="1200">
+                <a:solidFill>
+                  <a:schemeClr val="dk1"/>
+                </a:solidFill>
+                <a:latin typeface="Roboto"/>
+                <a:ea typeface="Roboto"/>
+                <a:cs typeface="Roboto"/>
+                <a:sym typeface="Roboto"/>
+              </a:rPr>
+              <a:t>Each member of the consortium starts as a general‑purpose model, but then gets fine‑tuned on domain‑specific data and task‑specific output formats. In our case this is fine tuning the models on identifying weird gadgets based on system architecture documentation and descriptions. This is just like we did manually for our wind energy test bed. That fine‑tuning is what teaches a model to speak the local language of the domain.​</a:t>
+            </a:r>
+            <a:endParaRPr sz="1200">
+              <a:solidFill>
+                <a:schemeClr val="dk1"/>
+              </a:solidFill>
+              <a:latin typeface="Roboto"/>
+              <a:ea typeface="Roboto"/>
+              <a:cs typeface="Roboto"/>
+              <a:sym typeface="Roboto"/>
+            </a:endParaRPr>
+          </a:p>
+          <a:p>
+            <a:pPr indent="0" lvl="0" marL="0" rtl="0" algn="l">
+              <a:spcBef>
+                <a:spcPts val="0"/>
+              </a:spcBef>
+              <a:spcAft>
+                <a:spcPts val="0"/>
+              </a:spcAft>
+              <a:buClr>
+                <a:schemeClr val="dk1"/>
+              </a:buClr>
+              <a:buSzPts val="1100"/>
+              <a:buFont typeface="Arial"/>
+              <a:buNone/>
+            </a:pPr>
+            <a:r>
+              <a:t/>
+            </a:r>
+            <a:endParaRPr sz="1200">
+              <a:solidFill>
+                <a:schemeClr val="dk1"/>
+              </a:solidFill>
+              <a:latin typeface="Roboto"/>
+              <a:ea typeface="Roboto"/>
+              <a:cs typeface="Roboto"/>
+              <a:sym typeface="Roboto"/>
+            </a:endParaRPr>
+          </a:p>
+          <a:p>
+            <a:pPr indent="0" lvl="0" marL="0" rtl="0" algn="l">
+              <a:spcBef>
+                <a:spcPts val="0"/>
+              </a:spcBef>
+              <a:spcAft>
+                <a:spcPts val="0"/>
+              </a:spcAft>
+              <a:buClr>
+                <a:schemeClr val="dk1"/>
+              </a:buClr>
+              <a:buSzPts val="1100"/>
+              <a:buFont typeface="Arial"/>
+              <a:buNone/>
+            </a:pPr>
+            <a:r>
+              <a:rPr lang="en-US" sz="1200">
+                <a:solidFill>
+                  <a:schemeClr val="dk1"/>
+                </a:solidFill>
+                <a:latin typeface="Roboto"/>
+                <a:ea typeface="Roboto"/>
+                <a:cs typeface="Roboto"/>
+                <a:sym typeface="Roboto"/>
+              </a:rPr>
+              <a:t>On top of these models sits a reasoning LLM that acts as the orchestrator. It receives the individual outputs, compares them, detects agreement and disagreement, and then applies explicit step‑by‑step deliberation to synthesize a final answer with an accompanying rationale.​</a:t>
+            </a:r>
+            <a:endParaRPr sz="1200">
+              <a:solidFill>
+                <a:schemeClr val="dk1"/>
+              </a:solidFill>
+              <a:latin typeface="Roboto"/>
+              <a:ea typeface="Roboto"/>
+              <a:cs typeface="Roboto"/>
+              <a:sym typeface="Roboto"/>
+            </a:endParaRPr>
+          </a:p>
+          <a:p>
+            <a:pPr indent="0" lvl="0" marL="0" rtl="0" algn="l">
+              <a:spcBef>
+                <a:spcPts val="0"/>
+              </a:spcBef>
+              <a:spcAft>
+                <a:spcPts val="0"/>
+              </a:spcAft>
+              <a:buClr>
+                <a:schemeClr val="dk1"/>
+              </a:buClr>
+              <a:buSzPts val="1100"/>
+              <a:buFont typeface="Arial"/>
+              <a:buNone/>
+            </a:pPr>
+            <a:r>
+              <a:t/>
+            </a:r>
+            <a:endParaRPr sz="1200">
+              <a:solidFill>
+                <a:schemeClr val="dk1"/>
+              </a:solidFill>
+              <a:latin typeface="Roboto"/>
+              <a:ea typeface="Roboto"/>
+              <a:cs typeface="Roboto"/>
+              <a:sym typeface="Roboto"/>
+            </a:endParaRPr>
+          </a:p>
+          <a:p>
+            <a:pPr indent="0" lvl="0" marL="0" rtl="0" algn="l">
+              <a:spcBef>
+                <a:spcPts val="0"/>
+              </a:spcBef>
+              <a:spcAft>
+                <a:spcPts val="0"/>
+              </a:spcAft>
+              <a:buClr>
+                <a:schemeClr val="dk1"/>
+              </a:buClr>
+              <a:buSzPts val="1100"/>
+              <a:buFont typeface="Arial"/>
+              <a:buNone/>
+            </a:pPr>
+            <a:r>
+              <a:rPr lang="en-US" sz="1200">
+                <a:solidFill>
+                  <a:schemeClr val="dk1"/>
+                </a:solidFill>
+                <a:latin typeface="Roboto"/>
+                <a:ea typeface="Roboto"/>
+                <a:cs typeface="Roboto"/>
+                <a:sym typeface="Roboto"/>
+              </a:rPr>
+              <a:t>This reasoner is critical for three reasons. First, it turns raw diversity into structured consensus, improving accuracy and robustness over simple voting or averaging. Second, it makes the process more transparent: because it sees all intermediate outputs, it can explain why a particular conclusion was chosen and when the ensemble is uncertain. Third, it enables escalating to a human when disagreement stays high.​</a:t>
+            </a:r>
+            <a:endParaRPr sz="1200">
+              <a:solidFill>
+                <a:schemeClr val="dk1"/>
+              </a:solidFill>
+              <a:latin typeface="Roboto"/>
+              <a:ea typeface="Roboto"/>
+              <a:cs typeface="Roboto"/>
+              <a:sym typeface="Roboto"/>
+            </a:endParaRPr>
+          </a:p>
+          <a:p>
+            <a:pPr indent="0" lvl="0" marL="0" rtl="0" algn="l">
+              <a:spcBef>
+                <a:spcPts val="0"/>
+              </a:spcBef>
+              <a:spcAft>
+                <a:spcPts val="0"/>
+              </a:spcAft>
+              <a:buClr>
+                <a:schemeClr val="dk1"/>
+              </a:buClr>
+              <a:buSzPts val="1100"/>
+              <a:buFont typeface="Arial"/>
+              <a:buNone/>
+            </a:pPr>
+            <a:r>
+              <a:t/>
+            </a:r>
+            <a:endParaRPr sz="1200">
+              <a:solidFill>
+                <a:schemeClr val="dk1"/>
+              </a:solidFill>
+              <a:latin typeface="Roboto"/>
+              <a:ea typeface="Roboto"/>
+              <a:cs typeface="Roboto"/>
+              <a:sym typeface="Roboto"/>
+            </a:endParaRPr>
+          </a:p>
+          <a:p>
+            <a:pPr indent="0" lvl="0" marL="0" rtl="0" algn="l">
+              <a:spcBef>
+                <a:spcPts val="0"/>
+              </a:spcBef>
+              <a:spcAft>
+                <a:spcPts val="0"/>
+              </a:spcAft>
+              <a:buClr>
+                <a:schemeClr val="dk1"/>
+              </a:buClr>
+              <a:buSzPts val="1100"/>
+              <a:buFont typeface="Arial"/>
+              <a:buNone/>
+            </a:pPr>
+            <a:r>
+              <a:rPr lang="en-US" sz="1200">
+                <a:solidFill>
+                  <a:schemeClr val="dk1"/>
+                </a:solidFill>
+                <a:latin typeface="Roboto"/>
+                <a:ea typeface="Roboto"/>
+                <a:cs typeface="Roboto"/>
+                <a:sym typeface="Roboto"/>
+              </a:rPr>
+              <a:t>Detecting weird machine gadgets from architecture documentation and description decisions into structured outputs efficiently requires a consortium with targeted fine‑tuning and an explicit reasoning layer. These capabilities deliver more reliable, interpretable, and domain‑aligned results than a single monolithic model.</a:t>
+            </a:r>
+            <a:endParaRPr sz="1200">
+              <a:solidFill>
+                <a:schemeClr val="dk1"/>
+              </a:solidFill>
+              <a:latin typeface="Roboto"/>
+              <a:ea typeface="Roboto"/>
+              <a:cs typeface="Roboto"/>
+              <a:sym typeface="Roboto"/>
+            </a:endParaRPr>
+          </a:p>
+          <a:p>
+            <a:pPr indent="0" lvl="0" marL="0" rtl="0" algn="l">
+              <a:spcBef>
+                <a:spcPts val="0"/>
+              </a:spcBef>
+              <a:spcAft>
+                <a:spcPts val="0"/>
+              </a:spcAft>
+              <a:buNone/>
+            </a:pPr>
+            <a:r>
+              <a:t/>
+            </a:r>
+            <a:endParaRPr sz="1200">
+              <a:solidFill>
+                <a:schemeClr val="dk1"/>
+              </a:solidFill>
+              <a:latin typeface="Roboto"/>
+              <a:ea typeface="Roboto"/>
+              <a:cs typeface="Roboto"/>
+              <a:sym typeface="Roboto"/>
+            </a:endParaRPr>
+          </a:p>
+        </p:txBody>
+      </p:sp>
+      <p:sp>
+        <p:nvSpPr>
+          <p:cNvPr id="245" name="Google Shape;245;p13:notes"/>
+          <p:cNvSpPr/>
+          <p:nvPr>
+            <p:ph idx="2" type="sldImg"/>
+          </p:nvPr>
+        </p:nvSpPr>
+        <p:spPr>
+          <a:xfrm>
+            <a:off x="1143225" y="685800"/>
+            <a:ext cx="4572225" cy="3429000"/>
+          </a:xfrm>
+          <a:custGeom>
+            <a:rect b="b" l="l" r="r" t="t"/>
+            <a:pathLst>
+              <a:path extrusionOk="0" h="120000" w="120000">
+                <a:moveTo>
+                  <a:pt x="0" y="0"/>
+                </a:moveTo>
+                <a:lnTo>
+                  <a:pt x="120000" y="0"/>
+                </a:lnTo>
+                <a:lnTo>
+                  <a:pt x="120000" y="120000"/>
+                </a:lnTo>
+                <a:lnTo>
+                  <a:pt x="0" y="120000"/>
+                </a:lnTo>
+                <a:close/>
+              </a:path>
+            </a:pathLst>
+          </a:custGeom>
+        </p:spPr>
+      </p:sp>
+    </p:spTree>
+  </p:cSld>
+  <p:clrMapOvr>
+    <a:masterClrMapping/>
+  </p:clrMapOvr>
+</p:notes>
+</file>
+
 <file path=ppt/notesSlides/notesSlide3.xml><?xml version="1.0" encoding="utf-8"?>
 <p:notes xmlns:a="http://schemas.openxmlformats.org/drawingml/2006/main" xmlns:r="http://schemas.openxmlformats.org/officeDocument/2006/relationships" xmlns:mc="http://schemas.openxmlformats.org/markup-compatibility/2006" xmlns:mv="urn:schemas-microsoft-com:mac:vml" xmlns:p="http://schemas.openxmlformats.org/presentationml/2006/main" xmlns:c="http://schemas.openxmlformats.org/drawingml/2006/chart" xmlns:dgm="http://schemas.openxmlformats.org/drawingml/2006/diagram" xmlns:o="urn:schemas-microsoft-com:office:office" xmlns:v="urn:schemas-microsoft-com:vml" xmlns:pvml="urn:schemas-microsoft-com:office:powerpoint" xmlns:com="http://schemas.openxmlformats.org/drawingml/2006/compatibility" xmlns:p14="http://schemas.microsoft.com/office/powerpoint/2010/main" xmlns:p15="http://schemas.microsoft.com/office/powerpoint/2012/main" xmlns:ahyp="http://schemas.microsoft.com/office/drawing/2018/hyperlinkcolor" showMasterPhAnim="0" showMasterSp="0">
   <p:cSld>
@@ -3680,46 +3965,7 @@
       </p:grpSpPr>
       <p:sp>
         <p:nvSpPr>
-          <p:cNvPr id="153" name="Google Shape;153;p6:notes"/>
-          <p:cNvSpPr txBox="1"/>
-          <p:nvPr>
-            <p:ph idx="1" type="body"/>
-          </p:nvPr>
-        </p:nvSpPr>
-        <p:spPr>
-          <a:xfrm>
-            <a:off x="685800" y="4343400"/>
-            <a:ext cx="5486400" cy="4114800"/>
-          </a:xfrm>
-          <a:prstGeom prst="rect">
-            <a:avLst/>
-          </a:prstGeom>
-        </p:spPr>
-        <p:txBody>
-          <a:bodyPr anchorCtr="0" anchor="t" bIns="91425" lIns="91425" spcFirstLastPara="1" rIns="91425" wrap="square" tIns="91425">
-            <a:noAutofit/>
-          </a:bodyPr>
-          <a:lstStyle/>
-          <a:p>
-            <a:pPr indent="0" lvl="0" marL="0" rtl="0" algn="l">
-              <a:spcBef>
-                <a:spcPts val="0"/>
-              </a:spcBef>
-              <a:spcAft>
-                <a:spcPts val="0"/>
-              </a:spcAft>
-              <a:buNone/>
-            </a:pPr>
-            <a:r>
-              <a:t/>
-            </a:r>
-            <a:endParaRPr/>
-          </a:p>
-        </p:txBody>
-      </p:sp>
-      <p:sp>
-        <p:nvSpPr>
-          <p:cNvPr id="154" name="Google Shape;154;p6:notes"/>
+          <p:cNvPr id="153" name="Google Shape;153;g3a71945877e_0_0:notes"/>
           <p:cNvSpPr/>
           <p:nvPr>
             <p:ph idx="2" type="sldImg"/>
@@ -3728,7 +3974,7 @@
         <p:spPr>
           <a:xfrm>
             <a:off x="1143225" y="685800"/>
-            <a:ext cx="4572225" cy="3429000"/>
+            <a:ext cx="4572300" cy="3429000"/>
           </a:xfrm>
           <a:custGeom>
             <a:rect b="b" l="l" r="r" t="t"/>
@@ -3752,34 +3998,9 @@
           </a:custGeom>
         </p:spPr>
       </p:sp>
-    </p:spTree>
-  </p:cSld>
-  <p:clrMapOvr>
-    <a:masterClrMapping/>
-  </p:clrMapOvr>
-</p:notes>
-</file>
-
-<file path=ppt/notesSlides/notesSlide9.xml><?xml version="1.0" encoding="utf-8"?>
-<p:notes xmlns:a="http://schemas.openxmlformats.org/drawingml/2006/main" xmlns:r="http://schemas.openxmlformats.org/officeDocument/2006/relationships" xmlns:mc="http://schemas.openxmlformats.org/markup-compatibility/2006" xmlns:mv="urn:schemas-microsoft-com:mac:vml" xmlns:p="http://schemas.openxmlformats.org/presentationml/2006/main" xmlns:c="http://schemas.openxmlformats.org/drawingml/2006/chart" xmlns:dgm="http://schemas.openxmlformats.org/drawingml/2006/diagram" xmlns:o="urn:schemas-microsoft-com:office:office" xmlns:v="urn:schemas-microsoft-com:vml" xmlns:pvml="urn:schemas-microsoft-com:office:powerpoint" xmlns:com="http://schemas.openxmlformats.org/drawingml/2006/compatibility" xmlns:p14="http://schemas.microsoft.com/office/powerpoint/2010/main" xmlns:p15="http://schemas.microsoft.com/office/powerpoint/2012/main" xmlns:ahyp="http://schemas.microsoft.com/office/drawing/2018/hyperlinkcolor" showMasterPhAnim="0" showMasterSp="0">
-  <p:cSld>
-    <p:spTree>
-      <p:nvGrpSpPr>
-        <p:cNvPr id="161" name="Shape 161"/>
-        <p:cNvGrpSpPr/>
-        <p:nvPr/>
-      </p:nvGrpSpPr>
-      <p:grpSpPr>
-        <a:xfrm>
-          <a:off x="0" y="0"/>
-          <a:ext cx="0" cy="0"/>
-          <a:chOff x="0" y="0"/>
-          <a:chExt cx="0" cy="0"/>
-        </a:xfrm>
-      </p:grpSpPr>
       <p:sp>
         <p:nvSpPr>
-          <p:cNvPr id="162" name="Google Shape;162;p7:notes"/>
+          <p:cNvPr id="154" name="Google Shape;154;g3a71945877e_0_0:notes"/>
           <p:cNvSpPr txBox="1"/>
           <p:nvPr>
             <p:ph idx="1" type="body"/>
@@ -3801,6 +4022,9 @@
           <a:lstStyle/>
           <a:p>
             <a:pPr indent="0" lvl="0" marL="0" rtl="0" algn="l">
+              <a:lnSpc>
+                <a:spcPct val="115000"/>
+              </a:lnSpc>
               <a:spcBef>
                 <a:spcPts val="0"/>
               </a:spcBef>
@@ -3815,35 +4039,69 @@
               <a:buNone/>
             </a:pPr>
             <a:r>
-              <a:rPr lang="en-US"/>
-              <a:t>The wind energy test bed is built as a scaled-down wind farm that connects physical turbines, industrial controllers, and a SCADA system into a single cyber‑physical environment. At a high level, the slide shows how device‑level control, field networks, secure gateways, and the Rapid SCADA server fit together into that architecture.​</a:t>
-            </a:r>
-            <a:endParaRPr/>
+              <a:rPr lang="en-US" sz="1200">
+                <a:solidFill>
+                  <a:schemeClr val="dk1"/>
+                </a:solidFill>
+                <a:latin typeface="Roboto"/>
+                <a:ea typeface="Roboto"/>
+                <a:cs typeface="Roboto"/>
+                <a:sym typeface="Roboto"/>
+              </a:rPr>
+              <a:t>A weird machine gadget is just a set of pieces in a system that were never meant to be a programming language, but that you can still “wire together” to make the system follow your instructions. Think of it as finding Lego bricks hidden inside something that was supposed to be finished and fixed.</a:t>
+            </a:r>
+            <a:endParaRPr sz="1200">
+              <a:solidFill>
+                <a:schemeClr val="dk1"/>
+              </a:solidFill>
+              <a:latin typeface="Roboto"/>
+              <a:ea typeface="Roboto"/>
+              <a:cs typeface="Roboto"/>
+              <a:sym typeface="Roboto"/>
+            </a:endParaRPr>
           </a:p>
           <a:p>
             <a:pPr indent="0" lvl="0" marL="0" rtl="0" algn="l">
-              <a:spcBef>
-                <a:spcPts val="0"/>
-              </a:spcBef>
-              <a:spcAft>
-                <a:spcPts val="0"/>
-              </a:spcAft>
-              <a:buClr>
-                <a:schemeClr val="dk1"/>
-              </a:buClr>
-              <a:buSzPts val="1100"/>
-              <a:buFont typeface="Arial"/>
+              <a:lnSpc>
+                <a:spcPct val="115000"/>
+              </a:lnSpc>
+              <a:spcBef>
+                <a:spcPts val="1200"/>
+              </a:spcBef>
+              <a:spcAft>
+                <a:spcPts val="0"/>
+              </a:spcAft>
               <a:buNone/>
             </a:pPr>
             <a:r>
-              <a:t/>
-            </a:r>
-            <a:endParaRPr/>
+              <a:rPr lang="en-US" sz="1200">
+                <a:solidFill>
+                  <a:schemeClr val="dk1"/>
+                </a:solidFill>
+                <a:latin typeface="Roboto"/>
+                <a:ea typeface="Roboto"/>
+                <a:cs typeface="Roboto"/>
+                <a:sym typeface="Roboto"/>
+              </a:rPr>
+              <a:t>In the video game world, a famous example showed up in Final Fantasy VII. Players discovered that by performing a particular sequence of actions around saving, loading, or exiting, the game would write inconsistent state to disk and then reload it as if the same item existed in two places. Players ended up with duplicate high-value gear or endgame items much earlier than intended, effectively “programming” the game into giving them extra items without touching the code directly</a:t>
+            </a:r>
+            <a:endParaRPr sz="1200">
+              <a:solidFill>
+                <a:schemeClr val="dk1"/>
+              </a:solidFill>
+              <a:latin typeface="Roboto"/>
+              <a:ea typeface="Roboto"/>
+              <a:cs typeface="Roboto"/>
+              <a:sym typeface="Roboto"/>
+            </a:endParaRPr>
           </a:p>
           <a:p>
             <a:pPr indent="0" lvl="0" marL="0" rtl="0" algn="l">
-              <a:spcBef>
-                <a:spcPts val="0"/>
+              <a:lnSpc>
+                <a:spcPct val="115000"/>
+              </a:lnSpc>
+              <a:spcBef>
+                <a:spcPts val="1200"/>
               </a:spcBef>
               <a:spcAft>
                 <a:spcPts val="0"/>
@@ -3856,24 +4114,35 @@
               <a:buNone/>
             </a:pPr>
             <a:r>
-              <a:rPr lang="en-US"/>
-              <a:t>At the edge, scaled and emulated wind turbines are instrumented with motors and sensors, then controlled by a mix of industrial PLCs and Raspberry Pi units. These controllers handle local logic such as RPM limits and shutdown routines, and expose their data and commands over industrial protocols like Modbus TCP and other vendor‑specific fieldbuses.​</a:t>
-            </a:r>
-            <a:endParaRPr/>
+              <a:rPr lang="en-US" sz="1200">
+                <a:solidFill>
+                  <a:schemeClr val="dk1"/>
+                </a:solidFill>
+                <a:latin typeface="Roboto"/>
+                <a:ea typeface="Roboto"/>
+                <a:cs typeface="Roboto"/>
+                <a:sym typeface="Roboto"/>
+              </a:rPr>
+              <a:t>So the save file, the game’s loader, and the console’s memory layout together form a gadget: controllable pieces that, when combined carefully, behave like a little unintended program. The designers never meant for save files to be code, but attackers turned them into exactly that.</a:t>
+            </a:r>
+            <a:endParaRPr sz="1200">
+              <a:solidFill>
+                <a:schemeClr val="dk1"/>
+              </a:solidFill>
+              <a:latin typeface="Roboto"/>
+              <a:ea typeface="Roboto"/>
+              <a:cs typeface="Roboto"/>
+              <a:sym typeface="Roboto"/>
+            </a:endParaRPr>
           </a:p>
           <a:p>
             <a:pPr indent="0" lvl="0" marL="0" rtl="0" algn="l">
               <a:spcBef>
-                <a:spcPts val="0"/>
-              </a:spcBef>
-              <a:spcAft>
-                <a:spcPts val="0"/>
-              </a:spcAft>
-              <a:buClr>
-                <a:schemeClr val="dk1"/>
-              </a:buClr>
-              <a:buSzPts val="1100"/>
-              <a:buFont typeface="Arial"/>
+                <a:spcPts val="600"/>
+              </a:spcBef>
+              <a:spcAft>
+                <a:spcPts val="0"/>
+              </a:spcAft>
               <a:buNone/>
             </a:pPr>
             <a:r>
@@ -3881,109 +4150,55 @@
             </a:r>
             <a:endParaRPr/>
           </a:p>
-          <a:p>
-            <a:pPr indent="0" lvl="0" marL="0" rtl="0" algn="l">
-              <a:spcBef>
-                <a:spcPts val="0"/>
-              </a:spcBef>
-              <a:spcAft>
-                <a:spcPts val="0"/>
-              </a:spcAft>
-              <a:buClr>
-                <a:schemeClr val="dk1"/>
-              </a:buClr>
-              <a:buSzPts val="1100"/>
-              <a:buFont typeface="Arial"/>
-              <a:buNone/>
-            </a:pPr>
-            <a:r>
-              <a:rPr lang="en-US"/>
-              <a:t>The PLCs and emulated PLCs connect over Ethernet to the test bed network, where traffic is segmented and routed toward the SCADA environment. A Python‑based proxy with certificates and credentials sits in the path of Modbus TCP, authenticating devices and only forwarding traffic for nodes that prove their identity. This effectively creates a secure Modbus gateway in front of the SCADA server.​</a:t>
-            </a:r>
-            <a:endParaRPr/>
-          </a:p>
-          <a:p>
-            <a:pPr indent="0" lvl="0" marL="0" rtl="0" algn="l">
-              <a:spcBef>
-                <a:spcPts val="0"/>
-              </a:spcBef>
-              <a:spcAft>
-                <a:spcPts val="0"/>
-              </a:spcAft>
-              <a:buClr>
-                <a:schemeClr val="dk1"/>
-              </a:buClr>
-              <a:buSzPts val="1100"/>
-              <a:buFont typeface="Arial"/>
-              <a:buNone/>
-            </a:pPr>
-            <a:r>
-              <a:t/>
-            </a:r>
-            <a:endParaRPr/>
-          </a:p>
-          <a:p>
-            <a:pPr indent="0" lvl="0" marL="0" rtl="0" algn="l">
-              <a:spcBef>
-                <a:spcPts val="0"/>
-              </a:spcBef>
-              <a:spcAft>
-                <a:spcPts val="0"/>
-              </a:spcAft>
-              <a:buClr>
-                <a:schemeClr val="dk1"/>
-              </a:buClr>
-              <a:buSzPts val="1100"/>
-              <a:buFont typeface="Arial"/>
-              <a:buNone/>
-            </a:pPr>
-            <a:r>
-              <a:rPr lang="en-US"/>
-              <a:t>The Rapid SCADA server is configured with multiple communication lines, simultaneously polling and controlling devices using Modbus and a REST API. These lines connect to PLCs, simulation servers, and an ambient weather station, with each line mapped into channels, devices, and logs.</a:t>
-            </a:r>
-            <a:endParaRPr/>
-          </a:p>
-          <a:p>
-            <a:pPr indent="0" lvl="0" marL="0" rtl="0" algn="l">
-              <a:spcBef>
-                <a:spcPts val="0"/>
-              </a:spcBef>
-              <a:spcAft>
-                <a:spcPts val="0"/>
-              </a:spcAft>
-              <a:buClr>
-                <a:schemeClr val="dk1"/>
-              </a:buClr>
-              <a:buSzPts val="1100"/>
-              <a:buFont typeface="Arial"/>
-              <a:buNone/>
-            </a:pPr>
-            <a:r>
-              <a:t/>
-            </a:r>
-            <a:endParaRPr/>
-          </a:p>
-          <a:p>
-            <a:pPr indent="0" lvl="0" marL="0" rtl="0" algn="l">
-              <a:spcBef>
-                <a:spcPts val="0"/>
-              </a:spcBef>
-              <a:spcAft>
-                <a:spcPts val="0"/>
-              </a:spcAft>
-              <a:buClr>
-                <a:schemeClr val="dk1"/>
-              </a:buClr>
-              <a:buSzPts val="1100"/>
-              <a:buFont typeface="Arial"/>
-              <a:buNone/>
-            </a:pPr>
-            <a:r>
-              <a:rPr lang="en-US"/>
-              <a:t>Operators interact with the system through Rapid SCADA’s web‑based interface, which presents turbine status, weather measurements, control commands, and alarms in dashboards. This architecture allows experiments that closely mirror how a real wind farm’s supervisory control and cybersecurity stack would be organized.</a:t>
-            </a:r>
-            <a:endParaRPr/>
-          </a:p>
+        </p:txBody>
+      </p:sp>
+    </p:spTree>
+  </p:cSld>
+  <p:clrMapOvr>
+    <a:masterClrMapping/>
+  </p:clrMapOvr>
+</p:notes>
+</file>
+
+<file path=ppt/notesSlides/notesSlide9.xml><?xml version="1.0" encoding="utf-8"?>
+<p:notes xmlns:a="http://schemas.openxmlformats.org/drawingml/2006/main" xmlns:r="http://schemas.openxmlformats.org/officeDocument/2006/relationships" xmlns:mc="http://schemas.openxmlformats.org/markup-compatibility/2006" xmlns:mv="urn:schemas-microsoft-com:mac:vml" xmlns:p="http://schemas.openxmlformats.org/presentationml/2006/main" xmlns:c="http://schemas.openxmlformats.org/drawingml/2006/chart" xmlns:dgm="http://schemas.openxmlformats.org/drawingml/2006/diagram" xmlns:o="urn:schemas-microsoft-com:office:office" xmlns:v="urn:schemas-microsoft-com:vml" xmlns:pvml="urn:schemas-microsoft-com:office:powerpoint" xmlns:com="http://schemas.openxmlformats.org/drawingml/2006/compatibility" xmlns:p14="http://schemas.microsoft.com/office/powerpoint/2010/main" xmlns:p15="http://schemas.microsoft.com/office/powerpoint/2012/main" xmlns:ahyp="http://schemas.microsoft.com/office/drawing/2018/hyperlinkcolor" showMasterPhAnim="0" showMasterSp="0">
+  <p:cSld>
+    <p:spTree>
+      <p:nvGrpSpPr>
+        <p:cNvPr id="160" name="Shape 160"/>
+        <p:cNvGrpSpPr/>
+        <p:nvPr/>
+      </p:nvGrpSpPr>
+      <p:grpSpPr>
+        <a:xfrm>
+          <a:off x="0" y="0"/>
+          <a:ext cx="0" cy="0"/>
+          <a:chOff x="0" y="0"/>
+          <a:chExt cx="0" cy="0"/>
+        </a:xfrm>
+      </p:grpSpPr>
+      <p:sp>
+        <p:nvSpPr>
+          <p:cNvPr id="161" name="Google Shape;161;p6:notes"/>
+          <p:cNvSpPr txBox="1"/>
+          <p:nvPr>
+            <p:ph idx="1" type="body"/>
+          </p:nvPr>
+        </p:nvSpPr>
+        <p:spPr>
+          <a:xfrm>
+            <a:off x="685800" y="4343400"/>
+            <a:ext cx="5486400" cy="4114800"/>
+          </a:xfrm>
+          <a:prstGeom prst="rect">
+            <a:avLst/>
+          </a:prstGeom>
+        </p:spPr>
+        <p:txBody>
+          <a:bodyPr anchorCtr="0" anchor="t" bIns="91425" lIns="91425" spcFirstLastPara="1" rIns="91425" wrap="square" tIns="91425">
+            <a:noAutofit/>
+          </a:bodyPr>
+          <a:lstStyle/>
           <a:p>
             <a:pPr indent="0" lvl="0" marL="0" rtl="0" algn="l">
               <a:spcBef>
@@ -4003,7 +4218,7 @@
       </p:sp>
       <p:sp>
         <p:nvSpPr>
-          <p:cNvPr id="163" name="Google Shape;163;p7:notes"/>
+          <p:cNvPr id="162" name="Google Shape;162;p6:notes"/>
           <p:cNvSpPr/>
           <p:nvPr>
             <p:ph idx="2" type="sldImg"/>
@@ -17173,7 +17388,7 @@
   <p:cSld>
     <p:spTree>
       <p:nvGrpSpPr>
-        <p:cNvPr id="170" name="Shape 170"/>
+        <p:cNvPr id="172" name="Shape 172"/>
         <p:cNvGrpSpPr/>
         <p:nvPr/>
       </p:nvGrpSpPr>
@@ -17187,7 +17402,112 @@
       </p:grpSpPr>
       <p:sp>
         <p:nvSpPr>
-          <p:cNvPr id="171" name="Google Shape;171;g3b0d07ae252_9_2"/>
+          <p:cNvPr id="173" name="Google Shape;173;p7"/>
+          <p:cNvSpPr txBox="1"/>
+          <p:nvPr>
+            <p:ph type="title"/>
+          </p:nvPr>
+        </p:nvSpPr>
+        <p:spPr>
+          <a:xfrm>
+            <a:off x="521208" y="978408"/>
+            <a:ext cx="11155680" cy="1463040"/>
+          </a:xfrm>
+          <a:prstGeom prst="rect">
+            <a:avLst/>
+          </a:prstGeom>
+          <a:noFill/>
+          <a:ln>
+            <a:noFill/>
+          </a:ln>
+        </p:spPr>
+        <p:txBody>
+          <a:bodyPr anchorCtr="0" anchor="t" bIns="45700" lIns="91425" spcFirstLastPara="1" rIns="91425" wrap="square" tIns="45700">
+            <a:normAutofit/>
+          </a:bodyPr>
+          <a:lstStyle/>
+          <a:p>
+            <a:pPr indent="0" lvl="0" marL="0" rtl="0" algn="l">
+              <a:lnSpc>
+                <a:spcPct val="100000"/>
+              </a:lnSpc>
+              <a:spcBef>
+                <a:spcPts val="0"/>
+              </a:spcBef>
+              <a:spcAft>
+                <a:spcPts val="0"/>
+              </a:spcAft>
+              <a:buClr>
+                <a:schemeClr val="dk1"/>
+              </a:buClr>
+              <a:buSzPts val="4400"/>
+              <a:buFont typeface="Arial"/>
+              <a:buNone/>
+            </a:pPr>
+            <a:r>
+              <a:rPr lang="en-US"/>
+              <a:t>Our Wind Energy Testbed</a:t>
+            </a:r>
+            <a:endParaRPr/>
+          </a:p>
+        </p:txBody>
+      </p:sp>
+      <p:pic>
+        <p:nvPicPr>
+          <p:cNvPr id="174" name="Google Shape;174;p7"/>
+          <p:cNvPicPr preferRelativeResize="0"/>
+          <p:nvPr/>
+        </p:nvPicPr>
+        <p:blipFill>
+          <a:blip r:embed="rId3">
+            <a:alphaModFix/>
+          </a:blip>
+          <a:stretch>
+            <a:fillRect/>
+          </a:stretch>
+        </p:blipFill>
+        <p:spPr>
+          <a:xfrm>
+            <a:off x="100325" y="1708400"/>
+            <a:ext cx="12192000" cy="5024438"/>
+          </a:xfrm>
+          <a:prstGeom prst="rect">
+            <a:avLst/>
+          </a:prstGeom>
+          <a:noFill/>
+          <a:ln>
+            <a:noFill/>
+          </a:ln>
+        </p:spPr>
+      </p:pic>
+    </p:spTree>
+  </p:cSld>
+  <p:clrMapOvr>
+    <a:masterClrMapping/>
+  </p:clrMapOvr>
+</p:sld>
+</file>
+
+<file path=ppt/slides/slide11.xml><?xml version="1.0" encoding="utf-8"?>
+<p:sld xmlns:a="http://schemas.openxmlformats.org/drawingml/2006/main" xmlns:r="http://schemas.openxmlformats.org/officeDocument/2006/relationships" xmlns:mc="http://schemas.openxmlformats.org/markup-compatibility/2006" xmlns:mv="urn:schemas-microsoft-com:mac:vml" xmlns:p="http://schemas.openxmlformats.org/presentationml/2006/main" xmlns:c="http://schemas.openxmlformats.org/drawingml/2006/chart" xmlns:dgm="http://schemas.openxmlformats.org/drawingml/2006/diagram" xmlns:o="urn:schemas-microsoft-com:office:office" xmlns:v="urn:schemas-microsoft-com:vml" xmlns:pvml="urn:schemas-microsoft-com:office:powerpoint" xmlns:com="http://schemas.openxmlformats.org/drawingml/2006/compatibility" xmlns:p14="http://schemas.microsoft.com/office/powerpoint/2010/main" xmlns:p15="http://schemas.microsoft.com/office/powerpoint/2012/main" xmlns:ahyp="http://schemas.microsoft.com/office/drawing/2018/hyperlinkcolor">
+  <p:cSld>
+    <p:spTree>
+      <p:nvGrpSpPr>
+        <p:cNvPr id="178" name="Shape 178"/>
+        <p:cNvGrpSpPr/>
+        <p:nvPr/>
+      </p:nvGrpSpPr>
+      <p:grpSpPr>
+        <a:xfrm>
+          <a:off x="0" y="0"/>
+          <a:ext cx="0" cy="0"/>
+          <a:chOff x="0" y="0"/>
+          <a:chExt cx="0" cy="0"/>
+        </a:xfrm>
+      </p:grpSpPr>
+      <p:sp>
+        <p:nvSpPr>
+          <p:cNvPr id="179" name="Google Shape;179;g3b0d07ae252_9_2"/>
           <p:cNvSpPr txBox="1"/>
           <p:nvPr>
             <p:ph type="title"/>
@@ -17239,7 +17559,7 @@
       </p:sp>
       <p:sp>
         <p:nvSpPr>
-          <p:cNvPr id="172" name="Google Shape;172;g3b0d07ae252_9_2"/>
+          <p:cNvPr id="180" name="Google Shape;180;g3b0d07ae252_9_2"/>
           <p:cNvSpPr txBox="1"/>
           <p:nvPr>
             <p:ph idx="1" type="body"/>
@@ -17396,7 +17716,7 @@
       </p:sp>
       <p:pic>
         <p:nvPicPr>
-          <p:cNvPr id="173" name="Google Shape;173;g3b0d07ae252_9_2"/>
+          <p:cNvPr id="181" name="Google Shape;181;g3b0d07ae252_9_2"/>
           <p:cNvPicPr preferRelativeResize="0"/>
           <p:nvPr/>
         </p:nvPicPr>
@@ -17430,12 +17750,12 @@
 </p:sld>
 </file>
 
-<file path=ppt/slides/slide11.xml><?xml version="1.0" encoding="utf-8"?>
+<file path=ppt/slides/slide12.xml><?xml version="1.0" encoding="utf-8"?>
 <p:sld xmlns:a="http://schemas.openxmlformats.org/drawingml/2006/main" xmlns:r="http://schemas.openxmlformats.org/officeDocument/2006/relationships" xmlns:mc="http://schemas.openxmlformats.org/markup-compatibility/2006" xmlns:mv="urn:schemas-microsoft-com:mac:vml" xmlns:p="http://schemas.openxmlformats.org/presentationml/2006/main" xmlns:c="http://schemas.openxmlformats.org/drawingml/2006/chart" xmlns:dgm="http://schemas.openxmlformats.org/drawingml/2006/diagram" xmlns:o="urn:schemas-microsoft-com:office:office" xmlns:v="urn:schemas-microsoft-com:vml" xmlns:pvml="urn:schemas-microsoft-com:office:powerpoint" xmlns:com="http://schemas.openxmlformats.org/drawingml/2006/compatibility" xmlns:p14="http://schemas.microsoft.com/office/powerpoint/2010/main" xmlns:p15="http://schemas.microsoft.com/office/powerpoint/2012/main" xmlns:ahyp="http://schemas.microsoft.com/office/drawing/2018/hyperlinkcolor">
   <p:cSld>
     <p:spTree>
       <p:nvGrpSpPr>
-        <p:cNvPr id="177" name="Shape 177"/>
+        <p:cNvPr id="185" name="Shape 185"/>
         <p:cNvGrpSpPr/>
         <p:nvPr/>
       </p:nvGrpSpPr>
@@ -17449,7 +17769,7 @@
       </p:grpSpPr>
       <p:sp>
         <p:nvSpPr>
-          <p:cNvPr id="178" name="Google Shape;178;g3b0d07ae252_5_0"/>
+          <p:cNvPr id="186" name="Google Shape;186;g3b0d07ae252_5_0"/>
           <p:cNvSpPr txBox="1"/>
           <p:nvPr>
             <p:ph type="title"/>
@@ -17501,7 +17821,7 @@
       </p:sp>
       <p:sp>
         <p:nvSpPr>
-          <p:cNvPr id="179" name="Google Shape;179;g3b0d07ae252_5_0"/>
+          <p:cNvPr id="187" name="Google Shape;187;g3b0d07ae252_5_0"/>
           <p:cNvSpPr txBox="1"/>
           <p:nvPr>
             <p:ph idx="1" type="body"/>
@@ -17700,7 +18020,7 @@
       </p:sp>
       <p:pic>
         <p:nvPicPr>
-          <p:cNvPr id="180" name="Google Shape;180;g3b0d07ae252_5_0"/>
+          <p:cNvPr id="188" name="Google Shape;188;g3b0d07ae252_5_0"/>
           <p:cNvPicPr preferRelativeResize="0"/>
           <p:nvPr/>
         </p:nvPicPr>
@@ -17734,12 +18054,12 @@
 </p:sld>
 </file>
 
-<file path=ppt/slides/slide12.xml><?xml version="1.0" encoding="utf-8"?>
+<file path=ppt/slides/slide13.xml><?xml version="1.0" encoding="utf-8"?>
 <p:sld xmlns:a="http://schemas.openxmlformats.org/drawingml/2006/main" xmlns:r="http://schemas.openxmlformats.org/officeDocument/2006/relationships" xmlns:mc="http://schemas.openxmlformats.org/markup-compatibility/2006" xmlns:mv="urn:schemas-microsoft-com:mac:vml" xmlns:p="http://schemas.openxmlformats.org/presentationml/2006/main" xmlns:c="http://schemas.openxmlformats.org/drawingml/2006/chart" xmlns:dgm="http://schemas.openxmlformats.org/drawingml/2006/diagram" xmlns:o="urn:schemas-microsoft-com:office:office" xmlns:v="urn:schemas-microsoft-com:vml" xmlns:pvml="urn:schemas-microsoft-com:office:powerpoint" xmlns:com="http://schemas.openxmlformats.org/drawingml/2006/compatibility" xmlns:p14="http://schemas.microsoft.com/office/powerpoint/2010/main" xmlns:p15="http://schemas.microsoft.com/office/powerpoint/2012/main" xmlns:ahyp="http://schemas.microsoft.com/office/drawing/2018/hyperlinkcolor">
   <p:cSld>
     <p:spTree>
       <p:nvGrpSpPr>
-        <p:cNvPr id="184" name="Shape 184"/>
+        <p:cNvPr id="192" name="Shape 192"/>
         <p:cNvGrpSpPr/>
         <p:nvPr/>
       </p:nvGrpSpPr>
@@ -17753,7 +18073,7 @@
       </p:grpSpPr>
       <p:sp>
         <p:nvSpPr>
-          <p:cNvPr id="185" name="Google Shape;185;p9"/>
+          <p:cNvPr id="193" name="Google Shape;193;p9"/>
           <p:cNvSpPr txBox="1"/>
           <p:nvPr/>
         </p:nvSpPr>
@@ -17803,7 +18123,7 @@
       </p:sp>
       <p:sp>
         <p:nvSpPr>
-          <p:cNvPr id="186" name="Google Shape;186;p9"/>
+          <p:cNvPr id="194" name="Google Shape;194;p9"/>
           <p:cNvSpPr txBox="1"/>
           <p:nvPr/>
         </p:nvSpPr>
@@ -17949,7 +18269,7 @@
       </p:sp>
       <p:sp>
         <p:nvSpPr>
-          <p:cNvPr id="187" name="Google Shape;187;p9"/>
+          <p:cNvPr id="195" name="Google Shape;195;p9"/>
           <p:cNvSpPr txBox="1"/>
           <p:nvPr/>
         </p:nvSpPr>
@@ -18002,7 +18322,7 @@
       </p:sp>
       <p:sp>
         <p:nvSpPr>
-          <p:cNvPr id="188" name="Google Shape;188;p9"/>
+          <p:cNvPr id="196" name="Google Shape;196;p9"/>
           <p:cNvSpPr txBox="1"/>
           <p:nvPr/>
         </p:nvSpPr>
@@ -18117,7 +18437,7 @@
       </p:sp>
       <p:sp>
         <p:nvSpPr>
-          <p:cNvPr id="189" name="Google Shape;189;p9"/>
+          <p:cNvPr id="197" name="Google Shape;197;p9"/>
           <p:cNvSpPr txBox="1"/>
           <p:nvPr/>
         </p:nvSpPr>
@@ -18201,7 +18521,7 @@
       </p:sp>
       <p:sp>
         <p:nvSpPr>
-          <p:cNvPr id="190" name="Google Shape;190;p9"/>
+          <p:cNvPr id="198" name="Google Shape;198;p9"/>
           <p:cNvSpPr txBox="1"/>
           <p:nvPr/>
         </p:nvSpPr>
@@ -18384,12 +18704,12 @@
 </p:sld>
 </file>
 
-<file path=ppt/slides/slide13.xml><?xml version="1.0" encoding="utf-8"?>
+<file path=ppt/slides/slide14.xml><?xml version="1.0" encoding="utf-8"?>
 <p:sld xmlns:a="http://schemas.openxmlformats.org/drawingml/2006/main" xmlns:r="http://schemas.openxmlformats.org/officeDocument/2006/relationships" xmlns:mc="http://schemas.openxmlformats.org/markup-compatibility/2006" xmlns:mv="urn:schemas-microsoft-com:mac:vml" xmlns:p="http://schemas.openxmlformats.org/presentationml/2006/main" xmlns:c="http://schemas.openxmlformats.org/drawingml/2006/chart" xmlns:dgm="http://schemas.openxmlformats.org/drawingml/2006/diagram" xmlns:o="urn:schemas-microsoft-com:office:office" xmlns:v="urn:schemas-microsoft-com:vml" xmlns:pvml="urn:schemas-microsoft-com:office:powerpoint" xmlns:com="http://schemas.openxmlformats.org/drawingml/2006/compatibility" xmlns:p14="http://schemas.microsoft.com/office/powerpoint/2010/main" xmlns:p15="http://schemas.microsoft.com/office/powerpoint/2012/main" xmlns:ahyp="http://schemas.microsoft.com/office/drawing/2018/hyperlinkcolor">
   <p:cSld>
     <p:spTree>
       <p:nvGrpSpPr>
-        <p:cNvPr id="194" name="Shape 194"/>
+        <p:cNvPr id="202" name="Shape 202"/>
         <p:cNvGrpSpPr/>
         <p:nvPr/>
       </p:nvGrpSpPr>
@@ -18403,7 +18723,7 @@
       </p:grpSpPr>
       <p:sp>
         <p:nvSpPr>
-          <p:cNvPr id="195" name="Google Shape;195;p10"/>
+          <p:cNvPr id="203" name="Google Shape;203;p10"/>
           <p:cNvSpPr txBox="1"/>
           <p:nvPr>
             <p:ph type="title"/>
@@ -18455,7 +18775,7 @@
       </p:sp>
       <p:sp>
         <p:nvSpPr>
-          <p:cNvPr id="196" name="Google Shape;196;p10"/>
+          <p:cNvPr id="204" name="Google Shape;204;p10"/>
           <p:cNvSpPr txBox="1"/>
           <p:nvPr>
             <p:ph idx="1" type="body"/>
@@ -18574,7 +18894,7 @@
       </p:sp>
       <p:pic>
         <p:nvPicPr>
-          <p:cNvPr id="197" name="Google Shape;197;p10"/>
+          <p:cNvPr id="205" name="Google Shape;205;p10"/>
           <p:cNvPicPr preferRelativeResize="0"/>
           <p:nvPr/>
         </p:nvPicPr>
@@ -18608,12 +18928,12 @@
 </p:sld>
 </file>
 
-<file path=ppt/slides/slide14.xml><?xml version="1.0" encoding="utf-8"?>
+<file path=ppt/slides/slide15.xml><?xml version="1.0" encoding="utf-8"?>
 <p:sld xmlns:a="http://schemas.openxmlformats.org/drawingml/2006/main" xmlns:r="http://schemas.openxmlformats.org/officeDocument/2006/relationships" xmlns:mc="http://schemas.openxmlformats.org/markup-compatibility/2006" xmlns:mv="urn:schemas-microsoft-com:mac:vml" xmlns:p="http://schemas.openxmlformats.org/presentationml/2006/main" xmlns:c="http://schemas.openxmlformats.org/drawingml/2006/chart" xmlns:dgm="http://schemas.openxmlformats.org/drawingml/2006/diagram" xmlns:o="urn:schemas-microsoft-com:office:office" xmlns:v="urn:schemas-microsoft-com:vml" xmlns:pvml="urn:schemas-microsoft-com:office:powerpoint" xmlns:com="http://schemas.openxmlformats.org/drawingml/2006/compatibility" xmlns:p14="http://schemas.microsoft.com/office/powerpoint/2010/main" xmlns:p15="http://schemas.microsoft.com/office/powerpoint/2012/main" xmlns:ahyp="http://schemas.microsoft.com/office/drawing/2018/hyperlinkcolor">
   <p:cSld>
     <p:spTree>
       <p:nvGrpSpPr>
-        <p:cNvPr id="201" name="Shape 201"/>
+        <p:cNvPr id="209" name="Shape 209"/>
         <p:cNvGrpSpPr/>
         <p:nvPr/>
       </p:nvGrpSpPr>
@@ -18627,7 +18947,7 @@
       </p:grpSpPr>
       <p:sp>
         <p:nvSpPr>
-          <p:cNvPr id="202" name="Google Shape;202;g3b0d07ae252_3_0"/>
+          <p:cNvPr id="210" name="Google Shape;210;g3b0d07ae252_3_0"/>
           <p:cNvSpPr txBox="1"/>
           <p:nvPr>
             <p:ph type="title"/>
@@ -18679,7 +18999,7 @@
       </p:sp>
       <p:sp>
         <p:nvSpPr>
-          <p:cNvPr id="203" name="Google Shape;203;g3b0d07ae252_3_0"/>
+          <p:cNvPr id="211" name="Google Shape;211;g3b0d07ae252_3_0"/>
           <p:cNvSpPr txBox="1"/>
           <p:nvPr>
             <p:ph idx="1" type="body"/>
@@ -18870,7 +19190,7 @@
       </p:sp>
       <p:pic>
         <p:nvPicPr>
-          <p:cNvPr id="204" name="Google Shape;204;g3b0d07ae252_3_0"/>
+          <p:cNvPr id="212" name="Google Shape;212;g3b0d07ae252_3_0"/>
           <p:cNvPicPr preferRelativeResize="0"/>
           <p:nvPr/>
         </p:nvPicPr>
@@ -18904,12 +19224,12 @@
 </p:sld>
 </file>
 
-<file path=ppt/slides/slide15.xml><?xml version="1.0" encoding="utf-8"?>
+<file path=ppt/slides/slide16.xml><?xml version="1.0" encoding="utf-8"?>
 <p:sld xmlns:a="http://schemas.openxmlformats.org/drawingml/2006/main" xmlns:r="http://schemas.openxmlformats.org/officeDocument/2006/relationships" xmlns:mc="http://schemas.openxmlformats.org/markup-compatibility/2006" xmlns:mv="urn:schemas-microsoft-com:mac:vml" xmlns:p="http://schemas.openxmlformats.org/presentationml/2006/main" xmlns:c="http://schemas.openxmlformats.org/drawingml/2006/chart" xmlns:dgm="http://schemas.openxmlformats.org/drawingml/2006/diagram" xmlns:o="urn:schemas-microsoft-com:office:office" xmlns:v="urn:schemas-microsoft-com:vml" xmlns:pvml="urn:schemas-microsoft-com:office:powerpoint" xmlns:com="http://schemas.openxmlformats.org/drawingml/2006/compatibility" xmlns:p14="http://schemas.microsoft.com/office/powerpoint/2010/main" xmlns:p15="http://schemas.microsoft.com/office/powerpoint/2012/main" xmlns:ahyp="http://schemas.microsoft.com/office/drawing/2018/hyperlinkcolor">
   <p:cSld>
     <p:spTree>
       <p:nvGrpSpPr>
-        <p:cNvPr id="208" name="Shape 208"/>
+        <p:cNvPr id="216" name="Shape 216"/>
         <p:cNvGrpSpPr/>
         <p:nvPr/>
       </p:nvGrpSpPr>
@@ -18923,7 +19243,7 @@
       </p:grpSpPr>
       <p:sp>
         <p:nvSpPr>
-          <p:cNvPr id="209" name="Google Shape;209;g3b0d07ae252_2_20"/>
+          <p:cNvPr id="217" name="Google Shape;217;g3b0d07ae252_2_20"/>
           <p:cNvSpPr txBox="1"/>
           <p:nvPr>
             <p:ph type="title"/>
@@ -18975,7 +19295,7 @@
       </p:sp>
       <p:sp>
         <p:nvSpPr>
-          <p:cNvPr id="210" name="Google Shape;210;g3b0d07ae252_2_20"/>
+          <p:cNvPr id="218" name="Google Shape;218;g3b0d07ae252_2_20"/>
           <p:cNvSpPr txBox="1"/>
           <p:nvPr>
             <p:ph idx="1" type="body"/>
@@ -19079,7 +19399,7 @@
       </p:sp>
       <p:pic>
         <p:nvPicPr>
-          <p:cNvPr id="211" name="Google Shape;211;g3b0d07ae252_2_20"/>
+          <p:cNvPr id="219" name="Google Shape;219;g3b0d07ae252_2_20"/>
           <p:cNvPicPr preferRelativeResize="0"/>
           <p:nvPr/>
         </p:nvPicPr>
@@ -19113,12 +19433,12 @@
 </p:sld>
 </file>
 
-<file path=ppt/slides/slide16.xml><?xml version="1.0" encoding="utf-8"?>
+<file path=ppt/slides/slide17.xml><?xml version="1.0" encoding="utf-8"?>
 <p:sld xmlns:a="http://schemas.openxmlformats.org/drawingml/2006/main" xmlns:r="http://schemas.openxmlformats.org/officeDocument/2006/relationships" xmlns:mc="http://schemas.openxmlformats.org/markup-compatibility/2006" xmlns:mv="urn:schemas-microsoft-com:mac:vml" xmlns:p="http://schemas.openxmlformats.org/presentationml/2006/main" xmlns:c="http://schemas.openxmlformats.org/drawingml/2006/chart" xmlns:dgm="http://schemas.openxmlformats.org/drawingml/2006/diagram" xmlns:o="urn:schemas-microsoft-com:office:office" xmlns:v="urn:schemas-microsoft-com:vml" xmlns:pvml="urn:schemas-microsoft-com:office:powerpoint" xmlns:com="http://schemas.openxmlformats.org/drawingml/2006/compatibility" xmlns:p14="http://schemas.microsoft.com/office/powerpoint/2010/main" xmlns:p15="http://schemas.microsoft.com/office/powerpoint/2012/main" xmlns:ahyp="http://schemas.microsoft.com/office/drawing/2018/hyperlinkcolor">
   <p:cSld>
     <p:spTree>
       <p:nvGrpSpPr>
-        <p:cNvPr id="215" name="Shape 215"/>
+        <p:cNvPr id="223" name="Shape 223"/>
         <p:cNvGrpSpPr/>
         <p:nvPr/>
       </p:nvGrpSpPr>
@@ -19132,7 +19452,7 @@
       </p:grpSpPr>
       <p:sp>
         <p:nvSpPr>
-          <p:cNvPr id="216" name="Google Shape;216;g3b0d07ae252_2_10"/>
+          <p:cNvPr id="224" name="Google Shape;224;g3b0d07ae252_2_10"/>
           <p:cNvSpPr txBox="1"/>
           <p:nvPr>
             <p:ph idx="1" type="body"/>
@@ -19236,7 +19556,7 @@
       </p:sp>
       <p:sp>
         <p:nvSpPr>
-          <p:cNvPr id="217" name="Google Shape;217;g3b0d07ae252_2_10"/>
+          <p:cNvPr id="225" name="Google Shape;225;g3b0d07ae252_2_10"/>
           <p:cNvSpPr txBox="1"/>
           <p:nvPr>
             <p:ph type="title"/>
@@ -19276,7 +19596,7 @@
       </p:sp>
       <p:pic>
         <p:nvPicPr>
-          <p:cNvPr descr="a blue and yellow python logo is shown on a white background (Provided by Tenor)" id="218" name="Google Shape;218;g3b0d07ae252_2_10"/>
+          <p:cNvPr descr="a blue and yellow python logo is shown on a white background (Provided by Tenor)" id="226" name="Google Shape;226;g3b0d07ae252_2_10"/>
           <p:cNvPicPr preferRelativeResize="0"/>
           <p:nvPr/>
         </p:nvPicPr>
@@ -19303,7 +19623,7 @@
       </p:pic>
       <p:pic>
         <p:nvPicPr>
-          <p:cNvPr descr="a blue hexagon with the letter c on it (Provided by Tenor)" id="219" name="Google Shape;219;g3b0d07ae252_2_10"/>
+          <p:cNvPr descr="a blue hexagon with the letter c on it (Provided by Tenor)" id="227" name="Google Shape;227;g3b0d07ae252_2_10"/>
           <p:cNvPicPr preferRelativeResize="0"/>
           <p:nvPr/>
         </p:nvPicPr>
@@ -19331,7 +19651,7 @@
       </p:pic>
       <p:pic>
         <p:nvPicPr>
-          <p:cNvPr descr="a logo for java with a cup of coffee and smoke (Provided by Tenor)" id="220" name="Google Shape;220;g3b0d07ae252_2_10"/>
+          <p:cNvPr descr="a logo for java with a cup of coffee and smoke (Provided by Tenor)" id="228" name="Google Shape;228;g3b0d07ae252_2_10"/>
           <p:cNvPicPr preferRelativeResize="0"/>
           <p:nvPr/>
         </p:nvPicPr>
@@ -19359,7 +19679,7 @@
       </p:pic>
       <p:pic>
         <p:nvPicPr>
-          <p:cNvPr descr="File:JavaScript-logo.png - Wikimedia Commons" id="221" name="Google Shape;221;g3b0d07ae252_2_10"/>
+          <p:cNvPr descr="File:JavaScript-logo.png - Wikimedia Commons" id="229" name="Google Shape;229;g3b0d07ae252_2_10"/>
           <p:cNvPicPr preferRelativeResize="0"/>
           <p:nvPr/>
         </p:nvPicPr>
@@ -19393,12 +19713,12 @@
 </p:sld>
 </file>
 
-<file path=ppt/slides/slide17.xml><?xml version="1.0" encoding="utf-8"?>
+<file path=ppt/slides/slide18.xml><?xml version="1.0" encoding="utf-8"?>
 <p:sld xmlns:a="http://schemas.openxmlformats.org/drawingml/2006/main" xmlns:r="http://schemas.openxmlformats.org/officeDocument/2006/relationships" xmlns:mc="http://schemas.openxmlformats.org/markup-compatibility/2006" xmlns:mv="urn:schemas-microsoft-com:mac:vml" xmlns:p="http://schemas.openxmlformats.org/presentationml/2006/main" xmlns:c="http://schemas.openxmlformats.org/drawingml/2006/chart" xmlns:dgm="http://schemas.openxmlformats.org/drawingml/2006/diagram" xmlns:o="urn:schemas-microsoft-com:office:office" xmlns:v="urn:schemas-microsoft-com:vml" xmlns:pvml="urn:schemas-microsoft-com:office:powerpoint" xmlns:com="http://schemas.openxmlformats.org/drawingml/2006/compatibility" xmlns:p14="http://schemas.microsoft.com/office/powerpoint/2010/main" xmlns:p15="http://schemas.microsoft.com/office/powerpoint/2012/main" xmlns:ahyp="http://schemas.microsoft.com/office/drawing/2018/hyperlinkcolor">
   <p:cSld>
     <p:spTree>
       <p:nvGrpSpPr>
-        <p:cNvPr id="225" name="Shape 225"/>
+        <p:cNvPr id="233" name="Shape 233"/>
         <p:cNvGrpSpPr/>
         <p:nvPr/>
       </p:nvGrpSpPr>
@@ -19412,7 +19732,7 @@
       </p:grpSpPr>
       <p:sp>
         <p:nvSpPr>
-          <p:cNvPr id="226" name="Google Shape;226;p11"/>
+          <p:cNvPr id="234" name="Google Shape;234;p11"/>
           <p:cNvSpPr txBox="1"/>
           <p:nvPr>
             <p:ph type="title"/>
@@ -19464,7 +19784,7 @@
       </p:sp>
       <p:sp>
         <p:nvSpPr>
-          <p:cNvPr id="227" name="Google Shape;227;p11"/>
+          <p:cNvPr id="235" name="Google Shape;235;p11"/>
           <p:cNvSpPr txBox="1"/>
           <p:nvPr>
             <p:ph idx="1" type="body"/>
@@ -19607,7 +19927,7 @@
       </p:sp>
       <p:sp>
         <p:nvSpPr>
-          <p:cNvPr id="228" name="Google Shape;228;p11"/>
+          <p:cNvPr id="236" name="Google Shape;236;p11"/>
           <p:cNvSpPr txBox="1"/>
           <p:nvPr/>
         </p:nvSpPr>
@@ -19679,12 +19999,12 @@
 </p:sld>
 </file>
 
-<file path=ppt/slides/slide18.xml><?xml version="1.0" encoding="utf-8"?>
+<file path=ppt/slides/slide19.xml><?xml version="1.0" encoding="utf-8"?>
 <p:sld xmlns:a="http://schemas.openxmlformats.org/drawingml/2006/main" xmlns:r="http://schemas.openxmlformats.org/officeDocument/2006/relationships" xmlns:mc="http://schemas.openxmlformats.org/markup-compatibility/2006" xmlns:mv="urn:schemas-microsoft-com:mac:vml" xmlns:p="http://schemas.openxmlformats.org/presentationml/2006/main" xmlns:c="http://schemas.openxmlformats.org/drawingml/2006/chart" xmlns:dgm="http://schemas.openxmlformats.org/drawingml/2006/diagram" xmlns:o="urn:schemas-microsoft-com:office:office" xmlns:v="urn:schemas-microsoft-com:vml" xmlns:pvml="urn:schemas-microsoft-com:office:powerpoint" xmlns:com="http://schemas.openxmlformats.org/drawingml/2006/compatibility" xmlns:p14="http://schemas.microsoft.com/office/powerpoint/2010/main" xmlns:p15="http://schemas.microsoft.com/office/powerpoint/2012/main" xmlns:ahyp="http://schemas.microsoft.com/office/drawing/2018/hyperlinkcolor">
   <p:cSld>
     <p:spTree>
       <p:nvGrpSpPr>
-        <p:cNvPr id="232" name="Shape 232"/>
+        <p:cNvPr id="240" name="Shape 240"/>
         <p:cNvGrpSpPr/>
         <p:nvPr/>
       </p:nvGrpSpPr>
@@ -19698,7 +20018,7 @@
       </p:grpSpPr>
       <p:sp>
         <p:nvSpPr>
-          <p:cNvPr id="233" name="Google Shape;233;p12"/>
+          <p:cNvPr id="241" name="Google Shape;241;p12"/>
           <p:cNvSpPr txBox="1"/>
           <p:nvPr>
             <p:ph idx="1" type="body"/>
@@ -19884,7 +20204,7 @@
       </p:sp>
       <p:sp>
         <p:nvSpPr>
-          <p:cNvPr id="234" name="Google Shape;234;p12"/>
+          <p:cNvPr id="242" name="Google Shape;242;p12"/>
           <p:cNvSpPr txBox="1"/>
           <p:nvPr>
             <p:ph type="title"/>
@@ -19929,481 +20249,6 @@
             <a:r>
               <a:rPr lang="en-US"/>
               <a:t>What is coming next?</a:t>
-            </a:r>
-            <a:endParaRPr/>
-          </a:p>
-        </p:txBody>
-      </p:sp>
-    </p:spTree>
-  </p:cSld>
-  <p:clrMapOvr>
-    <a:masterClrMapping/>
-  </p:clrMapOvr>
-</p:sld>
-</file>
-
-<file path=ppt/slides/slide19.xml><?xml version="1.0" encoding="utf-8"?>
-<p:sld xmlns:a="http://schemas.openxmlformats.org/drawingml/2006/main" xmlns:r="http://schemas.openxmlformats.org/officeDocument/2006/relationships" xmlns:mc="http://schemas.openxmlformats.org/markup-compatibility/2006" xmlns:mv="urn:schemas-microsoft-com:mac:vml" xmlns:p="http://schemas.openxmlformats.org/presentationml/2006/main" xmlns:c="http://schemas.openxmlformats.org/drawingml/2006/chart" xmlns:dgm="http://schemas.openxmlformats.org/drawingml/2006/diagram" xmlns:o="urn:schemas-microsoft-com:office:office" xmlns:v="urn:schemas-microsoft-com:vml" xmlns:pvml="urn:schemas-microsoft-com:office:powerpoint" xmlns:com="http://schemas.openxmlformats.org/drawingml/2006/compatibility" xmlns:p14="http://schemas.microsoft.com/office/powerpoint/2010/main" xmlns:p15="http://schemas.microsoft.com/office/powerpoint/2012/main" xmlns:ahyp="http://schemas.microsoft.com/office/drawing/2018/hyperlinkcolor">
-  <p:cSld>
-    <p:bg>
-      <p:bgPr>
-        <a:solidFill>
-          <a:schemeClr val="lt1"/>
-        </a:solidFill>
-      </p:bgPr>
-    </p:bg>
-    <p:spTree>
-      <p:nvGrpSpPr>
-        <p:cNvPr id="238" name="Shape 238"/>
-        <p:cNvGrpSpPr/>
-        <p:nvPr/>
-      </p:nvGrpSpPr>
-      <p:grpSpPr>
-        <a:xfrm>
-          <a:off x="0" y="0"/>
-          <a:ext cx="0" cy="0"/>
-          <a:chOff x="0" y="0"/>
-          <a:chExt cx="0" cy="0"/>
-        </a:xfrm>
-      </p:grpSpPr>
-      <p:sp>
-        <p:nvSpPr>
-          <p:cNvPr id="239" name="Google Shape;239;p13"/>
-          <p:cNvSpPr/>
-          <p:nvPr/>
-        </p:nvSpPr>
-        <p:spPr>
-          <a:xfrm>
-            <a:off x="517869" y="508090"/>
-            <a:ext cx="11153214" cy="149279"/>
-          </a:xfrm>
-          <a:custGeom>
-            <a:rect b="b" l="l" r="r" t="t"/>
-            <a:pathLst>
-              <a:path extrusionOk="0" h="149279" w="8085002">
-                <a:moveTo>
-                  <a:pt x="0" y="0"/>
-                </a:moveTo>
-                <a:lnTo>
-                  <a:pt x="8085002" y="0"/>
-                </a:lnTo>
-                <a:lnTo>
-                  <a:pt x="8085002" y="149279"/>
-                </a:lnTo>
-                <a:lnTo>
-                  <a:pt x="0" y="149279"/>
-                </a:lnTo>
-                <a:close/>
-              </a:path>
-            </a:pathLst>
-          </a:custGeom>
-          <a:solidFill>
-            <a:schemeClr val="dk1"/>
-          </a:solidFill>
-          <a:ln>
-            <a:noFill/>
-          </a:ln>
-        </p:spPr>
-        <p:txBody>
-          <a:bodyPr anchorCtr="0" anchor="ctr" bIns="45700" lIns="91425" spcFirstLastPara="1" rIns="91425" wrap="square" tIns="45700">
-            <a:noAutofit/>
-          </a:bodyPr>
-          <a:lstStyle/>
-          <a:p>
-            <a:pPr indent="0" lvl="0" marL="0" marR="0" rtl="0" algn="ctr">
-              <a:spcBef>
-                <a:spcPts val="0"/>
-              </a:spcBef>
-              <a:spcAft>
-                <a:spcPts val="0"/>
-              </a:spcAft>
-              <a:buNone/>
-            </a:pPr>
-            <a:r>
-              <a:t/>
-            </a:r>
-            <a:endParaRPr b="0" i="0" sz="1800" u="none" cap="none" strike="noStrike">
-              <a:solidFill>
-                <a:schemeClr val="lt1"/>
-              </a:solidFill>
-              <a:latin typeface="Arial"/>
-              <a:ea typeface="Arial"/>
-              <a:cs typeface="Arial"/>
-              <a:sym typeface="Arial"/>
-            </a:endParaRPr>
-          </a:p>
-        </p:txBody>
-      </p:sp>
-      <p:sp>
-        <p:nvSpPr>
-          <p:cNvPr id="240" name="Google Shape;240;p13"/>
-          <p:cNvSpPr/>
-          <p:nvPr/>
-        </p:nvSpPr>
-        <p:spPr>
-          <a:xfrm>
-            <a:off x="517870" y="6209925"/>
-            <a:ext cx="11155680" cy="45719"/>
-          </a:xfrm>
-          <a:custGeom>
-            <a:rect b="b" l="l" r="r" t="t"/>
-            <a:pathLst>
-              <a:path extrusionOk="0" h="45719" w="8715708">
-                <a:moveTo>
-                  <a:pt x="0" y="0"/>
-                </a:moveTo>
-                <a:lnTo>
-                  <a:pt x="3694525" y="0"/>
-                </a:lnTo>
-                <a:lnTo>
-                  <a:pt x="5021183" y="0"/>
-                </a:lnTo>
-                <a:lnTo>
-                  <a:pt x="8715708" y="0"/>
-                </a:lnTo>
-                <a:lnTo>
-                  <a:pt x="8715708" y="45719"/>
-                </a:lnTo>
-                <a:lnTo>
-                  <a:pt x="5021183" y="45719"/>
-                </a:lnTo>
-                <a:lnTo>
-                  <a:pt x="3694525" y="45719"/>
-                </a:lnTo>
-                <a:lnTo>
-                  <a:pt x="0" y="45719"/>
-                </a:lnTo>
-                <a:close/>
-              </a:path>
-            </a:pathLst>
-          </a:custGeom>
-          <a:solidFill>
-            <a:schemeClr val="dk1"/>
-          </a:solidFill>
-          <a:ln>
-            <a:noFill/>
-          </a:ln>
-        </p:spPr>
-        <p:txBody>
-          <a:bodyPr anchorCtr="0" anchor="ctr" bIns="45700" lIns="91425" spcFirstLastPara="1" rIns="91425" wrap="square" tIns="45700">
-            <a:noAutofit/>
-          </a:bodyPr>
-          <a:lstStyle/>
-          <a:p>
-            <a:pPr indent="0" lvl="0" marL="0" marR="0" rtl="0" algn="ctr">
-              <a:spcBef>
-                <a:spcPts val="0"/>
-              </a:spcBef>
-              <a:spcAft>
-                <a:spcPts val="0"/>
-              </a:spcAft>
-              <a:buNone/>
-            </a:pPr>
-            <a:r>
-              <a:t/>
-            </a:r>
-            <a:endParaRPr b="0" i="0" sz="1800" u="none" cap="none" strike="noStrike">
-              <a:solidFill>
-                <a:schemeClr val="lt1"/>
-              </a:solidFill>
-              <a:latin typeface="Arial"/>
-              <a:ea typeface="Arial"/>
-              <a:cs typeface="Arial"/>
-              <a:sym typeface="Arial"/>
-            </a:endParaRPr>
-          </a:p>
-        </p:txBody>
-      </p:sp>
-      <p:sp>
-        <p:nvSpPr>
-          <p:cNvPr id="241" name="Google Shape;241;p13"/>
-          <p:cNvSpPr/>
-          <p:nvPr/>
-        </p:nvSpPr>
-        <p:spPr>
-          <a:xfrm>
-            <a:off x="0" y="0"/>
-            <a:ext cx="12192000" cy="6858000"/>
-          </a:xfrm>
-          <a:prstGeom prst="rect">
-            <a:avLst/>
-          </a:prstGeom>
-          <a:solidFill>
-            <a:srgbClr val="FFFFFF"/>
-          </a:solidFill>
-          <a:ln>
-            <a:noFill/>
-          </a:ln>
-        </p:spPr>
-        <p:txBody>
-          <a:bodyPr anchorCtr="0" anchor="ctr" bIns="45700" lIns="91425" spcFirstLastPara="1" rIns="91425" wrap="square" tIns="45700">
-            <a:noAutofit/>
-          </a:bodyPr>
-          <a:lstStyle/>
-          <a:p>
-            <a:pPr indent="0" lvl="0" marL="0" marR="0" rtl="0" algn="ctr">
-              <a:spcBef>
-                <a:spcPts val="0"/>
-              </a:spcBef>
-              <a:spcAft>
-                <a:spcPts val="0"/>
-              </a:spcAft>
-              <a:buNone/>
-            </a:pPr>
-            <a:r>
-              <a:t/>
-            </a:r>
-            <a:endParaRPr b="0" i="0" sz="1800" u="none" cap="none" strike="noStrike">
-              <a:solidFill>
-                <a:schemeClr val="lt1"/>
-              </a:solidFill>
-              <a:latin typeface="Arial"/>
-              <a:ea typeface="Arial"/>
-              <a:cs typeface="Arial"/>
-              <a:sym typeface="Arial"/>
-            </a:endParaRPr>
-          </a:p>
-        </p:txBody>
-      </p:sp>
-      <p:sp>
-        <p:nvSpPr>
-          <p:cNvPr id="242" name="Google Shape;242;p13"/>
-          <p:cNvSpPr txBox="1"/>
-          <p:nvPr>
-            <p:ph type="title"/>
-          </p:nvPr>
-        </p:nvSpPr>
-        <p:spPr>
-          <a:xfrm>
-            <a:off x="521208" y="978408"/>
-            <a:ext cx="3397649" cy="3303764"/>
-          </a:xfrm>
-          <a:prstGeom prst="rect">
-            <a:avLst/>
-          </a:prstGeom>
-          <a:noFill/>
-          <a:ln>
-            <a:noFill/>
-          </a:ln>
-        </p:spPr>
-        <p:txBody>
-          <a:bodyPr anchorCtr="0" anchor="t" bIns="45700" lIns="91425" spcFirstLastPara="1" rIns="91425" wrap="square" tIns="45700">
-            <a:normAutofit/>
-          </a:bodyPr>
-          <a:lstStyle/>
-          <a:p>
-            <a:pPr indent="0" lvl="0" marL="0" rtl="0" algn="l">
-              <a:lnSpc>
-                <a:spcPct val="90000"/>
-              </a:lnSpc>
-              <a:spcBef>
-                <a:spcPts val="0"/>
-              </a:spcBef>
-              <a:spcAft>
-                <a:spcPts val="0"/>
-              </a:spcAft>
-              <a:buClr>
-                <a:schemeClr val="dk1"/>
-              </a:buClr>
-              <a:buSzPts val="3400"/>
-              <a:buFont typeface="Arial"/>
-              <a:buNone/>
-            </a:pPr>
-            <a:r>
-              <a:rPr lang="en-US" sz="3400"/>
-              <a:t>LLM Consortium For Identifying Weird Gadgets from System Documentation</a:t>
-            </a:r>
-            <a:endParaRPr/>
-          </a:p>
-        </p:txBody>
-      </p:sp>
-      <p:sp>
-        <p:nvSpPr>
-          <p:cNvPr id="243" name="Google Shape;243;p13"/>
-          <p:cNvSpPr/>
-          <p:nvPr/>
-        </p:nvSpPr>
-        <p:spPr>
-          <a:xfrm>
-            <a:off x="517869" y="508090"/>
-            <a:ext cx="11153214" cy="149279"/>
-          </a:xfrm>
-          <a:custGeom>
-            <a:rect b="b" l="l" r="r" t="t"/>
-            <a:pathLst>
-              <a:path extrusionOk="0" h="149279" w="8085002">
-                <a:moveTo>
-                  <a:pt x="0" y="0"/>
-                </a:moveTo>
-                <a:lnTo>
-                  <a:pt x="8085002" y="0"/>
-                </a:lnTo>
-                <a:lnTo>
-                  <a:pt x="8085002" y="149279"/>
-                </a:lnTo>
-                <a:lnTo>
-                  <a:pt x="0" y="149279"/>
-                </a:lnTo>
-                <a:close/>
-              </a:path>
-            </a:pathLst>
-          </a:custGeom>
-          <a:solidFill>
-            <a:schemeClr val="dk1"/>
-          </a:solidFill>
-          <a:ln>
-            <a:noFill/>
-          </a:ln>
-        </p:spPr>
-        <p:txBody>
-          <a:bodyPr anchorCtr="0" anchor="ctr" bIns="45700" lIns="91425" spcFirstLastPara="1" rIns="91425" wrap="square" tIns="45700">
-            <a:noAutofit/>
-          </a:bodyPr>
-          <a:lstStyle/>
-          <a:p>
-            <a:pPr indent="0" lvl="0" marL="0" marR="0" rtl="0" algn="ctr">
-              <a:spcBef>
-                <a:spcPts val="0"/>
-              </a:spcBef>
-              <a:spcAft>
-                <a:spcPts val="0"/>
-              </a:spcAft>
-              <a:buNone/>
-            </a:pPr>
-            <a:r>
-              <a:t/>
-            </a:r>
-            <a:endParaRPr b="0" i="0" sz="1800" u="none" cap="none" strike="noStrike">
-              <a:solidFill>
-                <a:schemeClr val="lt1"/>
-              </a:solidFill>
-              <a:latin typeface="Arial"/>
-              <a:ea typeface="Arial"/>
-              <a:cs typeface="Arial"/>
-              <a:sym typeface="Arial"/>
-            </a:endParaRPr>
-          </a:p>
-        </p:txBody>
-      </p:sp>
-      <p:pic>
-        <p:nvPicPr>
-          <p:cNvPr id="244" name="Google Shape;244;p13"/>
-          <p:cNvPicPr preferRelativeResize="0"/>
-          <p:nvPr/>
-        </p:nvPicPr>
-        <p:blipFill rotWithShape="1">
-          <a:blip r:embed="rId3">
-            <a:alphaModFix/>
-          </a:blip>
-          <a:srcRect b="0" l="0" r="0" t="0"/>
-          <a:stretch/>
-        </p:blipFill>
-        <p:spPr>
-          <a:xfrm>
-            <a:off x="5002501" y="965741"/>
-            <a:ext cx="6159870" cy="5728678"/>
-          </a:xfrm>
-          <a:prstGeom prst="rect">
-            <a:avLst/>
-          </a:prstGeom>
-          <a:noFill/>
-          <a:ln>
-            <a:noFill/>
-          </a:ln>
-        </p:spPr>
-      </p:pic>
-      <p:sp>
-        <p:nvSpPr>
-          <p:cNvPr id="245" name="Google Shape;245;p13"/>
-          <p:cNvSpPr txBox="1"/>
-          <p:nvPr/>
-        </p:nvSpPr>
-        <p:spPr>
-          <a:xfrm>
-            <a:off x="335626" y="4024422"/>
-            <a:ext cx="3768811" cy="2585323"/>
-          </a:xfrm>
-          <a:prstGeom prst="rect">
-            <a:avLst/>
-          </a:prstGeom>
-          <a:noFill/>
-          <a:ln>
-            <a:noFill/>
-          </a:ln>
-        </p:spPr>
-        <p:txBody>
-          <a:bodyPr anchorCtr="0" anchor="t" bIns="45700" lIns="91425" spcFirstLastPara="1" rIns="91425" wrap="square" tIns="45700">
-            <a:spAutoFit/>
-          </a:bodyPr>
-          <a:lstStyle/>
-          <a:p>
-            <a:pPr indent="0" lvl="0" marL="0" marR="0" rtl="0" algn="l">
-              <a:spcBef>
-                <a:spcPts val="0"/>
-              </a:spcBef>
-              <a:spcAft>
-                <a:spcPts val="0"/>
-              </a:spcAft>
-              <a:buNone/>
-            </a:pPr>
-            <a:r>
-              <a:rPr b="0" i="0" lang="en-US" sz="1800" u="none" cap="none" strike="noStrike">
-                <a:solidFill>
-                  <a:schemeClr val="dk1"/>
-                </a:solidFill>
-                <a:latin typeface="Arial"/>
-                <a:ea typeface="Arial"/>
-                <a:cs typeface="Arial"/>
-                <a:sym typeface="Arial"/>
-              </a:rPr>
-              <a:t>Multiple fine-tuned llms independently generate responses, creating redundancy and reducing bias / hallucination</a:t>
-            </a:r>
-            <a:endParaRPr/>
-          </a:p>
-          <a:p>
-            <a:pPr indent="0" lvl="0" marL="0" marR="0" rtl="0" algn="l">
-              <a:spcBef>
-                <a:spcPts val="0"/>
-              </a:spcBef>
-              <a:spcAft>
-                <a:spcPts val="0"/>
-              </a:spcAft>
-              <a:buNone/>
-            </a:pPr>
-            <a:r>
-              <a:t/>
-            </a:r>
-            <a:endParaRPr sz="1800">
-              <a:solidFill>
-                <a:schemeClr val="dk1"/>
-              </a:solidFill>
-              <a:latin typeface="Arial"/>
-              <a:ea typeface="Arial"/>
-              <a:cs typeface="Arial"/>
-              <a:sym typeface="Arial"/>
-            </a:endParaRPr>
-          </a:p>
-          <a:p>
-            <a:pPr indent="0" lvl="0" marL="0" marR="0" rtl="0" algn="l">
-              <a:spcBef>
-                <a:spcPts val="0"/>
-              </a:spcBef>
-              <a:spcAft>
-                <a:spcPts val="0"/>
-              </a:spcAft>
-              <a:buNone/>
-            </a:pPr>
-            <a:r>
-              <a:rPr lang="en-US" sz="1800">
-                <a:solidFill>
-                  <a:schemeClr val="dk1"/>
-                </a:solidFill>
-                <a:latin typeface="Arial"/>
-                <a:ea typeface="Arial"/>
-                <a:cs typeface="Arial"/>
-                <a:sym typeface="Arial"/>
-              </a:rPr>
-              <a:t>Dedicated reasoning model compares, validates, and synthesizes these outputs into a single trusted result</a:t>
             </a:r>
             <a:endParaRPr/>
           </a:p>
@@ -20530,6 +20375,481 @@
           </a:ln>
         </p:spPr>
       </p:pic>
+    </p:spTree>
+  </p:cSld>
+  <p:clrMapOvr>
+    <a:masterClrMapping/>
+  </p:clrMapOvr>
+</p:sld>
+</file>
+
+<file path=ppt/slides/slide20.xml><?xml version="1.0" encoding="utf-8"?>
+<p:sld xmlns:a="http://schemas.openxmlformats.org/drawingml/2006/main" xmlns:r="http://schemas.openxmlformats.org/officeDocument/2006/relationships" xmlns:mc="http://schemas.openxmlformats.org/markup-compatibility/2006" xmlns:mv="urn:schemas-microsoft-com:mac:vml" xmlns:p="http://schemas.openxmlformats.org/presentationml/2006/main" xmlns:c="http://schemas.openxmlformats.org/drawingml/2006/chart" xmlns:dgm="http://schemas.openxmlformats.org/drawingml/2006/diagram" xmlns:o="urn:schemas-microsoft-com:office:office" xmlns:v="urn:schemas-microsoft-com:vml" xmlns:pvml="urn:schemas-microsoft-com:office:powerpoint" xmlns:com="http://schemas.openxmlformats.org/drawingml/2006/compatibility" xmlns:p14="http://schemas.microsoft.com/office/powerpoint/2010/main" xmlns:p15="http://schemas.microsoft.com/office/powerpoint/2012/main" xmlns:ahyp="http://schemas.microsoft.com/office/drawing/2018/hyperlinkcolor">
+  <p:cSld>
+    <p:bg>
+      <p:bgPr>
+        <a:solidFill>
+          <a:schemeClr val="lt1"/>
+        </a:solidFill>
+      </p:bgPr>
+    </p:bg>
+    <p:spTree>
+      <p:nvGrpSpPr>
+        <p:cNvPr id="246" name="Shape 246"/>
+        <p:cNvGrpSpPr/>
+        <p:nvPr/>
+      </p:nvGrpSpPr>
+      <p:grpSpPr>
+        <a:xfrm>
+          <a:off x="0" y="0"/>
+          <a:ext cx="0" cy="0"/>
+          <a:chOff x="0" y="0"/>
+          <a:chExt cx="0" cy="0"/>
+        </a:xfrm>
+      </p:grpSpPr>
+      <p:sp>
+        <p:nvSpPr>
+          <p:cNvPr id="247" name="Google Shape;247;p13"/>
+          <p:cNvSpPr/>
+          <p:nvPr/>
+        </p:nvSpPr>
+        <p:spPr>
+          <a:xfrm>
+            <a:off x="517869" y="508090"/>
+            <a:ext cx="11153214" cy="149279"/>
+          </a:xfrm>
+          <a:custGeom>
+            <a:rect b="b" l="l" r="r" t="t"/>
+            <a:pathLst>
+              <a:path extrusionOk="0" h="149279" w="8085002">
+                <a:moveTo>
+                  <a:pt x="0" y="0"/>
+                </a:moveTo>
+                <a:lnTo>
+                  <a:pt x="8085002" y="0"/>
+                </a:lnTo>
+                <a:lnTo>
+                  <a:pt x="8085002" y="149279"/>
+                </a:lnTo>
+                <a:lnTo>
+                  <a:pt x="0" y="149279"/>
+                </a:lnTo>
+                <a:close/>
+              </a:path>
+            </a:pathLst>
+          </a:custGeom>
+          <a:solidFill>
+            <a:schemeClr val="dk1"/>
+          </a:solidFill>
+          <a:ln>
+            <a:noFill/>
+          </a:ln>
+        </p:spPr>
+        <p:txBody>
+          <a:bodyPr anchorCtr="0" anchor="ctr" bIns="45700" lIns="91425" spcFirstLastPara="1" rIns="91425" wrap="square" tIns="45700">
+            <a:noAutofit/>
+          </a:bodyPr>
+          <a:lstStyle/>
+          <a:p>
+            <a:pPr indent="0" lvl="0" marL="0" marR="0" rtl="0" algn="ctr">
+              <a:spcBef>
+                <a:spcPts val="0"/>
+              </a:spcBef>
+              <a:spcAft>
+                <a:spcPts val="0"/>
+              </a:spcAft>
+              <a:buNone/>
+            </a:pPr>
+            <a:r>
+              <a:t/>
+            </a:r>
+            <a:endParaRPr b="0" i="0" sz="1800" u="none" cap="none" strike="noStrike">
+              <a:solidFill>
+                <a:schemeClr val="lt1"/>
+              </a:solidFill>
+              <a:latin typeface="Arial"/>
+              <a:ea typeface="Arial"/>
+              <a:cs typeface="Arial"/>
+              <a:sym typeface="Arial"/>
+            </a:endParaRPr>
+          </a:p>
+        </p:txBody>
+      </p:sp>
+      <p:sp>
+        <p:nvSpPr>
+          <p:cNvPr id="248" name="Google Shape;248;p13"/>
+          <p:cNvSpPr/>
+          <p:nvPr/>
+        </p:nvSpPr>
+        <p:spPr>
+          <a:xfrm>
+            <a:off x="517870" y="6209925"/>
+            <a:ext cx="11155680" cy="45719"/>
+          </a:xfrm>
+          <a:custGeom>
+            <a:rect b="b" l="l" r="r" t="t"/>
+            <a:pathLst>
+              <a:path extrusionOk="0" h="45719" w="8715708">
+                <a:moveTo>
+                  <a:pt x="0" y="0"/>
+                </a:moveTo>
+                <a:lnTo>
+                  <a:pt x="3694525" y="0"/>
+                </a:lnTo>
+                <a:lnTo>
+                  <a:pt x="5021183" y="0"/>
+                </a:lnTo>
+                <a:lnTo>
+                  <a:pt x="8715708" y="0"/>
+                </a:lnTo>
+                <a:lnTo>
+                  <a:pt x="8715708" y="45719"/>
+                </a:lnTo>
+                <a:lnTo>
+                  <a:pt x="5021183" y="45719"/>
+                </a:lnTo>
+                <a:lnTo>
+                  <a:pt x="3694525" y="45719"/>
+                </a:lnTo>
+                <a:lnTo>
+                  <a:pt x="0" y="45719"/>
+                </a:lnTo>
+                <a:close/>
+              </a:path>
+            </a:pathLst>
+          </a:custGeom>
+          <a:solidFill>
+            <a:schemeClr val="dk1"/>
+          </a:solidFill>
+          <a:ln>
+            <a:noFill/>
+          </a:ln>
+        </p:spPr>
+        <p:txBody>
+          <a:bodyPr anchorCtr="0" anchor="ctr" bIns="45700" lIns="91425" spcFirstLastPara="1" rIns="91425" wrap="square" tIns="45700">
+            <a:noAutofit/>
+          </a:bodyPr>
+          <a:lstStyle/>
+          <a:p>
+            <a:pPr indent="0" lvl="0" marL="0" marR="0" rtl="0" algn="ctr">
+              <a:spcBef>
+                <a:spcPts val="0"/>
+              </a:spcBef>
+              <a:spcAft>
+                <a:spcPts val="0"/>
+              </a:spcAft>
+              <a:buNone/>
+            </a:pPr>
+            <a:r>
+              <a:t/>
+            </a:r>
+            <a:endParaRPr b="0" i="0" sz="1800" u="none" cap="none" strike="noStrike">
+              <a:solidFill>
+                <a:schemeClr val="lt1"/>
+              </a:solidFill>
+              <a:latin typeface="Arial"/>
+              <a:ea typeface="Arial"/>
+              <a:cs typeface="Arial"/>
+              <a:sym typeface="Arial"/>
+            </a:endParaRPr>
+          </a:p>
+        </p:txBody>
+      </p:sp>
+      <p:sp>
+        <p:nvSpPr>
+          <p:cNvPr id="249" name="Google Shape;249;p13"/>
+          <p:cNvSpPr/>
+          <p:nvPr/>
+        </p:nvSpPr>
+        <p:spPr>
+          <a:xfrm>
+            <a:off x="0" y="0"/>
+            <a:ext cx="12192000" cy="6858000"/>
+          </a:xfrm>
+          <a:prstGeom prst="rect">
+            <a:avLst/>
+          </a:prstGeom>
+          <a:solidFill>
+            <a:srgbClr val="FFFFFF"/>
+          </a:solidFill>
+          <a:ln>
+            <a:noFill/>
+          </a:ln>
+        </p:spPr>
+        <p:txBody>
+          <a:bodyPr anchorCtr="0" anchor="ctr" bIns="45700" lIns="91425" spcFirstLastPara="1" rIns="91425" wrap="square" tIns="45700">
+            <a:noAutofit/>
+          </a:bodyPr>
+          <a:lstStyle/>
+          <a:p>
+            <a:pPr indent="0" lvl="0" marL="0" marR="0" rtl="0" algn="ctr">
+              <a:spcBef>
+                <a:spcPts val="0"/>
+              </a:spcBef>
+              <a:spcAft>
+                <a:spcPts val="0"/>
+              </a:spcAft>
+              <a:buNone/>
+            </a:pPr>
+            <a:r>
+              <a:t/>
+            </a:r>
+            <a:endParaRPr b="0" i="0" sz="1800" u="none" cap="none" strike="noStrike">
+              <a:solidFill>
+                <a:schemeClr val="lt1"/>
+              </a:solidFill>
+              <a:latin typeface="Arial"/>
+              <a:ea typeface="Arial"/>
+              <a:cs typeface="Arial"/>
+              <a:sym typeface="Arial"/>
+            </a:endParaRPr>
+          </a:p>
+        </p:txBody>
+      </p:sp>
+      <p:sp>
+        <p:nvSpPr>
+          <p:cNvPr id="250" name="Google Shape;250;p13"/>
+          <p:cNvSpPr txBox="1"/>
+          <p:nvPr>
+            <p:ph type="title"/>
+          </p:nvPr>
+        </p:nvSpPr>
+        <p:spPr>
+          <a:xfrm>
+            <a:off x="521208" y="978408"/>
+            <a:ext cx="3397649" cy="3303764"/>
+          </a:xfrm>
+          <a:prstGeom prst="rect">
+            <a:avLst/>
+          </a:prstGeom>
+          <a:noFill/>
+          <a:ln>
+            <a:noFill/>
+          </a:ln>
+        </p:spPr>
+        <p:txBody>
+          <a:bodyPr anchorCtr="0" anchor="t" bIns="45700" lIns="91425" spcFirstLastPara="1" rIns="91425" wrap="square" tIns="45700">
+            <a:normAutofit/>
+          </a:bodyPr>
+          <a:lstStyle/>
+          <a:p>
+            <a:pPr indent="0" lvl="0" marL="0" rtl="0" algn="l">
+              <a:lnSpc>
+                <a:spcPct val="90000"/>
+              </a:lnSpc>
+              <a:spcBef>
+                <a:spcPts val="0"/>
+              </a:spcBef>
+              <a:spcAft>
+                <a:spcPts val="0"/>
+              </a:spcAft>
+              <a:buClr>
+                <a:schemeClr val="dk1"/>
+              </a:buClr>
+              <a:buSzPts val="3400"/>
+              <a:buFont typeface="Arial"/>
+              <a:buNone/>
+            </a:pPr>
+            <a:r>
+              <a:rPr lang="en-US" sz="3400"/>
+              <a:t>LLM Consortium For Identifying Weird Gadgets from System Documentation</a:t>
+            </a:r>
+            <a:endParaRPr/>
+          </a:p>
+        </p:txBody>
+      </p:sp>
+      <p:sp>
+        <p:nvSpPr>
+          <p:cNvPr id="251" name="Google Shape;251;p13"/>
+          <p:cNvSpPr/>
+          <p:nvPr/>
+        </p:nvSpPr>
+        <p:spPr>
+          <a:xfrm>
+            <a:off x="517869" y="508090"/>
+            <a:ext cx="11153214" cy="149279"/>
+          </a:xfrm>
+          <a:custGeom>
+            <a:rect b="b" l="l" r="r" t="t"/>
+            <a:pathLst>
+              <a:path extrusionOk="0" h="149279" w="8085002">
+                <a:moveTo>
+                  <a:pt x="0" y="0"/>
+                </a:moveTo>
+                <a:lnTo>
+                  <a:pt x="8085002" y="0"/>
+                </a:lnTo>
+                <a:lnTo>
+                  <a:pt x="8085002" y="149279"/>
+                </a:lnTo>
+                <a:lnTo>
+                  <a:pt x="0" y="149279"/>
+                </a:lnTo>
+                <a:close/>
+              </a:path>
+            </a:pathLst>
+          </a:custGeom>
+          <a:solidFill>
+            <a:schemeClr val="dk1"/>
+          </a:solidFill>
+          <a:ln>
+            <a:noFill/>
+          </a:ln>
+        </p:spPr>
+        <p:txBody>
+          <a:bodyPr anchorCtr="0" anchor="ctr" bIns="45700" lIns="91425" spcFirstLastPara="1" rIns="91425" wrap="square" tIns="45700">
+            <a:noAutofit/>
+          </a:bodyPr>
+          <a:lstStyle/>
+          <a:p>
+            <a:pPr indent="0" lvl="0" marL="0" marR="0" rtl="0" algn="ctr">
+              <a:spcBef>
+                <a:spcPts val="0"/>
+              </a:spcBef>
+              <a:spcAft>
+                <a:spcPts val="0"/>
+              </a:spcAft>
+              <a:buNone/>
+            </a:pPr>
+            <a:r>
+              <a:t/>
+            </a:r>
+            <a:endParaRPr b="0" i="0" sz="1800" u="none" cap="none" strike="noStrike">
+              <a:solidFill>
+                <a:schemeClr val="lt1"/>
+              </a:solidFill>
+              <a:latin typeface="Arial"/>
+              <a:ea typeface="Arial"/>
+              <a:cs typeface="Arial"/>
+              <a:sym typeface="Arial"/>
+            </a:endParaRPr>
+          </a:p>
+        </p:txBody>
+      </p:sp>
+      <p:pic>
+        <p:nvPicPr>
+          <p:cNvPr id="252" name="Google Shape;252;p13"/>
+          <p:cNvPicPr preferRelativeResize="0"/>
+          <p:nvPr/>
+        </p:nvPicPr>
+        <p:blipFill rotWithShape="1">
+          <a:blip r:embed="rId3">
+            <a:alphaModFix/>
+          </a:blip>
+          <a:srcRect b="0" l="0" r="0" t="0"/>
+          <a:stretch/>
+        </p:blipFill>
+        <p:spPr>
+          <a:xfrm>
+            <a:off x="5002501" y="965741"/>
+            <a:ext cx="6159870" cy="5728678"/>
+          </a:xfrm>
+          <a:prstGeom prst="rect">
+            <a:avLst/>
+          </a:prstGeom>
+          <a:noFill/>
+          <a:ln>
+            <a:noFill/>
+          </a:ln>
+        </p:spPr>
+      </p:pic>
+      <p:sp>
+        <p:nvSpPr>
+          <p:cNvPr id="253" name="Google Shape;253;p13"/>
+          <p:cNvSpPr txBox="1"/>
+          <p:nvPr/>
+        </p:nvSpPr>
+        <p:spPr>
+          <a:xfrm>
+            <a:off x="335626" y="4024422"/>
+            <a:ext cx="3768811" cy="2585323"/>
+          </a:xfrm>
+          <a:prstGeom prst="rect">
+            <a:avLst/>
+          </a:prstGeom>
+          <a:noFill/>
+          <a:ln>
+            <a:noFill/>
+          </a:ln>
+        </p:spPr>
+        <p:txBody>
+          <a:bodyPr anchorCtr="0" anchor="t" bIns="45700" lIns="91425" spcFirstLastPara="1" rIns="91425" wrap="square" tIns="45700">
+            <a:spAutoFit/>
+          </a:bodyPr>
+          <a:lstStyle/>
+          <a:p>
+            <a:pPr indent="0" lvl="0" marL="0" marR="0" rtl="0" algn="l">
+              <a:spcBef>
+                <a:spcPts val="0"/>
+              </a:spcBef>
+              <a:spcAft>
+                <a:spcPts val="0"/>
+              </a:spcAft>
+              <a:buNone/>
+            </a:pPr>
+            <a:r>
+              <a:rPr b="0" i="0" lang="en-US" sz="1800" u="none" cap="none" strike="noStrike">
+                <a:solidFill>
+                  <a:schemeClr val="dk1"/>
+                </a:solidFill>
+                <a:latin typeface="Arial"/>
+                <a:ea typeface="Arial"/>
+                <a:cs typeface="Arial"/>
+                <a:sym typeface="Arial"/>
+              </a:rPr>
+              <a:t>Multiple fine-tuned llms independently generate responses, creating redundancy and reducing bias / hallucination</a:t>
+            </a:r>
+            <a:endParaRPr/>
+          </a:p>
+          <a:p>
+            <a:pPr indent="0" lvl="0" marL="0" marR="0" rtl="0" algn="l">
+              <a:spcBef>
+                <a:spcPts val="0"/>
+              </a:spcBef>
+              <a:spcAft>
+                <a:spcPts val="0"/>
+              </a:spcAft>
+              <a:buNone/>
+            </a:pPr>
+            <a:r>
+              <a:t/>
+            </a:r>
+            <a:endParaRPr sz="1800">
+              <a:solidFill>
+                <a:schemeClr val="dk1"/>
+              </a:solidFill>
+              <a:latin typeface="Arial"/>
+              <a:ea typeface="Arial"/>
+              <a:cs typeface="Arial"/>
+              <a:sym typeface="Arial"/>
+            </a:endParaRPr>
+          </a:p>
+          <a:p>
+            <a:pPr indent="0" lvl="0" marL="0" marR="0" rtl="0" algn="l">
+              <a:spcBef>
+                <a:spcPts val="0"/>
+              </a:spcBef>
+              <a:spcAft>
+                <a:spcPts val="0"/>
+              </a:spcAft>
+              <a:buNone/>
+            </a:pPr>
+            <a:r>
+              <a:rPr lang="en-US" sz="1800">
+                <a:solidFill>
+                  <a:schemeClr val="dk1"/>
+                </a:solidFill>
+                <a:latin typeface="Arial"/>
+                <a:ea typeface="Arial"/>
+                <a:cs typeface="Arial"/>
+                <a:sym typeface="Arial"/>
+              </a:rPr>
+              <a:t>Dedicated reasoning model compares, validates, and synthesizes these outputs into a single trusted result</a:t>
+            </a:r>
+            <a:endParaRPr/>
+          </a:p>
+        </p:txBody>
+      </p:sp>
     </p:spTree>
   </p:cSld>
   <p:clrMapOvr>
@@ -21432,21 +21752,20 @@
         <p:nvPicPr>
           <p:cNvPr id="139" name="Google Shape;139;p4"/>
           <p:cNvPicPr preferRelativeResize="0"/>
-          <p:nvPr>
-            <p:ph idx="1" type="body"/>
-          </p:nvPr>
+          <p:nvPr/>
         </p:nvPicPr>
-        <p:blipFill rotWithShape="1">
+        <p:blipFill>
           <a:blip r:embed="rId3">
             <a:alphaModFix/>
           </a:blip>
-          <a:srcRect b="0" l="0" r="0" t="0"/>
-          <a:stretch/>
+          <a:stretch>
+            <a:fillRect/>
+          </a:stretch>
         </p:blipFill>
         <p:spPr>
           <a:xfrm>
-            <a:off x="4349837" y="978408"/>
-            <a:ext cx="7500300" cy="5812800"/>
+            <a:off x="3692050" y="835100"/>
+            <a:ext cx="7366374" cy="5686651"/>
           </a:xfrm>
           <a:prstGeom prst="rect">
             <a:avLst/>
@@ -22048,13 +22367,6 @@
 <file path=ppt/slides/slide8.xml><?xml version="1.0" encoding="utf-8"?>
 <p:sld xmlns:a="http://schemas.openxmlformats.org/drawingml/2006/main" xmlns:r="http://schemas.openxmlformats.org/officeDocument/2006/relationships" xmlns:mc="http://schemas.openxmlformats.org/markup-compatibility/2006" xmlns:mv="urn:schemas-microsoft-com:mac:vml" xmlns:p="http://schemas.openxmlformats.org/presentationml/2006/main" xmlns:c="http://schemas.openxmlformats.org/drawingml/2006/chart" xmlns:dgm="http://schemas.openxmlformats.org/drawingml/2006/diagram" xmlns:o="urn:schemas-microsoft-com:office:office" xmlns:v="urn:schemas-microsoft-com:vml" xmlns:pvml="urn:schemas-microsoft-com:office:powerpoint" xmlns:com="http://schemas.openxmlformats.org/drawingml/2006/compatibility" xmlns:p14="http://schemas.microsoft.com/office/powerpoint/2010/main" xmlns:p15="http://schemas.microsoft.com/office/powerpoint/2012/main" xmlns:ahyp="http://schemas.microsoft.com/office/drawing/2018/hyperlinkcolor">
   <p:cSld>
-    <p:bg>
-      <p:bgPr>
-        <a:solidFill>
-          <a:schemeClr val="lt1"/>
-        </a:solidFill>
-      </p:bgPr>
-    </p:bg>
     <p:spTree>
       <p:nvGrpSpPr>
         <p:cNvPr id="155" name="Shape 155"/>
@@ -22071,7 +22383,536 @@
       </p:grpSpPr>
       <p:sp>
         <p:nvSpPr>
-          <p:cNvPr id="156" name="Google Shape;156;p6"/>
+          <p:cNvPr id="156" name="Google Shape;156;g3a71945877e_0_0"/>
+          <p:cNvSpPr txBox="1"/>
+          <p:nvPr>
+            <p:ph type="title"/>
+          </p:nvPr>
+        </p:nvSpPr>
+        <p:spPr>
+          <a:xfrm>
+            <a:off x="521208" y="978408"/>
+            <a:ext cx="11155800" cy="1463100"/>
+          </a:xfrm>
+          <a:prstGeom prst="rect">
+            <a:avLst/>
+          </a:prstGeom>
+        </p:spPr>
+        <p:txBody>
+          <a:bodyPr anchorCtr="0" anchor="t" bIns="45700" lIns="91425" spcFirstLastPara="1" rIns="91425" wrap="square" tIns="45700">
+            <a:normAutofit/>
+          </a:bodyPr>
+          <a:lstStyle/>
+          <a:p>
+            <a:pPr indent="0" lvl="0" marL="0" rtl="0" algn="l">
+              <a:spcBef>
+                <a:spcPts val="0"/>
+              </a:spcBef>
+              <a:spcAft>
+                <a:spcPts val="0"/>
+              </a:spcAft>
+              <a:buNone/>
+            </a:pPr>
+            <a:r>
+              <a:rPr lang="en-US"/>
+              <a:t>Weird</a:t>
+            </a:r>
+            <a:r>
+              <a:rPr lang="en-US"/>
+              <a:t> Machine Gadgets</a:t>
+            </a:r>
+            <a:endParaRPr/>
+          </a:p>
+        </p:txBody>
+      </p:sp>
+      <p:sp>
+        <p:nvSpPr>
+          <p:cNvPr id="157" name="Google Shape;157;g3a71945877e_0_0"/>
+          <p:cNvSpPr txBox="1"/>
+          <p:nvPr>
+            <p:ph idx="1" type="body"/>
+          </p:nvPr>
+        </p:nvSpPr>
+        <p:spPr>
+          <a:xfrm>
+            <a:off x="521205" y="2578600"/>
+            <a:ext cx="3937800" cy="3767400"/>
+          </a:xfrm>
+          <a:prstGeom prst="rect">
+            <a:avLst/>
+          </a:prstGeom>
+        </p:spPr>
+        <p:txBody>
+          <a:bodyPr anchorCtr="0" anchor="t" bIns="45700" lIns="91425" spcFirstLastPara="1" rIns="91425" wrap="square" tIns="45700">
+            <a:normAutofit/>
+          </a:bodyPr>
+          <a:lstStyle/>
+          <a:p>
+            <a:pPr indent="0" lvl="0" marL="0" rtl="0" algn="l">
+              <a:spcBef>
+                <a:spcPts val="1000"/>
+              </a:spcBef>
+              <a:spcAft>
+                <a:spcPts val="0"/>
+              </a:spcAft>
+              <a:buNone/>
+            </a:pPr>
+            <a:r>
+              <a:rPr b="1" lang="en-US" sz="2400"/>
+              <a:t>What is a gadget?</a:t>
+            </a:r>
+            <a:br>
+              <a:rPr lang="en-US"/>
+            </a:br>
+            <a:r>
+              <a:rPr lang="en-US"/>
+              <a:t>Set of architectural artifacts that can be composed to construct a program</a:t>
+            </a:r>
+            <a:endParaRPr/>
+          </a:p>
+          <a:p>
+            <a:pPr indent="0" lvl="0" marL="0" rtl="0" algn="l">
+              <a:spcBef>
+                <a:spcPts val="1000"/>
+              </a:spcBef>
+              <a:spcAft>
+                <a:spcPts val="0"/>
+              </a:spcAft>
+              <a:buNone/>
+            </a:pPr>
+            <a:r>
+              <a:t/>
+            </a:r>
+            <a:endParaRPr/>
+          </a:p>
+          <a:p>
+            <a:pPr indent="0" lvl="0" marL="0" rtl="0" algn="l">
+              <a:spcBef>
+                <a:spcPts val="1000"/>
+              </a:spcBef>
+              <a:spcAft>
+                <a:spcPts val="0"/>
+              </a:spcAft>
+              <a:buNone/>
+            </a:pPr>
+            <a:r>
+              <a:rPr lang="en-US"/>
+              <a:t>Architectural artifacts can be:</a:t>
+            </a:r>
+            <a:endParaRPr/>
+          </a:p>
+          <a:p>
+            <a:pPr indent="-361950" lvl="0" marL="457200" rtl="0" algn="l">
+              <a:spcBef>
+                <a:spcPts val="1000"/>
+              </a:spcBef>
+              <a:spcAft>
+                <a:spcPts val="0"/>
+              </a:spcAft>
+              <a:buSzPts val="2100"/>
+              <a:buChar char="●"/>
+            </a:pPr>
+            <a:r>
+              <a:rPr lang="en-US" sz="2100"/>
+              <a:t>Software</a:t>
+            </a:r>
+            <a:endParaRPr sz="2100"/>
+          </a:p>
+          <a:p>
+            <a:pPr indent="-361950" lvl="0" marL="457200" rtl="0" algn="l">
+              <a:spcBef>
+                <a:spcPts val="0"/>
+              </a:spcBef>
+              <a:spcAft>
+                <a:spcPts val="0"/>
+              </a:spcAft>
+              <a:buSzPts val="2100"/>
+              <a:buChar char="●"/>
+            </a:pPr>
+            <a:r>
+              <a:rPr lang="en-US" sz="2100"/>
+              <a:t>Protocols</a:t>
+            </a:r>
+            <a:endParaRPr sz="2100"/>
+          </a:p>
+          <a:p>
+            <a:pPr indent="-361950" lvl="0" marL="457200" rtl="0" algn="l">
+              <a:spcBef>
+                <a:spcPts val="0"/>
+              </a:spcBef>
+              <a:spcAft>
+                <a:spcPts val="0"/>
+              </a:spcAft>
+              <a:buSzPts val="2100"/>
+              <a:buChar char="●"/>
+            </a:pPr>
+            <a:r>
+              <a:rPr lang="en-US" sz="2100"/>
+              <a:t>Physical components</a:t>
+            </a:r>
+            <a:endParaRPr sz="2100"/>
+          </a:p>
+          <a:p>
+            <a:pPr indent="0" lvl="0" marL="0" rtl="0" algn="l">
+              <a:spcBef>
+                <a:spcPts val="1000"/>
+              </a:spcBef>
+              <a:spcAft>
+                <a:spcPts val="0"/>
+              </a:spcAft>
+              <a:buNone/>
+            </a:pPr>
+            <a:r>
+              <a:t/>
+            </a:r>
+            <a:endParaRPr/>
+          </a:p>
+        </p:txBody>
+      </p:sp>
+      <p:sp>
+        <p:nvSpPr>
+          <p:cNvPr id="158" name="Google Shape;158;g3a71945877e_0_0"/>
+          <p:cNvSpPr txBox="1"/>
+          <p:nvPr/>
+        </p:nvSpPr>
+        <p:spPr>
+          <a:xfrm>
+            <a:off x="5041600" y="2441500"/>
+            <a:ext cx="6379500" cy="3509400"/>
+          </a:xfrm>
+          <a:prstGeom prst="rect">
+            <a:avLst/>
+          </a:prstGeom>
+          <a:noFill/>
+          <a:ln>
+            <a:noFill/>
+          </a:ln>
+        </p:spPr>
+        <p:txBody>
+          <a:bodyPr anchorCtr="0" anchor="t" bIns="91425" lIns="91425" spcFirstLastPara="1" rIns="91425" wrap="square" tIns="91425">
+            <a:spAutoFit/>
+          </a:bodyPr>
+          <a:lstStyle/>
+          <a:p>
+            <a:pPr indent="0" lvl="0" marL="0" rtl="0" algn="l">
+              <a:spcBef>
+                <a:spcPts val="0"/>
+              </a:spcBef>
+              <a:spcAft>
+                <a:spcPts val="0"/>
+              </a:spcAft>
+              <a:buClr>
+                <a:schemeClr val="dk1"/>
+              </a:buClr>
+              <a:buSzPts val="1100"/>
+              <a:buFont typeface="Arial"/>
+              <a:buNone/>
+            </a:pPr>
+            <a:r>
+              <a:rPr b="1" lang="en-US" sz="1800" u="sng">
+                <a:solidFill>
+                  <a:schemeClr val="dk1"/>
+                </a:solidFill>
+              </a:rPr>
+              <a:t>Example:</a:t>
+            </a:r>
+            <a:r>
+              <a:rPr lang="en-US" sz="1800">
+                <a:solidFill>
+                  <a:schemeClr val="dk1"/>
+                </a:solidFill>
+              </a:rPr>
+              <a:t> </a:t>
+            </a:r>
+            <a:r>
+              <a:rPr lang="en-US" sz="1800">
+                <a:solidFill>
+                  <a:schemeClr val="dk1"/>
+                </a:solidFill>
+              </a:rPr>
+              <a:t>Video Game </a:t>
+            </a:r>
+            <a:r>
+              <a:rPr lang="en-US" sz="1800">
+                <a:solidFill>
+                  <a:schemeClr val="dk1"/>
+                </a:solidFill>
+              </a:rPr>
+              <a:t>Save File Corruption</a:t>
+            </a:r>
+            <a:endParaRPr sz="1800">
+              <a:solidFill>
+                <a:schemeClr val="dk1"/>
+              </a:solidFill>
+            </a:endParaRPr>
+          </a:p>
+          <a:p>
+            <a:pPr indent="0" lvl="0" marL="0" rtl="0" algn="l">
+              <a:spcBef>
+                <a:spcPts val="0"/>
+              </a:spcBef>
+              <a:spcAft>
+                <a:spcPts val="0"/>
+              </a:spcAft>
+              <a:buClr>
+                <a:schemeClr val="dk1"/>
+              </a:buClr>
+              <a:buSzPts val="1100"/>
+              <a:buFont typeface="Arial"/>
+              <a:buNone/>
+            </a:pPr>
+            <a:r>
+              <a:t/>
+            </a:r>
+            <a:endParaRPr sz="1800">
+              <a:solidFill>
+                <a:schemeClr val="dk1"/>
+              </a:solidFill>
+            </a:endParaRPr>
+          </a:p>
+          <a:p>
+            <a:pPr indent="0" lvl="0" marL="0" rtl="0" algn="l">
+              <a:spcBef>
+                <a:spcPts val="0"/>
+              </a:spcBef>
+              <a:spcAft>
+                <a:spcPts val="0"/>
+              </a:spcAft>
+              <a:buClr>
+                <a:schemeClr val="dk1"/>
+              </a:buClr>
+              <a:buSzPts val="1100"/>
+              <a:buFont typeface="Arial"/>
+              <a:buNone/>
+            </a:pPr>
+            <a:r>
+              <a:rPr b="1" lang="en-US" sz="1800" u="sng">
+                <a:solidFill>
+                  <a:schemeClr val="dk1"/>
+                </a:solidFill>
+              </a:rPr>
+              <a:t>Gadgets</a:t>
+            </a:r>
+            <a:r>
+              <a:rPr b="1" lang="en-US" sz="1800">
+                <a:solidFill>
+                  <a:schemeClr val="dk1"/>
+                </a:solidFill>
+              </a:rPr>
+              <a:t>: </a:t>
+            </a:r>
+            <a:r>
+              <a:rPr lang="en-US" sz="1800">
+                <a:solidFill>
+                  <a:schemeClr val="dk1"/>
+                </a:solidFill>
+              </a:rPr>
+              <a:t>Save file format, game state parser, memory layout</a:t>
+            </a:r>
+            <a:endParaRPr sz="1800">
+              <a:solidFill>
+                <a:schemeClr val="dk1"/>
+              </a:solidFill>
+            </a:endParaRPr>
+          </a:p>
+          <a:p>
+            <a:pPr indent="0" lvl="0" marL="0" rtl="0" algn="l">
+              <a:spcBef>
+                <a:spcPts val="0"/>
+              </a:spcBef>
+              <a:spcAft>
+                <a:spcPts val="0"/>
+              </a:spcAft>
+              <a:buClr>
+                <a:schemeClr val="dk1"/>
+              </a:buClr>
+              <a:buSzPts val="1100"/>
+              <a:buFont typeface="Arial"/>
+              <a:buNone/>
+            </a:pPr>
+            <a:r>
+              <a:t/>
+            </a:r>
+            <a:endParaRPr sz="1800">
+              <a:solidFill>
+                <a:schemeClr val="dk1"/>
+              </a:solidFill>
+            </a:endParaRPr>
+          </a:p>
+          <a:p>
+            <a:pPr indent="0" lvl="0" marL="0" rtl="0" algn="l">
+              <a:spcBef>
+                <a:spcPts val="0"/>
+              </a:spcBef>
+              <a:spcAft>
+                <a:spcPts val="0"/>
+              </a:spcAft>
+              <a:buClr>
+                <a:schemeClr val="dk1"/>
+              </a:buClr>
+              <a:buSzPts val="1100"/>
+              <a:buFont typeface="Arial"/>
+              <a:buNone/>
+            </a:pPr>
+            <a:r>
+              <a:rPr b="1" lang="en-US" sz="1800" u="sng">
+                <a:solidFill>
+                  <a:schemeClr val="dk1"/>
+                </a:solidFill>
+              </a:rPr>
+              <a:t>Composition: </a:t>
+            </a:r>
+            <a:r>
+              <a:rPr lang="en-US" sz="1800">
+                <a:solidFill>
+                  <a:schemeClr val="dk1"/>
+                </a:solidFill>
+              </a:rPr>
+              <a:t>Carefully corrupt specific bytes in the Final Fantasy VII save file to gain extra items</a:t>
+            </a:r>
+            <a:endParaRPr sz="1800">
+              <a:solidFill>
+                <a:schemeClr val="dk1"/>
+              </a:solidFill>
+            </a:endParaRPr>
+          </a:p>
+          <a:p>
+            <a:pPr indent="0" lvl="0" marL="0" rtl="0" algn="l">
+              <a:spcBef>
+                <a:spcPts val="0"/>
+              </a:spcBef>
+              <a:spcAft>
+                <a:spcPts val="0"/>
+              </a:spcAft>
+              <a:buClr>
+                <a:schemeClr val="dk1"/>
+              </a:buClr>
+              <a:buSzPts val="1100"/>
+              <a:buFont typeface="Arial"/>
+              <a:buNone/>
+            </a:pPr>
+            <a:r>
+              <a:t/>
+            </a:r>
+            <a:endParaRPr sz="1800">
+              <a:solidFill>
+                <a:schemeClr val="dk1"/>
+              </a:solidFill>
+            </a:endParaRPr>
+          </a:p>
+          <a:p>
+            <a:pPr indent="0" lvl="0" marL="0" rtl="0" algn="l">
+              <a:spcBef>
+                <a:spcPts val="0"/>
+              </a:spcBef>
+              <a:spcAft>
+                <a:spcPts val="0"/>
+              </a:spcAft>
+              <a:buClr>
+                <a:schemeClr val="dk1"/>
+              </a:buClr>
+              <a:buSzPts val="1100"/>
+              <a:buFont typeface="Arial"/>
+              <a:buNone/>
+            </a:pPr>
+            <a:r>
+              <a:rPr i="1" lang="en-US" sz="1800" u="sng">
+                <a:solidFill>
+                  <a:schemeClr val="dk1"/>
+                </a:solidFill>
+              </a:rPr>
+              <a:t>The Final Fantasy VII save file is just data, but when the parser crashes on malformed input, it becomes a lever for control.</a:t>
+            </a:r>
+            <a:endParaRPr i="1" sz="1800" u="sng">
+              <a:solidFill>
+                <a:schemeClr val="dk1"/>
+              </a:solidFill>
+            </a:endParaRPr>
+          </a:p>
+          <a:p>
+            <a:pPr indent="0" lvl="0" marL="0" rtl="0" algn="l">
+              <a:spcBef>
+                <a:spcPts val="0"/>
+              </a:spcBef>
+              <a:spcAft>
+                <a:spcPts val="0"/>
+              </a:spcAft>
+              <a:buNone/>
+            </a:pPr>
+            <a:r>
+              <a:t/>
+            </a:r>
+            <a:endParaRPr sz="1800">
+              <a:solidFill>
+                <a:schemeClr val="dk1"/>
+              </a:solidFill>
+            </a:endParaRPr>
+          </a:p>
+        </p:txBody>
+      </p:sp>
+      <p:pic>
+        <p:nvPicPr>
+          <p:cNvPr id="159" name="Google Shape;159;g3a71945877e_0_0"/>
+          <p:cNvPicPr preferRelativeResize="0"/>
+          <p:nvPr/>
+        </p:nvPicPr>
+        <p:blipFill>
+          <a:blip r:embed="rId3">
+            <a:alphaModFix/>
+          </a:blip>
+          <a:stretch>
+            <a:fillRect/>
+          </a:stretch>
+        </p:blipFill>
+        <p:spPr>
+          <a:xfrm>
+            <a:off x="9981325" y="85825"/>
+            <a:ext cx="2276451" cy="3035275"/>
+          </a:xfrm>
+          <a:prstGeom prst="rect">
+            <a:avLst/>
+          </a:prstGeom>
+          <a:noFill/>
+          <a:ln>
+            <a:noFill/>
+          </a:ln>
+        </p:spPr>
+      </p:pic>
+    </p:spTree>
+  </p:cSld>
+  <p:clrMapOvr>
+    <a:masterClrMapping/>
+  </p:clrMapOvr>
+</p:sld>
+</file>
+
+<file path=ppt/slides/slide9.xml><?xml version="1.0" encoding="utf-8"?>
+<p:sld xmlns:a="http://schemas.openxmlformats.org/drawingml/2006/main" xmlns:r="http://schemas.openxmlformats.org/officeDocument/2006/relationships" xmlns:mc="http://schemas.openxmlformats.org/markup-compatibility/2006" xmlns:mv="urn:schemas-microsoft-com:mac:vml" xmlns:p="http://schemas.openxmlformats.org/presentationml/2006/main" xmlns:c="http://schemas.openxmlformats.org/drawingml/2006/chart" xmlns:dgm="http://schemas.openxmlformats.org/drawingml/2006/diagram" xmlns:o="urn:schemas-microsoft-com:office:office" xmlns:v="urn:schemas-microsoft-com:vml" xmlns:pvml="urn:schemas-microsoft-com:office:powerpoint" xmlns:com="http://schemas.openxmlformats.org/drawingml/2006/compatibility" xmlns:p14="http://schemas.microsoft.com/office/powerpoint/2010/main" xmlns:p15="http://schemas.microsoft.com/office/powerpoint/2012/main" xmlns:ahyp="http://schemas.microsoft.com/office/drawing/2018/hyperlinkcolor">
+  <p:cSld>
+    <p:bg>
+      <p:bgPr>
+        <a:solidFill>
+          <a:schemeClr val="lt1"/>
+        </a:solidFill>
+      </p:bgPr>
+    </p:bg>
+    <p:spTree>
+      <p:nvGrpSpPr>
+        <p:cNvPr id="163" name="Shape 163"/>
+        <p:cNvGrpSpPr/>
+        <p:nvPr/>
+      </p:nvGrpSpPr>
+      <p:grpSpPr>
+        <a:xfrm>
+          <a:off x="0" y="0"/>
+          <a:ext cx="0" cy="0"/>
+          <a:chOff x="0" y="0"/>
+          <a:chExt cx="0" cy="0"/>
+        </a:xfrm>
+      </p:grpSpPr>
+      <p:sp>
+        <p:nvSpPr>
+          <p:cNvPr id="164" name="Google Shape;164;p6"/>
           <p:cNvSpPr/>
           <p:nvPr/>
         </p:nvSpPr>
@@ -22130,7 +22971,7 @@
       </p:sp>
       <p:sp>
         <p:nvSpPr>
-          <p:cNvPr id="157" name="Google Shape;157;p6"/>
+          <p:cNvPr id="165" name="Google Shape;165;p6"/>
           <p:cNvSpPr txBox="1"/>
           <p:nvPr>
             <p:ph type="title"/>
@@ -22190,7 +23031,7 @@
       </p:sp>
       <p:sp>
         <p:nvSpPr>
-          <p:cNvPr id="158" name="Google Shape;158;p6"/>
+          <p:cNvPr id="166" name="Google Shape;166;p6"/>
           <p:cNvSpPr/>
           <p:nvPr/>
         </p:nvSpPr>
@@ -22266,7 +23107,7 @@
       </p:sp>
       <p:sp>
         <p:nvSpPr>
-          <p:cNvPr id="159" name="Google Shape;159;p6"/>
+          <p:cNvPr id="167" name="Google Shape;167;p6"/>
           <p:cNvSpPr txBox="1"/>
           <p:nvPr/>
         </p:nvSpPr>
@@ -22324,7 +23165,7 @@
       </p:sp>
       <p:pic>
         <p:nvPicPr>
-          <p:cNvPr id="160" name="Google Shape;160;p6"/>
+          <p:cNvPr id="168" name="Google Shape;168;p6"/>
           <p:cNvPicPr preferRelativeResize="0"/>
           <p:nvPr>
             <p:ph idx="1" type="body"/>
@@ -22341,111 +23182,6 @@
           <a:xfrm>
             <a:off x="4136609" y="970929"/>
             <a:ext cx="7534183" cy="5375076"/>
-          </a:xfrm>
-          <a:prstGeom prst="rect">
-            <a:avLst/>
-          </a:prstGeom>
-          <a:noFill/>
-          <a:ln>
-            <a:noFill/>
-          </a:ln>
-        </p:spPr>
-      </p:pic>
-    </p:spTree>
-  </p:cSld>
-  <p:clrMapOvr>
-    <a:masterClrMapping/>
-  </p:clrMapOvr>
-</p:sld>
-</file>
-
-<file path=ppt/slides/slide9.xml><?xml version="1.0" encoding="utf-8"?>
-<p:sld xmlns:a="http://schemas.openxmlformats.org/drawingml/2006/main" xmlns:r="http://schemas.openxmlformats.org/officeDocument/2006/relationships" xmlns:mc="http://schemas.openxmlformats.org/markup-compatibility/2006" xmlns:mv="urn:schemas-microsoft-com:mac:vml" xmlns:p="http://schemas.openxmlformats.org/presentationml/2006/main" xmlns:c="http://schemas.openxmlformats.org/drawingml/2006/chart" xmlns:dgm="http://schemas.openxmlformats.org/drawingml/2006/diagram" xmlns:o="urn:schemas-microsoft-com:office:office" xmlns:v="urn:schemas-microsoft-com:vml" xmlns:pvml="urn:schemas-microsoft-com:office:powerpoint" xmlns:com="http://schemas.openxmlformats.org/drawingml/2006/compatibility" xmlns:p14="http://schemas.microsoft.com/office/powerpoint/2010/main" xmlns:p15="http://schemas.microsoft.com/office/powerpoint/2012/main" xmlns:ahyp="http://schemas.microsoft.com/office/drawing/2018/hyperlinkcolor">
-  <p:cSld>
-    <p:spTree>
-      <p:nvGrpSpPr>
-        <p:cNvPr id="164" name="Shape 164"/>
-        <p:cNvGrpSpPr/>
-        <p:nvPr/>
-      </p:nvGrpSpPr>
-      <p:grpSpPr>
-        <a:xfrm>
-          <a:off x="0" y="0"/>
-          <a:ext cx="0" cy="0"/>
-          <a:chOff x="0" y="0"/>
-          <a:chExt cx="0" cy="0"/>
-        </a:xfrm>
-      </p:grpSpPr>
-      <p:sp>
-        <p:nvSpPr>
-          <p:cNvPr id="165" name="Google Shape;165;p7"/>
-          <p:cNvSpPr txBox="1"/>
-          <p:nvPr>
-            <p:ph type="title"/>
-          </p:nvPr>
-        </p:nvSpPr>
-        <p:spPr>
-          <a:xfrm>
-            <a:off x="521208" y="978408"/>
-            <a:ext cx="11155680" cy="1463040"/>
-          </a:xfrm>
-          <a:prstGeom prst="rect">
-            <a:avLst/>
-          </a:prstGeom>
-          <a:noFill/>
-          <a:ln>
-            <a:noFill/>
-          </a:ln>
-        </p:spPr>
-        <p:txBody>
-          <a:bodyPr anchorCtr="0" anchor="t" bIns="45700" lIns="91425" spcFirstLastPara="1" rIns="91425" wrap="square" tIns="45700">
-            <a:normAutofit/>
-          </a:bodyPr>
-          <a:lstStyle/>
-          <a:p>
-            <a:pPr indent="0" lvl="0" marL="0" rtl="0" algn="l">
-              <a:lnSpc>
-                <a:spcPct val="100000"/>
-              </a:lnSpc>
-              <a:spcBef>
-                <a:spcPts val="0"/>
-              </a:spcBef>
-              <a:spcAft>
-                <a:spcPts val="0"/>
-              </a:spcAft>
-              <a:buClr>
-                <a:schemeClr val="dk1"/>
-              </a:buClr>
-              <a:buSzPts val="4400"/>
-              <a:buFont typeface="Arial"/>
-              <a:buNone/>
-            </a:pPr>
-            <a:r>
-              <a:rPr lang="en-US"/>
-              <a:t>Our Wind Energy Testbed</a:t>
-            </a:r>
-            <a:endParaRPr/>
-          </a:p>
-        </p:txBody>
-      </p:sp>
-      <p:pic>
-        <p:nvPicPr>
-          <p:cNvPr id="166" name="Google Shape;166;p7"/>
-          <p:cNvPicPr preferRelativeResize="0"/>
-          <p:nvPr/>
-        </p:nvPicPr>
-        <p:blipFill>
-          <a:blip r:embed="rId3">
-            <a:alphaModFix/>
-          </a:blip>
-          <a:stretch>
-            <a:fillRect/>
-          </a:stretch>
-        </p:blipFill>
-        <p:spPr>
-          <a:xfrm>
-            <a:off x="100325" y="1708400"/>
-            <a:ext cx="12192000" cy="5024438"/>
           </a:xfrm>
           <a:prstGeom prst="rect">
             <a:avLst/>

</xml_diff>